<commit_message>
added styles to slides
</commit_message>
<xml_diff>
--- a/Final Pres.pptx
+++ b/Final Pres.pptx
@@ -114,6 +114,11 @@
       </a:defRPr>
     </a:lvl9pPr>
   </p:defaultTextStyle>
+  <p:extLst>
+    <p:ext uri="{EFAFB233-063F-42B5-8137-9DF3F51BA10A}">
+      <p15:sldGuideLst xmlns:p15="http://schemas.microsoft.com/office/powerpoint/2012/main"/>
+    </p:ext>
+  </p:extLst>
 </p:presentation>
 </file>
 
@@ -167,7 +172,7 @@
           <a:noFill/>
           <a:extLst>
             <a:ext uri="{909E8E84-426E-40dd-AFC4-6F175D3DCCD1}">
-              <a14:hiddenFill xmlns:a14="http://schemas.microsoft.com/office/drawing/2010/main" xmlns="">
+              <a14:hiddenFill xmlns="" xmlns:a14="http://schemas.microsoft.com/office/drawing/2010/main">
                 <a:solidFill>
                   <a:srgbClr val="FFFFFF"/>
                 </a:solidFill>
@@ -227,7 +232,7 @@
             </a:ln>
             <a:extLst>
               <a:ext uri="{91240B29-F687-4f45-9708-019B960494DF}">
-                <a14:hiddenLine xmlns:a14="http://schemas.microsoft.com/office/drawing/2010/main" xmlns="" w="9525">
+                <a14:hiddenLine xmlns="" xmlns:a14="http://schemas.microsoft.com/office/drawing/2010/main" w="9525">
                   <a:solidFill>
                     <a:srgbClr val="000000"/>
                   </a:solidFill>
@@ -317,7 +322,7 @@
             </a:ln>
             <a:extLst>
               <a:ext uri="{91240B29-F687-4f45-9708-019B960494DF}">
-                <a14:hiddenLine xmlns:a14="http://schemas.microsoft.com/office/drawing/2010/main" xmlns="" w="9525">
+                <a14:hiddenLine xmlns="" xmlns:a14="http://schemas.microsoft.com/office/drawing/2010/main" w="9525">
                   <a:solidFill>
                     <a:srgbClr val="000000"/>
                   </a:solidFill>
@@ -407,7 +412,7 @@
             </a:ln>
             <a:extLst>
               <a:ext uri="{91240B29-F687-4f45-9708-019B960494DF}">
-                <a14:hiddenLine xmlns:a14="http://schemas.microsoft.com/office/drawing/2010/main" xmlns="" w="9525">
+                <a14:hiddenLine xmlns="" xmlns:a14="http://schemas.microsoft.com/office/drawing/2010/main" w="9525">
                   <a:solidFill>
                     <a:srgbClr val="000000"/>
                   </a:solidFill>
@@ -441,7 +446,7 @@
             </a:ln>
             <a:extLst>
               <a:ext uri="{91240B29-F687-4f45-9708-019B960494DF}">
-                <a14:hiddenLine xmlns:a14="http://schemas.microsoft.com/office/drawing/2010/main" xmlns="" w="9525">
+                <a14:hiddenLine xmlns="" xmlns:a14="http://schemas.microsoft.com/office/drawing/2010/main" w="9525">
                   <a:solidFill>
                     <a:srgbClr val="000000"/>
                   </a:solidFill>
@@ -531,7 +536,7 @@
             </a:ln>
             <a:extLst>
               <a:ext uri="{91240B29-F687-4f45-9708-019B960494DF}">
-                <a14:hiddenLine xmlns:a14="http://schemas.microsoft.com/office/drawing/2010/main" xmlns="" w="9525">
+                <a14:hiddenLine xmlns="" xmlns:a14="http://schemas.microsoft.com/office/drawing/2010/main" w="9525">
                   <a:solidFill>
                     <a:srgbClr val="000000"/>
                   </a:solidFill>
@@ -593,7 +598,7 @@
             </a:ln>
             <a:extLst>
               <a:ext uri="{91240B29-F687-4f45-9708-019B960494DF}">
-                <a14:hiddenLine xmlns:a14="http://schemas.microsoft.com/office/drawing/2010/main" xmlns="" w="9525">
+                <a14:hiddenLine xmlns="" xmlns:a14="http://schemas.microsoft.com/office/drawing/2010/main" w="9525">
                   <a:solidFill>
                     <a:srgbClr val="000000"/>
                   </a:solidFill>
@@ -655,7 +660,7 @@
             </a:ln>
             <a:extLst>
               <a:ext uri="{91240B29-F687-4f45-9708-019B960494DF}">
-                <a14:hiddenLine xmlns:a14="http://schemas.microsoft.com/office/drawing/2010/main" xmlns="" w="9525">
+                <a14:hiddenLine xmlns="" xmlns:a14="http://schemas.microsoft.com/office/drawing/2010/main" w="9525">
                   <a:solidFill>
                     <a:srgbClr val="000000"/>
                   </a:solidFill>
@@ -745,7 +750,7 @@
             </a:ln>
             <a:extLst>
               <a:ext uri="{91240B29-F687-4f45-9708-019B960494DF}">
-                <a14:hiddenLine xmlns:a14="http://schemas.microsoft.com/office/drawing/2010/main" xmlns="" w="9525">
+                <a14:hiddenLine xmlns="" xmlns:a14="http://schemas.microsoft.com/office/drawing/2010/main" w="9525">
                   <a:solidFill>
                     <a:srgbClr val="000000"/>
                   </a:solidFill>
@@ -807,7 +812,7 @@
             </a:ln>
             <a:extLst>
               <a:ext uri="{91240B29-F687-4f45-9708-019B960494DF}">
-                <a14:hiddenLine xmlns:a14="http://schemas.microsoft.com/office/drawing/2010/main" xmlns="" w="9525">
+                <a14:hiddenLine xmlns="" xmlns:a14="http://schemas.microsoft.com/office/drawing/2010/main" w="9525">
                   <a:solidFill>
                     <a:srgbClr val="000000"/>
                   </a:solidFill>
@@ -869,7 +874,7 @@
             </a:ln>
             <a:extLst>
               <a:ext uri="{91240B29-F687-4f45-9708-019B960494DF}">
-                <a14:hiddenLine xmlns:a14="http://schemas.microsoft.com/office/drawing/2010/main" xmlns="" w="9525">
+                <a14:hiddenLine xmlns="" xmlns:a14="http://schemas.microsoft.com/office/drawing/2010/main" w="9525">
                   <a:solidFill>
                     <a:srgbClr val="000000"/>
                   </a:solidFill>
@@ -959,7 +964,7 @@
             </a:ln>
             <a:extLst>
               <a:ext uri="{91240B29-F687-4f45-9708-019B960494DF}">
-                <a14:hiddenLine xmlns:a14="http://schemas.microsoft.com/office/drawing/2010/main" xmlns="" w="9525">
+                <a14:hiddenLine xmlns="" xmlns:a14="http://schemas.microsoft.com/office/drawing/2010/main" w="9525">
                   <a:solidFill>
                     <a:srgbClr val="000000"/>
                   </a:solidFill>
@@ -1049,7 +1054,7 @@
             </a:ln>
             <a:extLst>
               <a:ext uri="{91240B29-F687-4f45-9708-019B960494DF}">
-                <a14:hiddenLine xmlns:a14="http://schemas.microsoft.com/office/drawing/2010/main" xmlns="" w="9525">
+                <a14:hiddenLine xmlns="" xmlns:a14="http://schemas.microsoft.com/office/drawing/2010/main" w="9525">
                   <a:solidFill>
                     <a:srgbClr val="000000"/>
                   </a:solidFill>
@@ -1111,7 +1116,7 @@
             </a:ln>
             <a:extLst>
               <a:ext uri="{91240B29-F687-4f45-9708-019B960494DF}">
-                <a14:hiddenLine xmlns:a14="http://schemas.microsoft.com/office/drawing/2010/main" xmlns="" w="9525">
+                <a14:hiddenLine xmlns="" xmlns:a14="http://schemas.microsoft.com/office/drawing/2010/main" w="9525">
                   <a:solidFill>
                     <a:srgbClr val="000000"/>
                   </a:solidFill>
@@ -1221,7 +1226,7 @@
             </a:ln>
             <a:extLst>
               <a:ext uri="{91240B29-F687-4f45-9708-019B960494DF}">
-                <a14:hiddenLine xmlns:a14="http://schemas.microsoft.com/office/drawing/2010/main" xmlns="" w="9525">
+                <a14:hiddenLine xmlns="" xmlns:a14="http://schemas.microsoft.com/office/drawing/2010/main" w="9525">
                   <a:solidFill>
                     <a:srgbClr val="000000"/>
                   </a:solidFill>
@@ -1283,7 +1288,7 @@
             </a:ln>
             <a:extLst>
               <a:ext uri="{91240B29-F687-4f45-9708-019B960494DF}">
-                <a14:hiddenLine xmlns:a14="http://schemas.microsoft.com/office/drawing/2010/main" xmlns="" w="9525">
+                <a14:hiddenLine xmlns="" xmlns:a14="http://schemas.microsoft.com/office/drawing/2010/main" w="9525">
                   <a:solidFill>
                     <a:srgbClr val="000000"/>
                   </a:solidFill>
@@ -1373,7 +1378,7 @@
             </a:ln>
             <a:extLst>
               <a:ext uri="{91240B29-F687-4f45-9708-019B960494DF}">
-                <a14:hiddenLine xmlns:a14="http://schemas.microsoft.com/office/drawing/2010/main" xmlns="" w="9525">
+                <a14:hiddenLine xmlns="" xmlns:a14="http://schemas.microsoft.com/office/drawing/2010/main" w="9525">
                   <a:solidFill>
                     <a:srgbClr val="000000"/>
                   </a:solidFill>
@@ -1463,7 +1468,7 @@
             </a:ln>
             <a:extLst>
               <a:ext uri="{91240B29-F687-4f45-9708-019B960494DF}">
-                <a14:hiddenLine xmlns:a14="http://schemas.microsoft.com/office/drawing/2010/main" xmlns="" w="9525">
+                <a14:hiddenLine xmlns="" xmlns:a14="http://schemas.microsoft.com/office/drawing/2010/main" w="9525">
                   <a:solidFill>
                     <a:srgbClr val="000000"/>
                   </a:solidFill>
@@ -1525,7 +1530,7 @@
             </a:ln>
             <a:extLst>
               <a:ext uri="{91240B29-F687-4f45-9708-019B960494DF}">
-                <a14:hiddenLine xmlns:a14="http://schemas.microsoft.com/office/drawing/2010/main" xmlns="" w="9525">
+                <a14:hiddenLine xmlns="" xmlns:a14="http://schemas.microsoft.com/office/drawing/2010/main" w="9525">
                   <a:solidFill>
                     <a:srgbClr val="000000"/>
                   </a:solidFill>
@@ -1615,7 +1620,7 @@
             </a:ln>
             <a:extLst>
               <a:ext uri="{91240B29-F687-4f45-9708-019B960494DF}">
-                <a14:hiddenLine xmlns:a14="http://schemas.microsoft.com/office/drawing/2010/main" xmlns="" w="9525">
+                <a14:hiddenLine xmlns="" xmlns:a14="http://schemas.microsoft.com/office/drawing/2010/main" w="9525">
                   <a:solidFill>
                     <a:srgbClr val="000000"/>
                   </a:solidFill>
@@ -1705,7 +1710,7 @@
             </a:ln>
             <a:extLst>
               <a:ext uri="{91240B29-F687-4f45-9708-019B960494DF}">
-                <a14:hiddenLine xmlns:a14="http://schemas.microsoft.com/office/drawing/2010/main" xmlns="" w="9525">
+                <a14:hiddenLine xmlns="" xmlns:a14="http://schemas.microsoft.com/office/drawing/2010/main" w="9525">
                   <a:solidFill>
                     <a:srgbClr val="000000"/>
                   </a:solidFill>
@@ -1761,7 +1766,7 @@
             </a:ln>
             <a:extLst>
               <a:ext uri="{91240B29-F687-4f45-9708-019B960494DF}">
-                <a14:hiddenLine xmlns:a14="http://schemas.microsoft.com/office/drawing/2010/main" xmlns="" w="9525">
+                <a14:hiddenLine xmlns="" xmlns:a14="http://schemas.microsoft.com/office/drawing/2010/main" w="9525">
                   <a:solidFill>
                     <a:srgbClr val="000000"/>
                   </a:solidFill>
@@ -1851,7 +1856,7 @@
             </a:ln>
             <a:extLst>
               <a:ext uri="{91240B29-F687-4f45-9708-019B960494DF}">
-                <a14:hiddenLine xmlns:a14="http://schemas.microsoft.com/office/drawing/2010/main" xmlns="" w="9525">
+                <a14:hiddenLine xmlns="" xmlns:a14="http://schemas.microsoft.com/office/drawing/2010/main" w="9525">
                   <a:solidFill>
                     <a:srgbClr val="000000"/>
                   </a:solidFill>
@@ -1907,7 +1912,7 @@
             </a:ln>
             <a:extLst>
               <a:ext uri="{91240B29-F687-4f45-9708-019B960494DF}">
-                <a14:hiddenLine xmlns:a14="http://schemas.microsoft.com/office/drawing/2010/main" xmlns="" w="9525">
+                <a14:hiddenLine xmlns="" xmlns:a14="http://schemas.microsoft.com/office/drawing/2010/main" w="9525">
                   <a:solidFill>
                     <a:srgbClr val="000000"/>
                   </a:solidFill>
@@ -1997,7 +2002,7 @@
             </a:ln>
             <a:extLst>
               <a:ext uri="{91240B29-F687-4f45-9708-019B960494DF}">
-                <a14:hiddenLine xmlns:a14="http://schemas.microsoft.com/office/drawing/2010/main" xmlns="" w="9525">
+                <a14:hiddenLine xmlns="" xmlns:a14="http://schemas.microsoft.com/office/drawing/2010/main" w="9525">
                   <a:solidFill>
                     <a:srgbClr val="000000"/>
                   </a:solidFill>
@@ -2065,7 +2070,7 @@
             </a:ln>
             <a:extLst>
               <a:ext uri="{91240B29-F687-4f45-9708-019B960494DF}">
-                <a14:hiddenLine xmlns:a14="http://schemas.microsoft.com/office/drawing/2010/main" xmlns="" w="9525">
+                <a14:hiddenLine xmlns="" xmlns:a14="http://schemas.microsoft.com/office/drawing/2010/main" w="9525">
                   <a:solidFill>
                     <a:srgbClr val="000000"/>
                   </a:solidFill>
@@ -2155,7 +2160,7 @@
             </a:ln>
             <a:extLst>
               <a:ext uri="{91240B29-F687-4f45-9708-019B960494DF}">
-                <a14:hiddenLine xmlns:a14="http://schemas.microsoft.com/office/drawing/2010/main" xmlns="" w="9525">
+                <a14:hiddenLine xmlns="" xmlns:a14="http://schemas.microsoft.com/office/drawing/2010/main" w="9525">
                   <a:solidFill>
                     <a:srgbClr val="000000"/>
                   </a:solidFill>
@@ -2223,7 +2228,7 @@
             </a:ln>
             <a:extLst>
               <a:ext uri="{91240B29-F687-4f45-9708-019B960494DF}">
-                <a14:hiddenLine xmlns:a14="http://schemas.microsoft.com/office/drawing/2010/main" xmlns="" w="9525">
+                <a14:hiddenLine xmlns="" xmlns:a14="http://schemas.microsoft.com/office/drawing/2010/main" w="9525">
                   <a:solidFill>
                     <a:srgbClr val="000000"/>
                   </a:solidFill>
@@ -2313,7 +2318,7 @@
             </a:ln>
             <a:extLst>
               <a:ext uri="{91240B29-F687-4f45-9708-019B960494DF}">
-                <a14:hiddenLine xmlns:a14="http://schemas.microsoft.com/office/drawing/2010/main" xmlns="" w="9525">
+                <a14:hiddenLine xmlns="" xmlns:a14="http://schemas.microsoft.com/office/drawing/2010/main" w="9525">
                   <a:solidFill>
                     <a:srgbClr val="000000"/>
                   </a:solidFill>
@@ -2347,7 +2352,7 @@
             </a:ln>
             <a:extLst>
               <a:ext uri="{91240B29-F687-4f45-9708-019B960494DF}">
-                <a14:hiddenLine xmlns:a14="http://schemas.microsoft.com/office/drawing/2010/main" xmlns="" w="9525">
+                <a14:hiddenLine xmlns="" xmlns:a14="http://schemas.microsoft.com/office/drawing/2010/main" w="9525">
                   <a:solidFill>
                     <a:srgbClr val="000000"/>
                   </a:solidFill>
@@ -2437,7 +2442,7 @@
             </a:ln>
             <a:extLst>
               <a:ext uri="{91240B29-F687-4f45-9708-019B960494DF}">
-                <a14:hiddenLine xmlns:a14="http://schemas.microsoft.com/office/drawing/2010/main" xmlns="" w="9525">
+                <a14:hiddenLine xmlns="" xmlns:a14="http://schemas.microsoft.com/office/drawing/2010/main" w="9525">
                   <a:solidFill>
                     <a:srgbClr val="000000"/>
                   </a:solidFill>
@@ -2499,7 +2504,7 @@
             </a:ln>
             <a:extLst>
               <a:ext uri="{91240B29-F687-4f45-9708-019B960494DF}">
-                <a14:hiddenLine xmlns:a14="http://schemas.microsoft.com/office/drawing/2010/main" xmlns="" w="9525">
+                <a14:hiddenLine xmlns="" xmlns:a14="http://schemas.microsoft.com/office/drawing/2010/main" w="9525">
                   <a:solidFill>
                     <a:srgbClr val="000000"/>
                   </a:solidFill>
@@ -2561,7 +2566,7 @@
             </a:ln>
             <a:extLst>
               <a:ext uri="{91240B29-F687-4f45-9708-019B960494DF}">
-                <a14:hiddenLine xmlns:a14="http://schemas.microsoft.com/office/drawing/2010/main" xmlns="" w="9525">
+                <a14:hiddenLine xmlns="" xmlns:a14="http://schemas.microsoft.com/office/drawing/2010/main" w="9525">
                   <a:solidFill>
                     <a:srgbClr val="000000"/>
                   </a:solidFill>
@@ -2651,7 +2656,7 @@
             </a:ln>
             <a:extLst>
               <a:ext uri="{91240B29-F687-4f45-9708-019B960494DF}">
-                <a14:hiddenLine xmlns:a14="http://schemas.microsoft.com/office/drawing/2010/main" xmlns="" w="9525">
+                <a14:hiddenLine xmlns="" xmlns:a14="http://schemas.microsoft.com/office/drawing/2010/main" w="9525">
                   <a:solidFill>
                     <a:srgbClr val="000000"/>
                   </a:solidFill>
@@ -2719,7 +2724,7 @@
             </a:ln>
             <a:extLst>
               <a:ext uri="{91240B29-F687-4f45-9708-019B960494DF}">
-                <a14:hiddenLine xmlns:a14="http://schemas.microsoft.com/office/drawing/2010/main" xmlns="" w="9525">
+                <a14:hiddenLine xmlns="" xmlns:a14="http://schemas.microsoft.com/office/drawing/2010/main" w="9525">
                   <a:solidFill>
                     <a:srgbClr val="000000"/>
                   </a:solidFill>
@@ -2781,7 +2786,7 @@
             </a:ln>
             <a:extLst>
               <a:ext uri="{91240B29-F687-4f45-9708-019B960494DF}">
-                <a14:hiddenLine xmlns:a14="http://schemas.microsoft.com/office/drawing/2010/main" xmlns="" w="9525">
+                <a14:hiddenLine xmlns="" xmlns:a14="http://schemas.microsoft.com/office/drawing/2010/main" w="9525">
                   <a:solidFill>
                     <a:srgbClr val="000000"/>
                   </a:solidFill>
@@ -2871,7 +2876,7 @@
             </a:ln>
             <a:extLst>
               <a:ext uri="{91240B29-F687-4f45-9708-019B960494DF}">
-                <a14:hiddenLine xmlns:a14="http://schemas.microsoft.com/office/drawing/2010/main" xmlns="" w="9525">
+                <a14:hiddenLine xmlns="" xmlns:a14="http://schemas.microsoft.com/office/drawing/2010/main" w="9525">
                   <a:solidFill>
                     <a:srgbClr val="000000"/>
                   </a:solidFill>
@@ -2933,7 +2938,7 @@
             </a:ln>
             <a:extLst>
               <a:ext uri="{91240B29-F687-4f45-9708-019B960494DF}">
-                <a14:hiddenLine xmlns:a14="http://schemas.microsoft.com/office/drawing/2010/main" xmlns="" w="9525">
+                <a14:hiddenLine xmlns="" xmlns:a14="http://schemas.microsoft.com/office/drawing/2010/main" w="9525">
                   <a:solidFill>
                     <a:srgbClr val="000000"/>
                   </a:solidFill>
@@ -3023,7 +3028,7 @@
             </a:ln>
             <a:extLst>
               <a:ext uri="{91240B29-F687-4f45-9708-019B960494DF}">
-                <a14:hiddenLine xmlns:a14="http://schemas.microsoft.com/office/drawing/2010/main" xmlns="" w="9525">
+                <a14:hiddenLine xmlns="" xmlns:a14="http://schemas.microsoft.com/office/drawing/2010/main" w="9525">
                   <a:solidFill>
                     <a:srgbClr val="000000"/>
                   </a:solidFill>
@@ -3085,7 +3090,7 @@
             </a:ln>
             <a:extLst>
               <a:ext uri="{91240B29-F687-4f45-9708-019B960494DF}">
-                <a14:hiddenLine xmlns:a14="http://schemas.microsoft.com/office/drawing/2010/main" xmlns="" w="9525">
+                <a14:hiddenLine xmlns="" xmlns:a14="http://schemas.microsoft.com/office/drawing/2010/main" w="9525">
                   <a:solidFill>
                     <a:srgbClr val="000000"/>
                   </a:solidFill>
@@ -3175,7 +3180,7 @@
             </a:ln>
             <a:extLst>
               <a:ext uri="{91240B29-F687-4f45-9708-019B960494DF}">
-                <a14:hiddenLine xmlns:a14="http://schemas.microsoft.com/office/drawing/2010/main" xmlns="" w="9525">
+                <a14:hiddenLine xmlns="" xmlns:a14="http://schemas.microsoft.com/office/drawing/2010/main" w="9525">
                   <a:solidFill>
                     <a:srgbClr val="000000"/>
                   </a:solidFill>
@@ -3209,7 +3214,7 @@
             </a:ln>
             <a:extLst>
               <a:ext uri="{91240B29-F687-4f45-9708-019B960494DF}">
-                <a14:hiddenLine xmlns:a14="http://schemas.microsoft.com/office/drawing/2010/main" xmlns="" w="9525">
+                <a14:hiddenLine xmlns="" xmlns:a14="http://schemas.microsoft.com/office/drawing/2010/main" w="9525">
                   <a:solidFill>
                     <a:srgbClr val="000000"/>
                   </a:solidFill>
@@ -3274,7 +3279,7 @@
             </a:ln>
             <a:extLst>
               <a:ext uri="{91240B29-F687-4f45-9708-019B960494DF}">
-                <a14:hiddenLine xmlns:a14="http://schemas.microsoft.com/office/drawing/2010/main" xmlns="" w="9525">
+                <a14:hiddenLine xmlns="" xmlns:a14="http://schemas.microsoft.com/office/drawing/2010/main" w="9525">
                   <a:solidFill>
                     <a:srgbClr val="000000"/>
                   </a:solidFill>
@@ -3364,7 +3369,7 @@
             </a:ln>
             <a:extLst>
               <a:ext uri="{91240B29-F687-4f45-9708-019B960494DF}">
-                <a14:hiddenLine xmlns:a14="http://schemas.microsoft.com/office/drawing/2010/main" xmlns="" w="9525">
+                <a14:hiddenLine xmlns="" xmlns:a14="http://schemas.microsoft.com/office/drawing/2010/main" w="9525">
                   <a:solidFill>
                     <a:srgbClr val="000000"/>
                   </a:solidFill>
@@ -3426,7 +3431,7 @@
             </a:ln>
             <a:extLst>
               <a:ext uri="{91240B29-F687-4f45-9708-019B960494DF}">
-                <a14:hiddenLine xmlns:a14="http://schemas.microsoft.com/office/drawing/2010/main" xmlns="" w="9525">
+                <a14:hiddenLine xmlns="" xmlns:a14="http://schemas.microsoft.com/office/drawing/2010/main" w="9525">
                   <a:solidFill>
                     <a:srgbClr val="000000"/>
                   </a:solidFill>
@@ -3516,7 +3521,7 @@
             </a:ln>
             <a:extLst>
               <a:ext uri="{91240B29-F687-4f45-9708-019B960494DF}">
-                <a14:hiddenLine xmlns:a14="http://schemas.microsoft.com/office/drawing/2010/main" xmlns="" w="9525">
+                <a14:hiddenLine xmlns="" xmlns:a14="http://schemas.microsoft.com/office/drawing/2010/main" w="9525">
                   <a:solidFill>
                     <a:srgbClr val="000000"/>
                   </a:solidFill>
@@ -3606,7 +3611,7 @@
             </a:ln>
             <a:extLst>
               <a:ext uri="{91240B29-F687-4f45-9708-019B960494DF}">
-                <a14:hiddenLine xmlns:a14="http://schemas.microsoft.com/office/drawing/2010/main" xmlns="" w="9525">
+                <a14:hiddenLine xmlns="" xmlns:a14="http://schemas.microsoft.com/office/drawing/2010/main" w="9525">
                   <a:solidFill>
                     <a:srgbClr val="000000"/>
                   </a:solidFill>
@@ -3671,7 +3676,7 @@
             </a:ln>
             <a:extLst>
               <a:ext uri="{91240B29-F687-4f45-9708-019B960494DF}">
-                <a14:hiddenLine xmlns:a14="http://schemas.microsoft.com/office/drawing/2010/main" xmlns="" w="9525">
+                <a14:hiddenLine xmlns="" xmlns:a14="http://schemas.microsoft.com/office/drawing/2010/main" w="9525">
                   <a:solidFill>
                     <a:srgbClr val="000000"/>
                   </a:solidFill>
@@ -3733,7 +3738,7 @@
             </a:ln>
             <a:extLst>
               <a:ext uri="{91240B29-F687-4f45-9708-019B960494DF}">
-                <a14:hiddenLine xmlns:a14="http://schemas.microsoft.com/office/drawing/2010/main" xmlns="" w="9525">
+                <a14:hiddenLine xmlns="" xmlns:a14="http://schemas.microsoft.com/office/drawing/2010/main" w="9525">
                   <a:solidFill>
                     <a:srgbClr val="000000"/>
                   </a:solidFill>
@@ -3823,7 +3828,7 @@
             </a:ln>
             <a:extLst>
               <a:ext uri="{91240B29-F687-4f45-9708-019B960494DF}">
-                <a14:hiddenLine xmlns:a14="http://schemas.microsoft.com/office/drawing/2010/main" xmlns="" w="9525">
+                <a14:hiddenLine xmlns="" xmlns:a14="http://schemas.microsoft.com/office/drawing/2010/main" w="9525">
                   <a:solidFill>
                     <a:srgbClr val="000000"/>
                   </a:solidFill>
@@ -3913,7 +3918,7 @@
             </a:ln>
             <a:extLst>
               <a:ext uri="{91240B29-F687-4f45-9708-019B960494DF}">
-                <a14:hiddenLine xmlns:a14="http://schemas.microsoft.com/office/drawing/2010/main" xmlns="" w="9525">
+                <a14:hiddenLine xmlns="" xmlns:a14="http://schemas.microsoft.com/office/drawing/2010/main" w="9525">
                   <a:solidFill>
                     <a:srgbClr val="000000"/>
                   </a:solidFill>
@@ -3975,7 +3980,7 @@
             </a:ln>
             <a:extLst>
               <a:ext uri="{91240B29-F687-4f45-9708-019B960494DF}">
-                <a14:hiddenLine xmlns:a14="http://schemas.microsoft.com/office/drawing/2010/main" xmlns="" w="9525">
+                <a14:hiddenLine xmlns="" xmlns:a14="http://schemas.microsoft.com/office/drawing/2010/main" w="9525">
                   <a:solidFill>
                     <a:srgbClr val="000000"/>
                   </a:solidFill>
@@ -4095,7 +4100,7 @@
             </a:ln>
             <a:extLst>
               <a:ext uri="{91240B29-F687-4f45-9708-019B960494DF}">
-                <a14:hiddenLine xmlns:a14="http://schemas.microsoft.com/office/drawing/2010/main" xmlns="" w="9525">
+                <a14:hiddenLine xmlns="" xmlns:a14="http://schemas.microsoft.com/office/drawing/2010/main" w="9525">
                   <a:solidFill>
                     <a:srgbClr val="000000"/>
                   </a:solidFill>
@@ -4163,7 +4168,7 @@
             </a:ln>
             <a:extLst>
               <a:ext uri="{91240B29-F687-4f45-9708-019B960494DF}">
-                <a14:hiddenLine xmlns:a14="http://schemas.microsoft.com/office/drawing/2010/main" xmlns="" w="9525">
+                <a14:hiddenLine xmlns="" xmlns:a14="http://schemas.microsoft.com/office/drawing/2010/main" w="9525">
                   <a:solidFill>
                     <a:srgbClr val="000000"/>
                   </a:solidFill>
@@ -4253,7 +4258,7 @@
             </a:ln>
             <a:extLst>
               <a:ext uri="{91240B29-F687-4f45-9708-019B960494DF}">
-                <a14:hiddenLine xmlns:a14="http://schemas.microsoft.com/office/drawing/2010/main" xmlns="" w="9525">
+                <a14:hiddenLine xmlns="" xmlns:a14="http://schemas.microsoft.com/office/drawing/2010/main" w="9525">
                   <a:solidFill>
                     <a:srgbClr val="000000"/>
                   </a:solidFill>
@@ -8975,7 +8980,7 @@
           <a:noFill/>
           <a:extLst>
             <a:ext uri="{909E8E84-426E-40dd-AFC4-6F175D3DCCD1}">
-              <a14:hiddenFill xmlns:a14="http://schemas.microsoft.com/office/drawing/2010/main" xmlns="">
+              <a14:hiddenFill xmlns="" xmlns:a14="http://schemas.microsoft.com/office/drawing/2010/main">
                 <a:solidFill>
                   <a:srgbClr val="FFFFFF"/>
                 </a:solidFill>
@@ -9049,7 +9054,7 @@
               </a:ln>
               <a:extLst>
                 <a:ext uri="{91240B29-F687-4f45-9708-019B960494DF}">
-                  <a14:hiddenLine xmlns:a14="http://schemas.microsoft.com/office/drawing/2010/main" xmlns="" w="9525">
+                  <a14:hiddenLine xmlns="" xmlns:a14="http://schemas.microsoft.com/office/drawing/2010/main" w="9525">
                     <a:solidFill>
                       <a:srgbClr val="000000"/>
                     </a:solidFill>
@@ -9139,7 +9144,7 @@
               </a:ln>
               <a:extLst>
                 <a:ext uri="{91240B29-F687-4f45-9708-019B960494DF}">
-                  <a14:hiddenLine xmlns:a14="http://schemas.microsoft.com/office/drawing/2010/main" xmlns="" w="9525">
+                  <a14:hiddenLine xmlns="" xmlns:a14="http://schemas.microsoft.com/office/drawing/2010/main" w="9525">
                     <a:solidFill>
                       <a:srgbClr val="000000"/>
                     </a:solidFill>
@@ -9229,7 +9234,7 @@
               </a:ln>
               <a:extLst>
                 <a:ext uri="{91240B29-F687-4f45-9708-019B960494DF}">
-                  <a14:hiddenLine xmlns:a14="http://schemas.microsoft.com/office/drawing/2010/main" xmlns="" w="9525">
+                  <a14:hiddenLine xmlns="" xmlns:a14="http://schemas.microsoft.com/office/drawing/2010/main" w="9525">
                     <a:solidFill>
                       <a:srgbClr val="000000"/>
                     </a:solidFill>
@@ -9291,7 +9296,7 @@
               </a:ln>
               <a:extLst>
                 <a:ext uri="{91240B29-F687-4f45-9708-019B960494DF}">
-                  <a14:hiddenLine xmlns:a14="http://schemas.microsoft.com/office/drawing/2010/main" xmlns="" w="9525">
+                  <a14:hiddenLine xmlns="" xmlns:a14="http://schemas.microsoft.com/office/drawing/2010/main" w="9525">
                     <a:solidFill>
                       <a:srgbClr val="000000"/>
                     </a:solidFill>
@@ -9381,7 +9386,7 @@
               </a:ln>
               <a:extLst>
                 <a:ext uri="{91240B29-F687-4f45-9708-019B960494DF}">
-                  <a14:hiddenLine xmlns:a14="http://schemas.microsoft.com/office/drawing/2010/main" xmlns="" w="9525">
+                  <a14:hiddenLine xmlns="" xmlns:a14="http://schemas.microsoft.com/office/drawing/2010/main" w="9525">
                     <a:solidFill>
                       <a:srgbClr val="000000"/>
                     </a:solidFill>
@@ -9443,7 +9448,7 @@
               </a:ln>
               <a:extLst>
                 <a:ext uri="{91240B29-F687-4f45-9708-019B960494DF}">
-                  <a14:hiddenLine xmlns:a14="http://schemas.microsoft.com/office/drawing/2010/main" xmlns="" w="9525">
+                  <a14:hiddenLine xmlns="" xmlns:a14="http://schemas.microsoft.com/office/drawing/2010/main" w="9525">
                     <a:solidFill>
                       <a:srgbClr val="000000"/>
                     </a:solidFill>
@@ -9505,7 +9510,7 @@
               </a:ln>
               <a:extLst>
                 <a:ext uri="{91240B29-F687-4f45-9708-019B960494DF}">
-                  <a14:hiddenLine xmlns:a14="http://schemas.microsoft.com/office/drawing/2010/main" xmlns="" w="9525">
+                  <a14:hiddenLine xmlns="" xmlns:a14="http://schemas.microsoft.com/office/drawing/2010/main" w="9525">
                     <a:solidFill>
                       <a:srgbClr val="000000"/>
                     </a:solidFill>
@@ -9595,7 +9600,7 @@
               </a:ln>
               <a:extLst>
                 <a:ext uri="{91240B29-F687-4f45-9708-019B960494DF}">
-                  <a14:hiddenLine xmlns:a14="http://schemas.microsoft.com/office/drawing/2010/main" xmlns="" w="9525">
+                  <a14:hiddenLine xmlns="" xmlns:a14="http://schemas.microsoft.com/office/drawing/2010/main" w="9525">
                     <a:solidFill>
                       <a:srgbClr val="000000"/>
                     </a:solidFill>
@@ -9685,7 +9690,7 @@
               </a:ln>
               <a:extLst>
                 <a:ext uri="{91240B29-F687-4f45-9708-019B960494DF}">
-                  <a14:hiddenLine xmlns:a14="http://schemas.microsoft.com/office/drawing/2010/main" xmlns="" w="9525">
+                  <a14:hiddenLine xmlns="" xmlns:a14="http://schemas.microsoft.com/office/drawing/2010/main" w="9525">
                     <a:solidFill>
                       <a:srgbClr val="000000"/>
                     </a:solidFill>
@@ -9747,7 +9752,7 @@
               </a:ln>
               <a:extLst>
                 <a:ext uri="{91240B29-F687-4f45-9708-019B960494DF}">
-                  <a14:hiddenLine xmlns:a14="http://schemas.microsoft.com/office/drawing/2010/main" xmlns="" w="9525">
+                  <a14:hiddenLine xmlns="" xmlns:a14="http://schemas.microsoft.com/office/drawing/2010/main" w="9525">
                     <a:solidFill>
                       <a:srgbClr val="000000"/>
                     </a:solidFill>
@@ -9857,7 +9862,7 @@
               </a:ln>
               <a:extLst>
                 <a:ext uri="{91240B29-F687-4f45-9708-019B960494DF}">
-                  <a14:hiddenLine xmlns:a14="http://schemas.microsoft.com/office/drawing/2010/main" xmlns="" w="9525">
+                  <a14:hiddenLine xmlns="" xmlns:a14="http://schemas.microsoft.com/office/drawing/2010/main" w="9525">
                     <a:solidFill>
                       <a:srgbClr val="000000"/>
                     </a:solidFill>
@@ -9941,7 +9946,7 @@
               </a:ln>
               <a:extLst>
                 <a:ext uri="{91240B29-F687-4f45-9708-019B960494DF}">
-                  <a14:hiddenLine xmlns:a14="http://schemas.microsoft.com/office/drawing/2010/main" xmlns="" w="9525">
+                  <a14:hiddenLine xmlns="" xmlns:a14="http://schemas.microsoft.com/office/drawing/2010/main" w="9525">
                     <a:solidFill>
                       <a:srgbClr val="000000"/>
                     </a:solidFill>
@@ -10003,7 +10008,7 @@
               </a:ln>
               <a:extLst>
                 <a:ext uri="{91240B29-F687-4f45-9708-019B960494DF}">
-                  <a14:hiddenLine xmlns:a14="http://schemas.microsoft.com/office/drawing/2010/main" xmlns="" w="9525">
+                  <a14:hiddenLine xmlns="" xmlns:a14="http://schemas.microsoft.com/office/drawing/2010/main" w="9525">
                     <a:solidFill>
                       <a:srgbClr val="000000"/>
                     </a:solidFill>
@@ -10065,7 +10070,7 @@
               </a:ln>
               <a:extLst>
                 <a:ext uri="{91240B29-F687-4f45-9708-019B960494DF}">
-                  <a14:hiddenLine xmlns:a14="http://schemas.microsoft.com/office/drawing/2010/main" xmlns="" w="9525">
+                  <a14:hiddenLine xmlns="" xmlns:a14="http://schemas.microsoft.com/office/drawing/2010/main" w="9525">
                     <a:solidFill>
                       <a:srgbClr val="000000"/>
                     </a:solidFill>
@@ -10155,7 +10160,7 @@
               </a:ln>
               <a:extLst>
                 <a:ext uri="{91240B29-F687-4f45-9708-019B960494DF}">
-                  <a14:hiddenLine xmlns:a14="http://schemas.microsoft.com/office/drawing/2010/main" xmlns="" w="9525">
+                  <a14:hiddenLine xmlns="" xmlns:a14="http://schemas.microsoft.com/office/drawing/2010/main" w="9525">
                     <a:solidFill>
                       <a:srgbClr val="000000"/>
                     </a:solidFill>
@@ -10189,7 +10194,7 @@
               </a:ln>
               <a:extLst>
                 <a:ext uri="{91240B29-F687-4f45-9708-019B960494DF}">
-                  <a14:hiddenLine xmlns:a14="http://schemas.microsoft.com/office/drawing/2010/main" xmlns="" w="9525">
+                  <a14:hiddenLine xmlns="" xmlns:a14="http://schemas.microsoft.com/office/drawing/2010/main" w="9525">
                     <a:solidFill>
                       <a:srgbClr val="000000"/>
                     </a:solidFill>
@@ -10254,7 +10259,7 @@
               </a:ln>
               <a:extLst>
                 <a:ext uri="{91240B29-F687-4f45-9708-019B960494DF}">
-                  <a14:hiddenLine xmlns:a14="http://schemas.microsoft.com/office/drawing/2010/main" xmlns="" w="9525">
+                  <a14:hiddenLine xmlns="" xmlns:a14="http://schemas.microsoft.com/office/drawing/2010/main" w="9525">
                     <a:solidFill>
                       <a:srgbClr val="000000"/>
                     </a:solidFill>
@@ -10344,7 +10349,7 @@
               </a:ln>
               <a:extLst>
                 <a:ext uri="{91240B29-F687-4f45-9708-019B960494DF}">
-                  <a14:hiddenLine xmlns:a14="http://schemas.microsoft.com/office/drawing/2010/main" xmlns="" w="9525">
+                  <a14:hiddenLine xmlns="" xmlns:a14="http://schemas.microsoft.com/office/drawing/2010/main" w="9525">
                     <a:solidFill>
                       <a:srgbClr val="000000"/>
                     </a:solidFill>
@@ -10406,7 +10411,7 @@
               </a:ln>
               <a:extLst>
                 <a:ext uri="{91240B29-F687-4f45-9708-019B960494DF}">
-                  <a14:hiddenLine xmlns:a14="http://schemas.microsoft.com/office/drawing/2010/main" xmlns="" w="9525">
+                  <a14:hiddenLine xmlns="" xmlns:a14="http://schemas.microsoft.com/office/drawing/2010/main" w="9525">
                     <a:solidFill>
                       <a:srgbClr val="000000"/>
                     </a:solidFill>
@@ -10496,7 +10501,7 @@
               </a:ln>
               <a:extLst>
                 <a:ext uri="{91240B29-F687-4f45-9708-019B960494DF}">
-                  <a14:hiddenLine xmlns:a14="http://schemas.microsoft.com/office/drawing/2010/main" xmlns="" w="9525">
+                  <a14:hiddenLine xmlns="" xmlns:a14="http://schemas.microsoft.com/office/drawing/2010/main" w="9525">
                     <a:solidFill>
                       <a:srgbClr val="000000"/>
                     </a:solidFill>
@@ -10561,7 +10566,7 @@
               </a:ln>
               <a:extLst>
                 <a:ext uri="{91240B29-F687-4f45-9708-019B960494DF}">
-                  <a14:hiddenLine xmlns:a14="http://schemas.microsoft.com/office/drawing/2010/main" xmlns="" w="9525">
+                  <a14:hiddenLine xmlns="" xmlns:a14="http://schemas.microsoft.com/office/drawing/2010/main" w="9525">
                     <a:solidFill>
                       <a:srgbClr val="000000"/>
                     </a:solidFill>
@@ -10623,7 +10628,7 @@
               </a:ln>
               <a:extLst>
                 <a:ext uri="{91240B29-F687-4f45-9708-019B960494DF}">
-                  <a14:hiddenLine xmlns:a14="http://schemas.microsoft.com/office/drawing/2010/main" xmlns="" w="9525">
+                  <a14:hiddenLine xmlns="" xmlns:a14="http://schemas.microsoft.com/office/drawing/2010/main" w="9525">
                     <a:solidFill>
                       <a:srgbClr val="000000"/>
                     </a:solidFill>
@@ -10713,7 +10718,7 @@
               </a:ln>
               <a:extLst>
                 <a:ext uri="{91240B29-F687-4f45-9708-019B960494DF}">
-                  <a14:hiddenLine xmlns:a14="http://schemas.microsoft.com/office/drawing/2010/main" xmlns="" w="9525">
+                  <a14:hiddenLine xmlns="" xmlns:a14="http://schemas.microsoft.com/office/drawing/2010/main" w="9525">
                     <a:solidFill>
                       <a:srgbClr val="000000"/>
                     </a:solidFill>
@@ -10803,7 +10808,7 @@
               </a:ln>
               <a:extLst>
                 <a:ext uri="{91240B29-F687-4f45-9708-019B960494DF}">
-                  <a14:hiddenLine xmlns:a14="http://schemas.microsoft.com/office/drawing/2010/main" xmlns="" w="9525">
+                  <a14:hiddenLine xmlns="" xmlns:a14="http://schemas.microsoft.com/office/drawing/2010/main" w="9525">
                     <a:solidFill>
                       <a:srgbClr val="000000"/>
                     </a:solidFill>
@@ -10868,7 +10873,7 @@
               </a:ln>
               <a:extLst>
                 <a:ext uri="{91240B29-F687-4f45-9708-019B960494DF}">
-                  <a14:hiddenLine xmlns:a14="http://schemas.microsoft.com/office/drawing/2010/main" xmlns="" w="9525">
+                  <a14:hiddenLine xmlns="" xmlns:a14="http://schemas.microsoft.com/office/drawing/2010/main" w="9525">
                     <a:solidFill>
                       <a:srgbClr val="000000"/>
                     </a:solidFill>
@@ -10988,7 +10993,7 @@
               </a:ln>
               <a:extLst>
                 <a:ext uri="{91240B29-F687-4f45-9708-019B960494DF}">
-                  <a14:hiddenLine xmlns:a14="http://schemas.microsoft.com/office/drawing/2010/main" xmlns="" w="9525">
+                  <a14:hiddenLine xmlns="" xmlns:a14="http://schemas.microsoft.com/office/drawing/2010/main" w="9525">
                     <a:solidFill>
                       <a:srgbClr val="000000"/>
                     </a:solidFill>
@@ -11086,7 +11091,7 @@
               </a:ln>
               <a:extLst>
                 <a:ext uri="{91240B29-F687-4f45-9708-019B960494DF}">
-                  <a14:hiddenLine xmlns:a14="http://schemas.microsoft.com/office/drawing/2010/main" xmlns="" w="9525">
+                  <a14:hiddenLine xmlns="" xmlns:a14="http://schemas.microsoft.com/office/drawing/2010/main" w="9525">
                     <a:solidFill>
                       <a:srgbClr val="000000"/>
                     </a:solidFill>
@@ -11201,7 +11206,7 @@
               </a:ln>
               <a:extLst>
                 <a:ext uri="{91240B29-F687-4f45-9708-019B960494DF}">
-                  <a14:hiddenLine xmlns:a14="http://schemas.microsoft.com/office/drawing/2010/main" xmlns="" w="9525">
+                  <a14:hiddenLine xmlns="" xmlns:a14="http://schemas.microsoft.com/office/drawing/2010/main" w="9525">
                     <a:solidFill>
                       <a:srgbClr val="000000"/>
                     </a:solidFill>
@@ -11291,7 +11296,7 @@
               </a:ln>
               <a:extLst>
                 <a:ext uri="{91240B29-F687-4f45-9708-019B960494DF}">
-                  <a14:hiddenLine xmlns:a14="http://schemas.microsoft.com/office/drawing/2010/main" xmlns="" w="9525">
+                  <a14:hiddenLine xmlns="" xmlns:a14="http://schemas.microsoft.com/office/drawing/2010/main" w="9525">
                     <a:solidFill>
                       <a:srgbClr val="000000"/>
                     </a:solidFill>
@@ -11356,7 +11361,7 @@
               </a:ln>
               <a:extLst>
                 <a:ext uri="{91240B29-F687-4f45-9708-019B960494DF}">
-                  <a14:hiddenLine xmlns:a14="http://schemas.microsoft.com/office/drawing/2010/main" xmlns="" w="9525">
+                  <a14:hiddenLine xmlns="" xmlns:a14="http://schemas.microsoft.com/office/drawing/2010/main" w="9525">
                     <a:solidFill>
                       <a:srgbClr val="000000"/>
                     </a:solidFill>
@@ -11446,7 +11451,7 @@
               </a:ln>
               <a:extLst>
                 <a:ext uri="{91240B29-F687-4f45-9708-019B960494DF}">
-                  <a14:hiddenLine xmlns:a14="http://schemas.microsoft.com/office/drawing/2010/main" xmlns="" w="9525">
+                  <a14:hiddenLine xmlns="" xmlns:a14="http://schemas.microsoft.com/office/drawing/2010/main" w="9525">
                     <a:solidFill>
                       <a:srgbClr val="000000"/>
                     </a:solidFill>
@@ -11514,7 +11519,7 @@
               </a:ln>
               <a:extLst>
                 <a:ext uri="{91240B29-F687-4f45-9708-019B960494DF}">
-                  <a14:hiddenLine xmlns:a14="http://schemas.microsoft.com/office/drawing/2010/main" xmlns="" w="9525">
+                  <a14:hiddenLine xmlns="" xmlns:a14="http://schemas.microsoft.com/office/drawing/2010/main" w="9525">
                     <a:solidFill>
                       <a:srgbClr val="000000"/>
                     </a:solidFill>
@@ -11604,7 +11609,7 @@
               </a:ln>
               <a:extLst>
                 <a:ext uri="{91240B29-F687-4f45-9708-019B960494DF}">
-                  <a14:hiddenLine xmlns:a14="http://schemas.microsoft.com/office/drawing/2010/main" xmlns="" w="9525">
+                  <a14:hiddenLine xmlns="" xmlns:a14="http://schemas.microsoft.com/office/drawing/2010/main" w="9525">
                     <a:solidFill>
                       <a:srgbClr val="000000"/>
                     </a:solidFill>
@@ -11672,7 +11677,7 @@
               </a:ln>
               <a:extLst>
                 <a:ext uri="{91240B29-F687-4f45-9708-019B960494DF}">
-                  <a14:hiddenLine xmlns:a14="http://schemas.microsoft.com/office/drawing/2010/main" xmlns="" w="9525">
+                  <a14:hiddenLine xmlns="" xmlns:a14="http://schemas.microsoft.com/office/drawing/2010/main" w="9525">
                     <a:solidFill>
                       <a:srgbClr val="000000"/>
                     </a:solidFill>
@@ -11762,7 +11767,7 @@
               </a:ln>
               <a:extLst>
                 <a:ext uri="{91240B29-F687-4f45-9708-019B960494DF}">
-                  <a14:hiddenLine xmlns:a14="http://schemas.microsoft.com/office/drawing/2010/main" xmlns="" w="9525">
+                  <a14:hiddenLine xmlns="" xmlns:a14="http://schemas.microsoft.com/office/drawing/2010/main" w="9525">
                     <a:solidFill>
                       <a:srgbClr val="000000"/>
                     </a:solidFill>
@@ -11796,7 +11801,7 @@
               </a:ln>
               <a:extLst>
                 <a:ext uri="{91240B29-F687-4f45-9708-019B960494DF}">
-                  <a14:hiddenLine xmlns:a14="http://schemas.microsoft.com/office/drawing/2010/main" xmlns="" w="9525">
+                  <a14:hiddenLine xmlns="" xmlns:a14="http://schemas.microsoft.com/office/drawing/2010/main" w="9525">
                     <a:solidFill>
                       <a:srgbClr val="000000"/>
                     </a:solidFill>
@@ -12433,6 +12438,18 @@
   <p:clrMapOvr>
     <a:masterClrMapping/>
   </p:clrMapOvr>
+  <mc:AlternateContent xmlns:mc="http://schemas.openxmlformats.org/markup-compatibility/2006">
+    <mc:Choice xmlns:p159="http://schemas.microsoft.com/office/powerpoint/2015/09/main" Requires="p159">
+      <p:transition xmlns:p14="http://schemas.microsoft.com/office/powerpoint/2010/main" spd="slow" p14:dur="2000">
+        <p159:morph option="byObject"/>
+      </p:transition>
+    </mc:Choice>
+    <mc:Fallback>
+      <p:transition spd="slow">
+        <p:fade/>
+      </p:transition>
+    </mc:Fallback>
+  </mc:AlternateContent>
 </p:sld>
 </file>
 
@@ -12577,6 +12594,18 @@
   <p:clrMapOvr>
     <a:masterClrMapping/>
   </p:clrMapOvr>
+  <mc:AlternateContent xmlns:mc="http://schemas.openxmlformats.org/markup-compatibility/2006">
+    <mc:Choice xmlns:p14="http://schemas.microsoft.com/office/powerpoint/2010/main" Requires="p14">
+      <p:transition spd="med" p14:dur="700">
+        <p:fade/>
+      </p:transition>
+    </mc:Choice>
+    <mc:Fallback>
+      <p:transition spd="med">
+        <p:fade/>
+      </p:transition>
+    </mc:Fallback>
+  </mc:AlternateContent>
 </p:sld>
 </file>
 
@@ -12689,6 +12718,9 @@
   <p:clrMapOvr>
     <a:masterClrMapping/>
   </p:clrMapOvr>
+  <p:transition spd="slow">
+    <p:randomBar dir="vert"/>
+  </p:transition>
 </p:sld>
 </file>
 
@@ -12806,6 +12838,18 @@
   <p:clrMapOvr>
     <a:masterClrMapping/>
   </p:clrMapOvr>
+  <mc:AlternateContent xmlns:mc="http://schemas.openxmlformats.org/markup-compatibility/2006">
+    <mc:Choice xmlns:p159="http://schemas.microsoft.com/office/powerpoint/2015/09/main" Requires="p159">
+      <p:transition xmlns:p14="http://schemas.microsoft.com/office/powerpoint/2010/main" spd="slow" p14:dur="2000">
+        <p159:morph option="byObject"/>
+      </p:transition>
+    </mc:Choice>
+    <mc:Fallback>
+      <p:transition spd="slow">
+        <p:fade/>
+      </p:transition>
+    </mc:Fallback>
+  </mc:AlternateContent>
 </p:sld>
 </file>
 
@@ -12905,6 +12949,18 @@
   <p:clrMapOvr>
     <a:masterClrMapping/>
   </p:clrMapOvr>
+  <mc:AlternateContent xmlns:mc="http://schemas.openxmlformats.org/markup-compatibility/2006">
+    <mc:Choice xmlns:p159="http://schemas.microsoft.com/office/powerpoint/2015/09/main" Requires="p159">
+      <p:transition xmlns:p14="http://schemas.microsoft.com/office/powerpoint/2010/main" spd="slow" p14:dur="2000">
+        <p159:morph option="byObject"/>
+      </p:transition>
+    </mc:Choice>
+    <mc:Fallback>
+      <p:transition spd="slow">
+        <p:fade/>
+      </p:transition>
+    </mc:Fallback>
+  </mc:AlternateContent>
 </p:sld>
 </file>
 
@@ -13017,6 +13073,18 @@
   <p:clrMapOvr>
     <a:masterClrMapping/>
   </p:clrMapOvr>
+  <mc:AlternateContent xmlns:mc="http://schemas.openxmlformats.org/markup-compatibility/2006">
+    <mc:Choice xmlns:p14="http://schemas.microsoft.com/office/powerpoint/2010/main" Requires="p14">
+      <p:transition spd="med" p14:dur="700">
+        <p:fade/>
+      </p:transition>
+    </mc:Choice>
+    <mc:Fallback>
+      <p:transition spd="med">
+        <p:fade/>
+      </p:transition>
+    </mc:Fallback>
+  </mc:AlternateContent>
 </p:sld>
 </file>
 
@@ -13139,6 +13207,18 @@
   <p:clrMapOvr>
     <a:masterClrMapping/>
   </p:clrMapOvr>
+  <mc:AlternateContent xmlns:mc="http://schemas.openxmlformats.org/markup-compatibility/2006">
+    <mc:Choice xmlns:p159="http://schemas.microsoft.com/office/powerpoint/2015/09/main" Requires="p159">
+      <p:transition xmlns:p14="http://schemas.microsoft.com/office/powerpoint/2010/main" spd="slow" p14:dur="2000">
+        <p159:morph option="byObject"/>
+      </p:transition>
+    </mc:Choice>
+    <mc:Fallback>
+      <p:transition spd="slow">
+        <p:fade/>
+      </p:transition>
+    </mc:Fallback>
+  </mc:AlternateContent>
 </p:sld>
 </file>
 
@@ -13271,6 +13351,18 @@
   <p:clrMapOvr>
     <a:masterClrMapping/>
   </p:clrMapOvr>
+  <mc:AlternateContent xmlns:mc="http://schemas.openxmlformats.org/markup-compatibility/2006">
+    <mc:Choice xmlns:p159="http://schemas.microsoft.com/office/powerpoint/2015/09/main" Requires="p159">
+      <p:transition xmlns:p14="http://schemas.microsoft.com/office/powerpoint/2010/main" spd="slow" p14:dur="2000">
+        <p159:morph option="byObject"/>
+      </p:transition>
+    </mc:Choice>
+    <mc:Fallback>
+      <p:transition spd="slow">
+        <p:fade/>
+      </p:transition>
+    </mc:Fallback>
+  </mc:AlternateContent>
 </p:sld>
 </file>
 
@@ -13380,6 +13472,18 @@
   <p:clrMapOvr>
     <a:masterClrMapping/>
   </p:clrMapOvr>
+  <mc:AlternateContent xmlns:mc="http://schemas.openxmlformats.org/markup-compatibility/2006">
+    <mc:Choice xmlns:p15="http://schemas.microsoft.com/office/powerpoint/2012/main" Requires="p15">
+      <p:transition xmlns:p14="http://schemas.microsoft.com/office/powerpoint/2010/main" spd="slow" p14:dur="2000">
+        <p15:prstTrans prst="fallOver"/>
+      </p:transition>
+    </mc:Choice>
+    <mc:Fallback>
+      <p:transition spd="slow">
+        <p:fade/>
+      </p:transition>
+    </mc:Fallback>
+  </mc:AlternateContent>
 </p:sld>
 </file>
 
@@ -13518,6 +13622,18 @@
   <p:clrMapOvr>
     <a:masterClrMapping/>
   </p:clrMapOvr>
+  <mc:AlternateContent xmlns:mc="http://schemas.openxmlformats.org/markup-compatibility/2006">
+    <mc:Choice xmlns:p159="http://schemas.microsoft.com/office/powerpoint/2015/09/main" Requires="p159">
+      <p:transition xmlns:p14="http://schemas.microsoft.com/office/powerpoint/2010/main" spd="slow" p14:dur="2000">
+        <p159:morph option="byObject"/>
+      </p:transition>
+    </mc:Choice>
+    <mc:Fallback>
+      <p:transition spd="slow">
+        <p:fade/>
+      </p:transition>
+    </mc:Fallback>
+  </mc:AlternateContent>
 </p:sld>
 </file>
 
@@ -13673,6 +13789,18 @@
   <p:clrMapOvr>
     <a:masterClrMapping/>
   </p:clrMapOvr>
+  <mc:AlternateContent xmlns:mc="http://schemas.openxmlformats.org/markup-compatibility/2006">
+    <mc:Choice xmlns:p159="http://schemas.microsoft.com/office/powerpoint/2015/09/main" Requires="p159">
+      <p:transition xmlns:p14="http://schemas.microsoft.com/office/powerpoint/2010/main" spd="slow" p14:dur="2000">
+        <p159:morph option="byObject"/>
+      </p:transition>
+    </mc:Choice>
+    <mc:Fallback>
+      <p:transition spd="slow">
+        <p:fade/>
+      </p:transition>
+    </mc:Fallback>
+  </mc:AlternateContent>
 </p:sld>
 </file>
 

</xml_diff>

<commit_message>
added final report and updated final presentation
</commit_message>
<xml_diff>
--- a/Final Pres.pptx
+++ b/Final Pres.pptx
@@ -15,7 +15,9 @@
     <p:sldId id="265" r:id="rId9"/>
     <p:sldId id="266" r:id="rId10"/>
     <p:sldId id="261" r:id="rId11"/>
-    <p:sldId id="259" r:id="rId12"/>
+    <p:sldId id="267" r:id="rId12"/>
+    <p:sldId id="268" r:id="rId13"/>
+    <p:sldId id="259" r:id="rId14"/>
   </p:sldIdLst>
   <p:sldSz cx="12192000" cy="6858000"/>
   <p:notesSz cx="6858000" cy="9144000"/>
@@ -172,7 +174,7 @@
           <a:noFill/>
           <a:extLst>
             <a:ext uri="{909E8E84-426E-40dd-AFC4-6F175D3DCCD1}">
-              <a14:hiddenFill xmlns="" xmlns:a14="http://schemas.microsoft.com/office/drawing/2010/main">
+              <a14:hiddenFill xmlns:a14="http://schemas.microsoft.com/office/drawing/2010/main" xmlns="">
                 <a:solidFill>
                   <a:srgbClr val="FFFFFF"/>
                 </a:solidFill>
@@ -232,7 +234,7 @@
             </a:ln>
             <a:extLst>
               <a:ext uri="{91240B29-F687-4f45-9708-019B960494DF}">
-                <a14:hiddenLine xmlns="" xmlns:a14="http://schemas.microsoft.com/office/drawing/2010/main" w="9525">
+                <a14:hiddenLine xmlns:a14="http://schemas.microsoft.com/office/drawing/2010/main" xmlns="" w="9525">
                   <a:solidFill>
                     <a:srgbClr val="000000"/>
                   </a:solidFill>
@@ -322,7 +324,7 @@
             </a:ln>
             <a:extLst>
               <a:ext uri="{91240B29-F687-4f45-9708-019B960494DF}">
-                <a14:hiddenLine xmlns="" xmlns:a14="http://schemas.microsoft.com/office/drawing/2010/main" w="9525">
+                <a14:hiddenLine xmlns:a14="http://schemas.microsoft.com/office/drawing/2010/main" xmlns="" w="9525">
                   <a:solidFill>
                     <a:srgbClr val="000000"/>
                   </a:solidFill>
@@ -412,7 +414,7 @@
             </a:ln>
             <a:extLst>
               <a:ext uri="{91240B29-F687-4f45-9708-019B960494DF}">
-                <a14:hiddenLine xmlns="" xmlns:a14="http://schemas.microsoft.com/office/drawing/2010/main" w="9525">
+                <a14:hiddenLine xmlns:a14="http://schemas.microsoft.com/office/drawing/2010/main" xmlns="" w="9525">
                   <a:solidFill>
                     <a:srgbClr val="000000"/>
                   </a:solidFill>
@@ -446,7 +448,7 @@
             </a:ln>
             <a:extLst>
               <a:ext uri="{91240B29-F687-4f45-9708-019B960494DF}">
-                <a14:hiddenLine xmlns="" xmlns:a14="http://schemas.microsoft.com/office/drawing/2010/main" w="9525">
+                <a14:hiddenLine xmlns:a14="http://schemas.microsoft.com/office/drawing/2010/main" xmlns="" w="9525">
                   <a:solidFill>
                     <a:srgbClr val="000000"/>
                   </a:solidFill>
@@ -536,7 +538,7 @@
             </a:ln>
             <a:extLst>
               <a:ext uri="{91240B29-F687-4f45-9708-019B960494DF}">
-                <a14:hiddenLine xmlns="" xmlns:a14="http://schemas.microsoft.com/office/drawing/2010/main" w="9525">
+                <a14:hiddenLine xmlns:a14="http://schemas.microsoft.com/office/drawing/2010/main" xmlns="" w="9525">
                   <a:solidFill>
                     <a:srgbClr val="000000"/>
                   </a:solidFill>
@@ -598,7 +600,7 @@
             </a:ln>
             <a:extLst>
               <a:ext uri="{91240B29-F687-4f45-9708-019B960494DF}">
-                <a14:hiddenLine xmlns="" xmlns:a14="http://schemas.microsoft.com/office/drawing/2010/main" w="9525">
+                <a14:hiddenLine xmlns:a14="http://schemas.microsoft.com/office/drawing/2010/main" xmlns="" w="9525">
                   <a:solidFill>
                     <a:srgbClr val="000000"/>
                   </a:solidFill>
@@ -660,7 +662,7 @@
             </a:ln>
             <a:extLst>
               <a:ext uri="{91240B29-F687-4f45-9708-019B960494DF}">
-                <a14:hiddenLine xmlns="" xmlns:a14="http://schemas.microsoft.com/office/drawing/2010/main" w="9525">
+                <a14:hiddenLine xmlns:a14="http://schemas.microsoft.com/office/drawing/2010/main" xmlns="" w="9525">
                   <a:solidFill>
                     <a:srgbClr val="000000"/>
                   </a:solidFill>
@@ -750,7 +752,7 @@
             </a:ln>
             <a:extLst>
               <a:ext uri="{91240B29-F687-4f45-9708-019B960494DF}">
-                <a14:hiddenLine xmlns="" xmlns:a14="http://schemas.microsoft.com/office/drawing/2010/main" w="9525">
+                <a14:hiddenLine xmlns:a14="http://schemas.microsoft.com/office/drawing/2010/main" xmlns="" w="9525">
                   <a:solidFill>
                     <a:srgbClr val="000000"/>
                   </a:solidFill>
@@ -812,7 +814,7 @@
             </a:ln>
             <a:extLst>
               <a:ext uri="{91240B29-F687-4f45-9708-019B960494DF}">
-                <a14:hiddenLine xmlns="" xmlns:a14="http://schemas.microsoft.com/office/drawing/2010/main" w="9525">
+                <a14:hiddenLine xmlns:a14="http://schemas.microsoft.com/office/drawing/2010/main" xmlns="" w="9525">
                   <a:solidFill>
                     <a:srgbClr val="000000"/>
                   </a:solidFill>
@@ -874,7 +876,7 @@
             </a:ln>
             <a:extLst>
               <a:ext uri="{91240B29-F687-4f45-9708-019B960494DF}">
-                <a14:hiddenLine xmlns="" xmlns:a14="http://schemas.microsoft.com/office/drawing/2010/main" w="9525">
+                <a14:hiddenLine xmlns:a14="http://schemas.microsoft.com/office/drawing/2010/main" xmlns="" w="9525">
                   <a:solidFill>
                     <a:srgbClr val="000000"/>
                   </a:solidFill>
@@ -964,7 +966,7 @@
             </a:ln>
             <a:extLst>
               <a:ext uri="{91240B29-F687-4f45-9708-019B960494DF}">
-                <a14:hiddenLine xmlns="" xmlns:a14="http://schemas.microsoft.com/office/drawing/2010/main" w="9525">
+                <a14:hiddenLine xmlns:a14="http://schemas.microsoft.com/office/drawing/2010/main" xmlns="" w="9525">
                   <a:solidFill>
                     <a:srgbClr val="000000"/>
                   </a:solidFill>
@@ -1054,7 +1056,7 @@
             </a:ln>
             <a:extLst>
               <a:ext uri="{91240B29-F687-4f45-9708-019B960494DF}">
-                <a14:hiddenLine xmlns="" xmlns:a14="http://schemas.microsoft.com/office/drawing/2010/main" w="9525">
+                <a14:hiddenLine xmlns:a14="http://schemas.microsoft.com/office/drawing/2010/main" xmlns="" w="9525">
                   <a:solidFill>
                     <a:srgbClr val="000000"/>
                   </a:solidFill>
@@ -1116,7 +1118,7 @@
             </a:ln>
             <a:extLst>
               <a:ext uri="{91240B29-F687-4f45-9708-019B960494DF}">
-                <a14:hiddenLine xmlns="" xmlns:a14="http://schemas.microsoft.com/office/drawing/2010/main" w="9525">
+                <a14:hiddenLine xmlns:a14="http://schemas.microsoft.com/office/drawing/2010/main" xmlns="" w="9525">
                   <a:solidFill>
                     <a:srgbClr val="000000"/>
                   </a:solidFill>
@@ -1226,7 +1228,7 @@
             </a:ln>
             <a:extLst>
               <a:ext uri="{91240B29-F687-4f45-9708-019B960494DF}">
-                <a14:hiddenLine xmlns="" xmlns:a14="http://schemas.microsoft.com/office/drawing/2010/main" w="9525">
+                <a14:hiddenLine xmlns:a14="http://schemas.microsoft.com/office/drawing/2010/main" xmlns="" w="9525">
                   <a:solidFill>
                     <a:srgbClr val="000000"/>
                   </a:solidFill>
@@ -1288,7 +1290,7 @@
             </a:ln>
             <a:extLst>
               <a:ext uri="{91240B29-F687-4f45-9708-019B960494DF}">
-                <a14:hiddenLine xmlns="" xmlns:a14="http://schemas.microsoft.com/office/drawing/2010/main" w="9525">
+                <a14:hiddenLine xmlns:a14="http://schemas.microsoft.com/office/drawing/2010/main" xmlns="" w="9525">
                   <a:solidFill>
                     <a:srgbClr val="000000"/>
                   </a:solidFill>
@@ -1378,7 +1380,7 @@
             </a:ln>
             <a:extLst>
               <a:ext uri="{91240B29-F687-4f45-9708-019B960494DF}">
-                <a14:hiddenLine xmlns="" xmlns:a14="http://schemas.microsoft.com/office/drawing/2010/main" w="9525">
+                <a14:hiddenLine xmlns:a14="http://schemas.microsoft.com/office/drawing/2010/main" xmlns="" w="9525">
                   <a:solidFill>
                     <a:srgbClr val="000000"/>
                   </a:solidFill>
@@ -1468,7 +1470,7 @@
             </a:ln>
             <a:extLst>
               <a:ext uri="{91240B29-F687-4f45-9708-019B960494DF}">
-                <a14:hiddenLine xmlns="" xmlns:a14="http://schemas.microsoft.com/office/drawing/2010/main" w="9525">
+                <a14:hiddenLine xmlns:a14="http://schemas.microsoft.com/office/drawing/2010/main" xmlns="" w="9525">
                   <a:solidFill>
                     <a:srgbClr val="000000"/>
                   </a:solidFill>
@@ -1530,7 +1532,7 @@
             </a:ln>
             <a:extLst>
               <a:ext uri="{91240B29-F687-4f45-9708-019B960494DF}">
-                <a14:hiddenLine xmlns="" xmlns:a14="http://schemas.microsoft.com/office/drawing/2010/main" w="9525">
+                <a14:hiddenLine xmlns:a14="http://schemas.microsoft.com/office/drawing/2010/main" xmlns="" w="9525">
                   <a:solidFill>
                     <a:srgbClr val="000000"/>
                   </a:solidFill>
@@ -1620,7 +1622,7 @@
             </a:ln>
             <a:extLst>
               <a:ext uri="{91240B29-F687-4f45-9708-019B960494DF}">
-                <a14:hiddenLine xmlns="" xmlns:a14="http://schemas.microsoft.com/office/drawing/2010/main" w="9525">
+                <a14:hiddenLine xmlns:a14="http://schemas.microsoft.com/office/drawing/2010/main" xmlns="" w="9525">
                   <a:solidFill>
                     <a:srgbClr val="000000"/>
                   </a:solidFill>
@@ -1710,7 +1712,7 @@
             </a:ln>
             <a:extLst>
               <a:ext uri="{91240B29-F687-4f45-9708-019B960494DF}">
-                <a14:hiddenLine xmlns="" xmlns:a14="http://schemas.microsoft.com/office/drawing/2010/main" w="9525">
+                <a14:hiddenLine xmlns:a14="http://schemas.microsoft.com/office/drawing/2010/main" xmlns="" w="9525">
                   <a:solidFill>
                     <a:srgbClr val="000000"/>
                   </a:solidFill>
@@ -1766,7 +1768,7 @@
             </a:ln>
             <a:extLst>
               <a:ext uri="{91240B29-F687-4f45-9708-019B960494DF}">
-                <a14:hiddenLine xmlns="" xmlns:a14="http://schemas.microsoft.com/office/drawing/2010/main" w="9525">
+                <a14:hiddenLine xmlns:a14="http://schemas.microsoft.com/office/drawing/2010/main" xmlns="" w="9525">
                   <a:solidFill>
                     <a:srgbClr val="000000"/>
                   </a:solidFill>
@@ -1856,7 +1858,7 @@
             </a:ln>
             <a:extLst>
               <a:ext uri="{91240B29-F687-4f45-9708-019B960494DF}">
-                <a14:hiddenLine xmlns="" xmlns:a14="http://schemas.microsoft.com/office/drawing/2010/main" w="9525">
+                <a14:hiddenLine xmlns:a14="http://schemas.microsoft.com/office/drawing/2010/main" xmlns="" w="9525">
                   <a:solidFill>
                     <a:srgbClr val="000000"/>
                   </a:solidFill>
@@ -1912,7 +1914,7 @@
             </a:ln>
             <a:extLst>
               <a:ext uri="{91240B29-F687-4f45-9708-019B960494DF}">
-                <a14:hiddenLine xmlns="" xmlns:a14="http://schemas.microsoft.com/office/drawing/2010/main" w="9525">
+                <a14:hiddenLine xmlns:a14="http://schemas.microsoft.com/office/drawing/2010/main" xmlns="" w="9525">
                   <a:solidFill>
                     <a:srgbClr val="000000"/>
                   </a:solidFill>
@@ -2002,7 +2004,7 @@
             </a:ln>
             <a:extLst>
               <a:ext uri="{91240B29-F687-4f45-9708-019B960494DF}">
-                <a14:hiddenLine xmlns="" xmlns:a14="http://schemas.microsoft.com/office/drawing/2010/main" w="9525">
+                <a14:hiddenLine xmlns:a14="http://schemas.microsoft.com/office/drawing/2010/main" xmlns="" w="9525">
                   <a:solidFill>
                     <a:srgbClr val="000000"/>
                   </a:solidFill>
@@ -2070,7 +2072,7 @@
             </a:ln>
             <a:extLst>
               <a:ext uri="{91240B29-F687-4f45-9708-019B960494DF}">
-                <a14:hiddenLine xmlns="" xmlns:a14="http://schemas.microsoft.com/office/drawing/2010/main" w="9525">
+                <a14:hiddenLine xmlns:a14="http://schemas.microsoft.com/office/drawing/2010/main" xmlns="" w="9525">
                   <a:solidFill>
                     <a:srgbClr val="000000"/>
                   </a:solidFill>
@@ -2160,7 +2162,7 @@
             </a:ln>
             <a:extLst>
               <a:ext uri="{91240B29-F687-4f45-9708-019B960494DF}">
-                <a14:hiddenLine xmlns="" xmlns:a14="http://schemas.microsoft.com/office/drawing/2010/main" w="9525">
+                <a14:hiddenLine xmlns:a14="http://schemas.microsoft.com/office/drawing/2010/main" xmlns="" w="9525">
                   <a:solidFill>
                     <a:srgbClr val="000000"/>
                   </a:solidFill>
@@ -2228,7 +2230,7 @@
             </a:ln>
             <a:extLst>
               <a:ext uri="{91240B29-F687-4f45-9708-019B960494DF}">
-                <a14:hiddenLine xmlns="" xmlns:a14="http://schemas.microsoft.com/office/drawing/2010/main" w="9525">
+                <a14:hiddenLine xmlns:a14="http://schemas.microsoft.com/office/drawing/2010/main" xmlns="" w="9525">
                   <a:solidFill>
                     <a:srgbClr val="000000"/>
                   </a:solidFill>
@@ -2318,7 +2320,7 @@
             </a:ln>
             <a:extLst>
               <a:ext uri="{91240B29-F687-4f45-9708-019B960494DF}">
-                <a14:hiddenLine xmlns="" xmlns:a14="http://schemas.microsoft.com/office/drawing/2010/main" w="9525">
+                <a14:hiddenLine xmlns:a14="http://schemas.microsoft.com/office/drawing/2010/main" xmlns="" w="9525">
                   <a:solidFill>
                     <a:srgbClr val="000000"/>
                   </a:solidFill>
@@ -2352,7 +2354,7 @@
             </a:ln>
             <a:extLst>
               <a:ext uri="{91240B29-F687-4f45-9708-019B960494DF}">
-                <a14:hiddenLine xmlns="" xmlns:a14="http://schemas.microsoft.com/office/drawing/2010/main" w="9525">
+                <a14:hiddenLine xmlns:a14="http://schemas.microsoft.com/office/drawing/2010/main" xmlns="" w="9525">
                   <a:solidFill>
                     <a:srgbClr val="000000"/>
                   </a:solidFill>
@@ -2442,7 +2444,7 @@
             </a:ln>
             <a:extLst>
               <a:ext uri="{91240B29-F687-4f45-9708-019B960494DF}">
-                <a14:hiddenLine xmlns="" xmlns:a14="http://schemas.microsoft.com/office/drawing/2010/main" w="9525">
+                <a14:hiddenLine xmlns:a14="http://schemas.microsoft.com/office/drawing/2010/main" xmlns="" w="9525">
                   <a:solidFill>
                     <a:srgbClr val="000000"/>
                   </a:solidFill>
@@ -2504,7 +2506,7 @@
             </a:ln>
             <a:extLst>
               <a:ext uri="{91240B29-F687-4f45-9708-019B960494DF}">
-                <a14:hiddenLine xmlns="" xmlns:a14="http://schemas.microsoft.com/office/drawing/2010/main" w="9525">
+                <a14:hiddenLine xmlns:a14="http://schemas.microsoft.com/office/drawing/2010/main" xmlns="" w="9525">
                   <a:solidFill>
                     <a:srgbClr val="000000"/>
                   </a:solidFill>
@@ -2566,7 +2568,7 @@
             </a:ln>
             <a:extLst>
               <a:ext uri="{91240B29-F687-4f45-9708-019B960494DF}">
-                <a14:hiddenLine xmlns="" xmlns:a14="http://schemas.microsoft.com/office/drawing/2010/main" w="9525">
+                <a14:hiddenLine xmlns:a14="http://schemas.microsoft.com/office/drawing/2010/main" xmlns="" w="9525">
                   <a:solidFill>
                     <a:srgbClr val="000000"/>
                   </a:solidFill>
@@ -2656,7 +2658,7 @@
             </a:ln>
             <a:extLst>
               <a:ext uri="{91240B29-F687-4f45-9708-019B960494DF}">
-                <a14:hiddenLine xmlns="" xmlns:a14="http://schemas.microsoft.com/office/drawing/2010/main" w="9525">
+                <a14:hiddenLine xmlns:a14="http://schemas.microsoft.com/office/drawing/2010/main" xmlns="" w="9525">
                   <a:solidFill>
                     <a:srgbClr val="000000"/>
                   </a:solidFill>
@@ -2724,7 +2726,7 @@
             </a:ln>
             <a:extLst>
               <a:ext uri="{91240B29-F687-4f45-9708-019B960494DF}">
-                <a14:hiddenLine xmlns="" xmlns:a14="http://schemas.microsoft.com/office/drawing/2010/main" w="9525">
+                <a14:hiddenLine xmlns:a14="http://schemas.microsoft.com/office/drawing/2010/main" xmlns="" w="9525">
                   <a:solidFill>
                     <a:srgbClr val="000000"/>
                   </a:solidFill>
@@ -2786,7 +2788,7 @@
             </a:ln>
             <a:extLst>
               <a:ext uri="{91240B29-F687-4f45-9708-019B960494DF}">
-                <a14:hiddenLine xmlns="" xmlns:a14="http://schemas.microsoft.com/office/drawing/2010/main" w="9525">
+                <a14:hiddenLine xmlns:a14="http://schemas.microsoft.com/office/drawing/2010/main" xmlns="" w="9525">
                   <a:solidFill>
                     <a:srgbClr val="000000"/>
                   </a:solidFill>
@@ -2876,7 +2878,7 @@
             </a:ln>
             <a:extLst>
               <a:ext uri="{91240B29-F687-4f45-9708-019B960494DF}">
-                <a14:hiddenLine xmlns="" xmlns:a14="http://schemas.microsoft.com/office/drawing/2010/main" w="9525">
+                <a14:hiddenLine xmlns:a14="http://schemas.microsoft.com/office/drawing/2010/main" xmlns="" w="9525">
                   <a:solidFill>
                     <a:srgbClr val="000000"/>
                   </a:solidFill>
@@ -2938,7 +2940,7 @@
             </a:ln>
             <a:extLst>
               <a:ext uri="{91240B29-F687-4f45-9708-019B960494DF}">
-                <a14:hiddenLine xmlns="" xmlns:a14="http://schemas.microsoft.com/office/drawing/2010/main" w="9525">
+                <a14:hiddenLine xmlns:a14="http://schemas.microsoft.com/office/drawing/2010/main" xmlns="" w="9525">
                   <a:solidFill>
                     <a:srgbClr val="000000"/>
                   </a:solidFill>
@@ -3028,7 +3030,7 @@
             </a:ln>
             <a:extLst>
               <a:ext uri="{91240B29-F687-4f45-9708-019B960494DF}">
-                <a14:hiddenLine xmlns="" xmlns:a14="http://schemas.microsoft.com/office/drawing/2010/main" w="9525">
+                <a14:hiddenLine xmlns:a14="http://schemas.microsoft.com/office/drawing/2010/main" xmlns="" w="9525">
                   <a:solidFill>
                     <a:srgbClr val="000000"/>
                   </a:solidFill>
@@ -3090,7 +3092,7 @@
             </a:ln>
             <a:extLst>
               <a:ext uri="{91240B29-F687-4f45-9708-019B960494DF}">
-                <a14:hiddenLine xmlns="" xmlns:a14="http://schemas.microsoft.com/office/drawing/2010/main" w="9525">
+                <a14:hiddenLine xmlns:a14="http://schemas.microsoft.com/office/drawing/2010/main" xmlns="" w="9525">
                   <a:solidFill>
                     <a:srgbClr val="000000"/>
                   </a:solidFill>
@@ -3180,7 +3182,7 @@
             </a:ln>
             <a:extLst>
               <a:ext uri="{91240B29-F687-4f45-9708-019B960494DF}">
-                <a14:hiddenLine xmlns="" xmlns:a14="http://schemas.microsoft.com/office/drawing/2010/main" w="9525">
+                <a14:hiddenLine xmlns:a14="http://schemas.microsoft.com/office/drawing/2010/main" xmlns="" w="9525">
                   <a:solidFill>
                     <a:srgbClr val="000000"/>
                   </a:solidFill>
@@ -3214,7 +3216,7 @@
             </a:ln>
             <a:extLst>
               <a:ext uri="{91240B29-F687-4f45-9708-019B960494DF}">
-                <a14:hiddenLine xmlns="" xmlns:a14="http://schemas.microsoft.com/office/drawing/2010/main" w="9525">
+                <a14:hiddenLine xmlns:a14="http://schemas.microsoft.com/office/drawing/2010/main" xmlns="" w="9525">
                   <a:solidFill>
                     <a:srgbClr val="000000"/>
                   </a:solidFill>
@@ -3279,7 +3281,7 @@
             </a:ln>
             <a:extLst>
               <a:ext uri="{91240B29-F687-4f45-9708-019B960494DF}">
-                <a14:hiddenLine xmlns="" xmlns:a14="http://schemas.microsoft.com/office/drawing/2010/main" w="9525">
+                <a14:hiddenLine xmlns:a14="http://schemas.microsoft.com/office/drawing/2010/main" xmlns="" w="9525">
                   <a:solidFill>
                     <a:srgbClr val="000000"/>
                   </a:solidFill>
@@ -3369,7 +3371,7 @@
             </a:ln>
             <a:extLst>
               <a:ext uri="{91240B29-F687-4f45-9708-019B960494DF}">
-                <a14:hiddenLine xmlns="" xmlns:a14="http://schemas.microsoft.com/office/drawing/2010/main" w="9525">
+                <a14:hiddenLine xmlns:a14="http://schemas.microsoft.com/office/drawing/2010/main" xmlns="" w="9525">
                   <a:solidFill>
                     <a:srgbClr val="000000"/>
                   </a:solidFill>
@@ -3431,7 +3433,7 @@
             </a:ln>
             <a:extLst>
               <a:ext uri="{91240B29-F687-4f45-9708-019B960494DF}">
-                <a14:hiddenLine xmlns="" xmlns:a14="http://schemas.microsoft.com/office/drawing/2010/main" w="9525">
+                <a14:hiddenLine xmlns:a14="http://schemas.microsoft.com/office/drawing/2010/main" xmlns="" w="9525">
                   <a:solidFill>
                     <a:srgbClr val="000000"/>
                   </a:solidFill>
@@ -3521,7 +3523,7 @@
             </a:ln>
             <a:extLst>
               <a:ext uri="{91240B29-F687-4f45-9708-019B960494DF}">
-                <a14:hiddenLine xmlns="" xmlns:a14="http://schemas.microsoft.com/office/drawing/2010/main" w="9525">
+                <a14:hiddenLine xmlns:a14="http://schemas.microsoft.com/office/drawing/2010/main" xmlns="" w="9525">
                   <a:solidFill>
                     <a:srgbClr val="000000"/>
                   </a:solidFill>
@@ -3611,7 +3613,7 @@
             </a:ln>
             <a:extLst>
               <a:ext uri="{91240B29-F687-4f45-9708-019B960494DF}">
-                <a14:hiddenLine xmlns="" xmlns:a14="http://schemas.microsoft.com/office/drawing/2010/main" w="9525">
+                <a14:hiddenLine xmlns:a14="http://schemas.microsoft.com/office/drawing/2010/main" xmlns="" w="9525">
                   <a:solidFill>
                     <a:srgbClr val="000000"/>
                   </a:solidFill>
@@ -3676,7 +3678,7 @@
             </a:ln>
             <a:extLst>
               <a:ext uri="{91240B29-F687-4f45-9708-019B960494DF}">
-                <a14:hiddenLine xmlns="" xmlns:a14="http://schemas.microsoft.com/office/drawing/2010/main" w="9525">
+                <a14:hiddenLine xmlns:a14="http://schemas.microsoft.com/office/drawing/2010/main" xmlns="" w="9525">
                   <a:solidFill>
                     <a:srgbClr val="000000"/>
                   </a:solidFill>
@@ -3738,7 +3740,7 @@
             </a:ln>
             <a:extLst>
               <a:ext uri="{91240B29-F687-4f45-9708-019B960494DF}">
-                <a14:hiddenLine xmlns="" xmlns:a14="http://schemas.microsoft.com/office/drawing/2010/main" w="9525">
+                <a14:hiddenLine xmlns:a14="http://schemas.microsoft.com/office/drawing/2010/main" xmlns="" w="9525">
                   <a:solidFill>
                     <a:srgbClr val="000000"/>
                   </a:solidFill>
@@ -3828,7 +3830,7 @@
             </a:ln>
             <a:extLst>
               <a:ext uri="{91240B29-F687-4f45-9708-019B960494DF}">
-                <a14:hiddenLine xmlns="" xmlns:a14="http://schemas.microsoft.com/office/drawing/2010/main" w="9525">
+                <a14:hiddenLine xmlns:a14="http://schemas.microsoft.com/office/drawing/2010/main" xmlns="" w="9525">
                   <a:solidFill>
                     <a:srgbClr val="000000"/>
                   </a:solidFill>
@@ -3918,7 +3920,7 @@
             </a:ln>
             <a:extLst>
               <a:ext uri="{91240B29-F687-4f45-9708-019B960494DF}">
-                <a14:hiddenLine xmlns="" xmlns:a14="http://schemas.microsoft.com/office/drawing/2010/main" w="9525">
+                <a14:hiddenLine xmlns:a14="http://schemas.microsoft.com/office/drawing/2010/main" xmlns="" w="9525">
                   <a:solidFill>
                     <a:srgbClr val="000000"/>
                   </a:solidFill>
@@ -3980,7 +3982,7 @@
             </a:ln>
             <a:extLst>
               <a:ext uri="{91240B29-F687-4f45-9708-019B960494DF}">
-                <a14:hiddenLine xmlns="" xmlns:a14="http://schemas.microsoft.com/office/drawing/2010/main" w="9525">
+                <a14:hiddenLine xmlns:a14="http://schemas.microsoft.com/office/drawing/2010/main" xmlns="" w="9525">
                   <a:solidFill>
                     <a:srgbClr val="000000"/>
                   </a:solidFill>
@@ -4100,7 +4102,7 @@
             </a:ln>
             <a:extLst>
               <a:ext uri="{91240B29-F687-4f45-9708-019B960494DF}">
-                <a14:hiddenLine xmlns="" xmlns:a14="http://schemas.microsoft.com/office/drawing/2010/main" w="9525">
+                <a14:hiddenLine xmlns:a14="http://schemas.microsoft.com/office/drawing/2010/main" xmlns="" w="9525">
                   <a:solidFill>
                     <a:srgbClr val="000000"/>
                   </a:solidFill>
@@ -4168,7 +4170,7 @@
             </a:ln>
             <a:extLst>
               <a:ext uri="{91240B29-F687-4f45-9708-019B960494DF}">
-                <a14:hiddenLine xmlns="" xmlns:a14="http://schemas.microsoft.com/office/drawing/2010/main" w="9525">
+                <a14:hiddenLine xmlns:a14="http://schemas.microsoft.com/office/drawing/2010/main" xmlns="" w="9525">
                   <a:solidFill>
                     <a:srgbClr val="000000"/>
                   </a:solidFill>
@@ -4258,7 +4260,7 @@
             </a:ln>
             <a:extLst>
               <a:ext uri="{91240B29-F687-4f45-9708-019B960494DF}">
-                <a14:hiddenLine xmlns="" xmlns:a14="http://schemas.microsoft.com/office/drawing/2010/main" w="9525">
+                <a14:hiddenLine xmlns:a14="http://schemas.microsoft.com/office/drawing/2010/main" xmlns="" w="9525">
                   <a:solidFill>
                     <a:srgbClr val="000000"/>
                   </a:solidFill>
@@ -4398,7 +4400,7 @@
           <a:p>
             <a:fld id="{48A87A34-81AB-432B-8DAE-1953F412C126}" type="datetimeFigureOut">
               <a:rPr lang="en-US" dirty="0"/>
-              <a:t>12/9/2018</a:t>
+              <a:t>12/11/2018</a:t>
             </a:fld>
             <a:endParaRPr lang="en-US" dirty="0"/>
           </a:p>
@@ -4660,7 +4662,7 @@
           <a:p>
             <a:fld id="{48A87A34-81AB-432B-8DAE-1953F412C126}" type="datetimeFigureOut">
               <a:rPr lang="en-US" dirty="0"/>
-              <a:t>12/9/2018</a:t>
+              <a:t>12/11/2018</a:t>
             </a:fld>
             <a:endParaRPr lang="en-US" dirty="0"/>
           </a:p>
@@ -4851,7 +4853,7 @@
           <a:p>
             <a:fld id="{48A87A34-81AB-432B-8DAE-1953F412C126}" type="datetimeFigureOut">
               <a:rPr lang="en-US" dirty="0"/>
-              <a:t>12/9/2018</a:t>
+              <a:t>12/11/2018</a:t>
             </a:fld>
             <a:endParaRPr lang="en-US" dirty="0"/>
           </a:p>
@@ -5109,7 +5111,7 @@
           <a:p>
             <a:fld id="{48A87A34-81AB-432B-8DAE-1953F412C126}" type="datetimeFigureOut">
               <a:rPr lang="en-US" dirty="0"/>
-              <a:t>12/9/2018</a:t>
+              <a:t>12/11/2018</a:t>
             </a:fld>
             <a:endParaRPr lang="en-US" dirty="0"/>
           </a:p>
@@ -5538,7 +5540,7 @@
           <a:p>
             <a:fld id="{48A87A34-81AB-432B-8DAE-1953F412C126}" type="datetimeFigureOut">
               <a:rPr lang="en-US" dirty="0"/>
-              <a:t>12/9/2018</a:t>
+              <a:t>12/11/2018</a:t>
             </a:fld>
             <a:endParaRPr lang="en-US" dirty="0"/>
           </a:p>
@@ -6079,7 +6081,7 @@
           <a:p>
             <a:fld id="{48A87A34-81AB-432B-8DAE-1953F412C126}" type="datetimeFigureOut">
               <a:rPr lang="en-US" dirty="0"/>
-              <a:t>12/9/2018</a:t>
+              <a:t>12/11/2018</a:t>
             </a:fld>
             <a:endParaRPr lang="en-US" dirty="0"/>
           </a:p>
@@ -6794,7 +6796,7 @@
           <a:p>
             <a:fld id="{48A87A34-81AB-432B-8DAE-1953F412C126}" type="datetimeFigureOut">
               <a:rPr lang="en-US" dirty="0"/>
-              <a:t>12/9/2018</a:t>
+              <a:t>12/11/2018</a:t>
             </a:fld>
             <a:endParaRPr lang="en-US" dirty="0"/>
           </a:p>
@@ -6959,7 +6961,7 @@
           <a:p>
             <a:fld id="{48A87A34-81AB-432B-8DAE-1953F412C126}" type="datetimeFigureOut">
               <a:rPr lang="en-US" dirty="0"/>
-              <a:t>12/9/2018</a:t>
+              <a:t>12/11/2018</a:t>
             </a:fld>
             <a:endParaRPr lang="en-US" dirty="0"/>
           </a:p>
@@ -7134,7 +7136,7 @@
           <a:p>
             <a:fld id="{48A87A34-81AB-432B-8DAE-1953F412C126}" type="datetimeFigureOut">
               <a:rPr lang="en-US" dirty="0"/>
-              <a:t>12/9/2018</a:t>
+              <a:t>12/11/2018</a:t>
             </a:fld>
             <a:endParaRPr lang="en-US" dirty="0"/>
           </a:p>
@@ -7299,7 +7301,7 @@
           <a:p>
             <a:fld id="{48A87A34-81AB-432B-8DAE-1953F412C126}" type="datetimeFigureOut">
               <a:rPr lang="en-US" dirty="0"/>
-              <a:t>12/9/2018</a:t>
+              <a:t>12/11/2018</a:t>
             </a:fld>
             <a:endParaRPr lang="en-US" dirty="0"/>
           </a:p>
@@ -7544,7 +7546,7 @@
           <a:p>
             <a:fld id="{48A87A34-81AB-432B-8DAE-1953F412C126}" type="datetimeFigureOut">
               <a:rPr lang="en-US" dirty="0"/>
-              <a:t>12/9/2018</a:t>
+              <a:t>12/11/2018</a:t>
             </a:fld>
             <a:endParaRPr lang="en-US" dirty="0"/>
           </a:p>
@@ -7771,7 +7773,7 @@
           <a:p>
             <a:fld id="{48A87A34-81AB-432B-8DAE-1953F412C126}" type="datetimeFigureOut">
               <a:rPr lang="en-US" dirty="0"/>
-              <a:t>12/9/2018</a:t>
+              <a:t>12/11/2018</a:t>
             </a:fld>
             <a:endParaRPr lang="en-US" dirty="0"/>
           </a:p>
@@ -8147,7 +8149,7 @@
           <a:p>
             <a:fld id="{48A87A34-81AB-432B-8DAE-1953F412C126}" type="datetimeFigureOut">
               <a:rPr lang="en-US" dirty="0"/>
-              <a:t>12/9/2018</a:t>
+              <a:t>12/11/2018</a:t>
             </a:fld>
             <a:endParaRPr lang="en-US" dirty="0"/>
           </a:p>
@@ -8260,7 +8262,7 @@
           <a:p>
             <a:fld id="{48A87A34-81AB-432B-8DAE-1953F412C126}" type="datetimeFigureOut">
               <a:rPr lang="en-US" dirty="0"/>
-              <a:t>12/9/2018</a:t>
+              <a:t>12/11/2018</a:t>
             </a:fld>
             <a:endParaRPr lang="en-US" dirty="0"/>
           </a:p>
@@ -8350,7 +8352,7 @@
           <a:p>
             <a:fld id="{48A87A34-81AB-432B-8DAE-1953F412C126}" type="datetimeFigureOut">
               <a:rPr lang="en-US" dirty="0"/>
-              <a:t>12/9/2018</a:t>
+              <a:t>12/11/2018</a:t>
             </a:fld>
             <a:endParaRPr lang="en-US" dirty="0"/>
           </a:p>
@@ -8594,7 +8596,7 @@
           <a:p>
             <a:fld id="{48A87A34-81AB-432B-8DAE-1953F412C126}" type="datetimeFigureOut">
               <a:rPr lang="en-US" dirty="0"/>
-              <a:t>12/9/2018</a:t>
+              <a:t>12/11/2018</a:t>
             </a:fld>
             <a:endParaRPr lang="en-US" dirty="0"/>
           </a:p>
@@ -8869,7 +8871,7 @@
           <a:p>
             <a:fld id="{48A87A34-81AB-432B-8DAE-1953F412C126}" type="datetimeFigureOut">
               <a:rPr lang="en-US" dirty="0"/>
-              <a:t>12/9/2018</a:t>
+              <a:t>12/11/2018</a:t>
             </a:fld>
             <a:endParaRPr lang="en-US" dirty="0"/>
           </a:p>
@@ -8980,7 +8982,7 @@
           <a:noFill/>
           <a:extLst>
             <a:ext uri="{909E8E84-426E-40dd-AFC4-6F175D3DCCD1}">
-              <a14:hiddenFill xmlns="" xmlns:a14="http://schemas.microsoft.com/office/drawing/2010/main">
+              <a14:hiddenFill xmlns:a14="http://schemas.microsoft.com/office/drawing/2010/main" xmlns="">
                 <a:solidFill>
                   <a:srgbClr val="FFFFFF"/>
                 </a:solidFill>
@@ -9054,7 +9056,7 @@
               </a:ln>
               <a:extLst>
                 <a:ext uri="{91240B29-F687-4f45-9708-019B960494DF}">
-                  <a14:hiddenLine xmlns="" xmlns:a14="http://schemas.microsoft.com/office/drawing/2010/main" w="9525">
+                  <a14:hiddenLine xmlns:a14="http://schemas.microsoft.com/office/drawing/2010/main" xmlns="" w="9525">
                     <a:solidFill>
                       <a:srgbClr val="000000"/>
                     </a:solidFill>
@@ -9144,7 +9146,7 @@
               </a:ln>
               <a:extLst>
                 <a:ext uri="{91240B29-F687-4f45-9708-019B960494DF}">
-                  <a14:hiddenLine xmlns="" xmlns:a14="http://schemas.microsoft.com/office/drawing/2010/main" w="9525">
+                  <a14:hiddenLine xmlns:a14="http://schemas.microsoft.com/office/drawing/2010/main" xmlns="" w="9525">
                     <a:solidFill>
                       <a:srgbClr val="000000"/>
                     </a:solidFill>
@@ -9234,7 +9236,7 @@
               </a:ln>
               <a:extLst>
                 <a:ext uri="{91240B29-F687-4f45-9708-019B960494DF}">
-                  <a14:hiddenLine xmlns="" xmlns:a14="http://schemas.microsoft.com/office/drawing/2010/main" w="9525">
+                  <a14:hiddenLine xmlns:a14="http://schemas.microsoft.com/office/drawing/2010/main" xmlns="" w="9525">
                     <a:solidFill>
                       <a:srgbClr val="000000"/>
                     </a:solidFill>
@@ -9296,7 +9298,7 @@
               </a:ln>
               <a:extLst>
                 <a:ext uri="{91240B29-F687-4f45-9708-019B960494DF}">
-                  <a14:hiddenLine xmlns="" xmlns:a14="http://schemas.microsoft.com/office/drawing/2010/main" w="9525">
+                  <a14:hiddenLine xmlns:a14="http://schemas.microsoft.com/office/drawing/2010/main" xmlns="" w="9525">
                     <a:solidFill>
                       <a:srgbClr val="000000"/>
                     </a:solidFill>
@@ -9386,7 +9388,7 @@
               </a:ln>
               <a:extLst>
                 <a:ext uri="{91240B29-F687-4f45-9708-019B960494DF}">
-                  <a14:hiddenLine xmlns="" xmlns:a14="http://schemas.microsoft.com/office/drawing/2010/main" w="9525">
+                  <a14:hiddenLine xmlns:a14="http://schemas.microsoft.com/office/drawing/2010/main" xmlns="" w="9525">
                     <a:solidFill>
                       <a:srgbClr val="000000"/>
                     </a:solidFill>
@@ -9448,7 +9450,7 @@
               </a:ln>
               <a:extLst>
                 <a:ext uri="{91240B29-F687-4f45-9708-019B960494DF}">
-                  <a14:hiddenLine xmlns="" xmlns:a14="http://schemas.microsoft.com/office/drawing/2010/main" w="9525">
+                  <a14:hiddenLine xmlns:a14="http://schemas.microsoft.com/office/drawing/2010/main" xmlns="" w="9525">
                     <a:solidFill>
                       <a:srgbClr val="000000"/>
                     </a:solidFill>
@@ -9510,7 +9512,7 @@
               </a:ln>
               <a:extLst>
                 <a:ext uri="{91240B29-F687-4f45-9708-019B960494DF}">
-                  <a14:hiddenLine xmlns="" xmlns:a14="http://schemas.microsoft.com/office/drawing/2010/main" w="9525">
+                  <a14:hiddenLine xmlns:a14="http://schemas.microsoft.com/office/drawing/2010/main" xmlns="" w="9525">
                     <a:solidFill>
                       <a:srgbClr val="000000"/>
                     </a:solidFill>
@@ -9600,7 +9602,7 @@
               </a:ln>
               <a:extLst>
                 <a:ext uri="{91240B29-F687-4f45-9708-019B960494DF}">
-                  <a14:hiddenLine xmlns="" xmlns:a14="http://schemas.microsoft.com/office/drawing/2010/main" w="9525">
+                  <a14:hiddenLine xmlns:a14="http://schemas.microsoft.com/office/drawing/2010/main" xmlns="" w="9525">
                     <a:solidFill>
                       <a:srgbClr val="000000"/>
                     </a:solidFill>
@@ -9690,7 +9692,7 @@
               </a:ln>
               <a:extLst>
                 <a:ext uri="{91240B29-F687-4f45-9708-019B960494DF}">
-                  <a14:hiddenLine xmlns="" xmlns:a14="http://schemas.microsoft.com/office/drawing/2010/main" w="9525">
+                  <a14:hiddenLine xmlns:a14="http://schemas.microsoft.com/office/drawing/2010/main" xmlns="" w="9525">
                     <a:solidFill>
                       <a:srgbClr val="000000"/>
                     </a:solidFill>
@@ -9752,7 +9754,7 @@
               </a:ln>
               <a:extLst>
                 <a:ext uri="{91240B29-F687-4f45-9708-019B960494DF}">
-                  <a14:hiddenLine xmlns="" xmlns:a14="http://schemas.microsoft.com/office/drawing/2010/main" w="9525">
+                  <a14:hiddenLine xmlns:a14="http://schemas.microsoft.com/office/drawing/2010/main" xmlns="" w="9525">
                     <a:solidFill>
                       <a:srgbClr val="000000"/>
                     </a:solidFill>
@@ -9862,7 +9864,7 @@
               </a:ln>
               <a:extLst>
                 <a:ext uri="{91240B29-F687-4f45-9708-019B960494DF}">
-                  <a14:hiddenLine xmlns="" xmlns:a14="http://schemas.microsoft.com/office/drawing/2010/main" w="9525">
+                  <a14:hiddenLine xmlns:a14="http://schemas.microsoft.com/office/drawing/2010/main" xmlns="" w="9525">
                     <a:solidFill>
                       <a:srgbClr val="000000"/>
                     </a:solidFill>
@@ -9946,7 +9948,7 @@
               </a:ln>
               <a:extLst>
                 <a:ext uri="{91240B29-F687-4f45-9708-019B960494DF}">
-                  <a14:hiddenLine xmlns="" xmlns:a14="http://schemas.microsoft.com/office/drawing/2010/main" w="9525">
+                  <a14:hiddenLine xmlns:a14="http://schemas.microsoft.com/office/drawing/2010/main" xmlns="" w="9525">
                     <a:solidFill>
                       <a:srgbClr val="000000"/>
                     </a:solidFill>
@@ -10008,7 +10010,7 @@
               </a:ln>
               <a:extLst>
                 <a:ext uri="{91240B29-F687-4f45-9708-019B960494DF}">
-                  <a14:hiddenLine xmlns="" xmlns:a14="http://schemas.microsoft.com/office/drawing/2010/main" w="9525">
+                  <a14:hiddenLine xmlns:a14="http://schemas.microsoft.com/office/drawing/2010/main" xmlns="" w="9525">
                     <a:solidFill>
                       <a:srgbClr val="000000"/>
                     </a:solidFill>
@@ -10070,7 +10072,7 @@
               </a:ln>
               <a:extLst>
                 <a:ext uri="{91240B29-F687-4f45-9708-019B960494DF}">
-                  <a14:hiddenLine xmlns="" xmlns:a14="http://schemas.microsoft.com/office/drawing/2010/main" w="9525">
+                  <a14:hiddenLine xmlns:a14="http://schemas.microsoft.com/office/drawing/2010/main" xmlns="" w="9525">
                     <a:solidFill>
                       <a:srgbClr val="000000"/>
                     </a:solidFill>
@@ -10160,7 +10162,7 @@
               </a:ln>
               <a:extLst>
                 <a:ext uri="{91240B29-F687-4f45-9708-019B960494DF}">
-                  <a14:hiddenLine xmlns="" xmlns:a14="http://schemas.microsoft.com/office/drawing/2010/main" w="9525">
+                  <a14:hiddenLine xmlns:a14="http://schemas.microsoft.com/office/drawing/2010/main" xmlns="" w="9525">
                     <a:solidFill>
                       <a:srgbClr val="000000"/>
                     </a:solidFill>
@@ -10194,7 +10196,7 @@
               </a:ln>
               <a:extLst>
                 <a:ext uri="{91240B29-F687-4f45-9708-019B960494DF}">
-                  <a14:hiddenLine xmlns="" xmlns:a14="http://schemas.microsoft.com/office/drawing/2010/main" w="9525">
+                  <a14:hiddenLine xmlns:a14="http://schemas.microsoft.com/office/drawing/2010/main" xmlns="" w="9525">
                     <a:solidFill>
                       <a:srgbClr val="000000"/>
                     </a:solidFill>
@@ -10259,7 +10261,7 @@
               </a:ln>
               <a:extLst>
                 <a:ext uri="{91240B29-F687-4f45-9708-019B960494DF}">
-                  <a14:hiddenLine xmlns="" xmlns:a14="http://schemas.microsoft.com/office/drawing/2010/main" w="9525">
+                  <a14:hiddenLine xmlns:a14="http://schemas.microsoft.com/office/drawing/2010/main" xmlns="" w="9525">
                     <a:solidFill>
                       <a:srgbClr val="000000"/>
                     </a:solidFill>
@@ -10349,7 +10351,7 @@
               </a:ln>
               <a:extLst>
                 <a:ext uri="{91240B29-F687-4f45-9708-019B960494DF}">
-                  <a14:hiddenLine xmlns="" xmlns:a14="http://schemas.microsoft.com/office/drawing/2010/main" w="9525">
+                  <a14:hiddenLine xmlns:a14="http://schemas.microsoft.com/office/drawing/2010/main" xmlns="" w="9525">
                     <a:solidFill>
                       <a:srgbClr val="000000"/>
                     </a:solidFill>
@@ -10411,7 +10413,7 @@
               </a:ln>
               <a:extLst>
                 <a:ext uri="{91240B29-F687-4f45-9708-019B960494DF}">
-                  <a14:hiddenLine xmlns="" xmlns:a14="http://schemas.microsoft.com/office/drawing/2010/main" w="9525">
+                  <a14:hiddenLine xmlns:a14="http://schemas.microsoft.com/office/drawing/2010/main" xmlns="" w="9525">
                     <a:solidFill>
                       <a:srgbClr val="000000"/>
                     </a:solidFill>
@@ -10501,7 +10503,7 @@
               </a:ln>
               <a:extLst>
                 <a:ext uri="{91240B29-F687-4f45-9708-019B960494DF}">
-                  <a14:hiddenLine xmlns="" xmlns:a14="http://schemas.microsoft.com/office/drawing/2010/main" w="9525">
+                  <a14:hiddenLine xmlns:a14="http://schemas.microsoft.com/office/drawing/2010/main" xmlns="" w="9525">
                     <a:solidFill>
                       <a:srgbClr val="000000"/>
                     </a:solidFill>
@@ -10566,7 +10568,7 @@
               </a:ln>
               <a:extLst>
                 <a:ext uri="{91240B29-F687-4f45-9708-019B960494DF}">
-                  <a14:hiddenLine xmlns="" xmlns:a14="http://schemas.microsoft.com/office/drawing/2010/main" w="9525">
+                  <a14:hiddenLine xmlns:a14="http://schemas.microsoft.com/office/drawing/2010/main" xmlns="" w="9525">
                     <a:solidFill>
                       <a:srgbClr val="000000"/>
                     </a:solidFill>
@@ -10628,7 +10630,7 @@
               </a:ln>
               <a:extLst>
                 <a:ext uri="{91240B29-F687-4f45-9708-019B960494DF}">
-                  <a14:hiddenLine xmlns="" xmlns:a14="http://schemas.microsoft.com/office/drawing/2010/main" w="9525">
+                  <a14:hiddenLine xmlns:a14="http://schemas.microsoft.com/office/drawing/2010/main" xmlns="" w="9525">
                     <a:solidFill>
                       <a:srgbClr val="000000"/>
                     </a:solidFill>
@@ -10718,7 +10720,7 @@
               </a:ln>
               <a:extLst>
                 <a:ext uri="{91240B29-F687-4f45-9708-019B960494DF}">
-                  <a14:hiddenLine xmlns="" xmlns:a14="http://schemas.microsoft.com/office/drawing/2010/main" w="9525">
+                  <a14:hiddenLine xmlns:a14="http://schemas.microsoft.com/office/drawing/2010/main" xmlns="" w="9525">
                     <a:solidFill>
                       <a:srgbClr val="000000"/>
                     </a:solidFill>
@@ -10808,7 +10810,7 @@
               </a:ln>
               <a:extLst>
                 <a:ext uri="{91240B29-F687-4f45-9708-019B960494DF}">
-                  <a14:hiddenLine xmlns="" xmlns:a14="http://schemas.microsoft.com/office/drawing/2010/main" w="9525">
+                  <a14:hiddenLine xmlns:a14="http://schemas.microsoft.com/office/drawing/2010/main" xmlns="" w="9525">
                     <a:solidFill>
                       <a:srgbClr val="000000"/>
                     </a:solidFill>
@@ -10873,7 +10875,7 @@
               </a:ln>
               <a:extLst>
                 <a:ext uri="{91240B29-F687-4f45-9708-019B960494DF}">
-                  <a14:hiddenLine xmlns="" xmlns:a14="http://schemas.microsoft.com/office/drawing/2010/main" w="9525">
+                  <a14:hiddenLine xmlns:a14="http://schemas.microsoft.com/office/drawing/2010/main" xmlns="" w="9525">
                     <a:solidFill>
                       <a:srgbClr val="000000"/>
                     </a:solidFill>
@@ -10993,7 +10995,7 @@
               </a:ln>
               <a:extLst>
                 <a:ext uri="{91240B29-F687-4f45-9708-019B960494DF}">
-                  <a14:hiddenLine xmlns="" xmlns:a14="http://schemas.microsoft.com/office/drawing/2010/main" w="9525">
+                  <a14:hiddenLine xmlns:a14="http://schemas.microsoft.com/office/drawing/2010/main" xmlns="" w="9525">
                     <a:solidFill>
                       <a:srgbClr val="000000"/>
                     </a:solidFill>
@@ -11091,7 +11093,7 @@
               </a:ln>
               <a:extLst>
                 <a:ext uri="{91240B29-F687-4f45-9708-019B960494DF}">
-                  <a14:hiddenLine xmlns="" xmlns:a14="http://schemas.microsoft.com/office/drawing/2010/main" w="9525">
+                  <a14:hiddenLine xmlns:a14="http://schemas.microsoft.com/office/drawing/2010/main" xmlns="" w="9525">
                     <a:solidFill>
                       <a:srgbClr val="000000"/>
                     </a:solidFill>
@@ -11206,7 +11208,7 @@
               </a:ln>
               <a:extLst>
                 <a:ext uri="{91240B29-F687-4f45-9708-019B960494DF}">
-                  <a14:hiddenLine xmlns="" xmlns:a14="http://schemas.microsoft.com/office/drawing/2010/main" w="9525">
+                  <a14:hiddenLine xmlns:a14="http://schemas.microsoft.com/office/drawing/2010/main" xmlns="" w="9525">
                     <a:solidFill>
                       <a:srgbClr val="000000"/>
                     </a:solidFill>
@@ -11296,7 +11298,7 @@
               </a:ln>
               <a:extLst>
                 <a:ext uri="{91240B29-F687-4f45-9708-019B960494DF}">
-                  <a14:hiddenLine xmlns="" xmlns:a14="http://schemas.microsoft.com/office/drawing/2010/main" w="9525">
+                  <a14:hiddenLine xmlns:a14="http://schemas.microsoft.com/office/drawing/2010/main" xmlns="" w="9525">
                     <a:solidFill>
                       <a:srgbClr val="000000"/>
                     </a:solidFill>
@@ -11361,7 +11363,7 @@
               </a:ln>
               <a:extLst>
                 <a:ext uri="{91240B29-F687-4f45-9708-019B960494DF}">
-                  <a14:hiddenLine xmlns="" xmlns:a14="http://schemas.microsoft.com/office/drawing/2010/main" w="9525">
+                  <a14:hiddenLine xmlns:a14="http://schemas.microsoft.com/office/drawing/2010/main" xmlns="" w="9525">
                     <a:solidFill>
                       <a:srgbClr val="000000"/>
                     </a:solidFill>
@@ -11451,7 +11453,7 @@
               </a:ln>
               <a:extLst>
                 <a:ext uri="{91240B29-F687-4f45-9708-019B960494DF}">
-                  <a14:hiddenLine xmlns="" xmlns:a14="http://schemas.microsoft.com/office/drawing/2010/main" w="9525">
+                  <a14:hiddenLine xmlns:a14="http://schemas.microsoft.com/office/drawing/2010/main" xmlns="" w="9525">
                     <a:solidFill>
                       <a:srgbClr val="000000"/>
                     </a:solidFill>
@@ -11519,7 +11521,7 @@
               </a:ln>
               <a:extLst>
                 <a:ext uri="{91240B29-F687-4f45-9708-019B960494DF}">
-                  <a14:hiddenLine xmlns="" xmlns:a14="http://schemas.microsoft.com/office/drawing/2010/main" w="9525">
+                  <a14:hiddenLine xmlns:a14="http://schemas.microsoft.com/office/drawing/2010/main" xmlns="" w="9525">
                     <a:solidFill>
                       <a:srgbClr val="000000"/>
                     </a:solidFill>
@@ -11609,7 +11611,7 @@
               </a:ln>
               <a:extLst>
                 <a:ext uri="{91240B29-F687-4f45-9708-019B960494DF}">
-                  <a14:hiddenLine xmlns="" xmlns:a14="http://schemas.microsoft.com/office/drawing/2010/main" w="9525">
+                  <a14:hiddenLine xmlns:a14="http://schemas.microsoft.com/office/drawing/2010/main" xmlns="" w="9525">
                     <a:solidFill>
                       <a:srgbClr val="000000"/>
                     </a:solidFill>
@@ -11677,7 +11679,7 @@
               </a:ln>
               <a:extLst>
                 <a:ext uri="{91240B29-F687-4f45-9708-019B960494DF}">
-                  <a14:hiddenLine xmlns="" xmlns:a14="http://schemas.microsoft.com/office/drawing/2010/main" w="9525">
+                  <a14:hiddenLine xmlns:a14="http://schemas.microsoft.com/office/drawing/2010/main" xmlns="" w="9525">
                     <a:solidFill>
                       <a:srgbClr val="000000"/>
                     </a:solidFill>
@@ -11767,7 +11769,7 @@
               </a:ln>
               <a:extLst>
                 <a:ext uri="{91240B29-F687-4f45-9708-019B960494DF}">
-                  <a14:hiddenLine xmlns="" xmlns:a14="http://schemas.microsoft.com/office/drawing/2010/main" w="9525">
+                  <a14:hiddenLine xmlns:a14="http://schemas.microsoft.com/office/drawing/2010/main" xmlns="" w="9525">
                     <a:solidFill>
                       <a:srgbClr val="000000"/>
                     </a:solidFill>
@@ -11801,7 +11803,7 @@
               </a:ln>
               <a:extLst>
                 <a:ext uri="{91240B29-F687-4f45-9708-019B960494DF}">
-                  <a14:hiddenLine xmlns="" xmlns:a14="http://schemas.microsoft.com/office/drawing/2010/main" w="9525">
+                  <a14:hiddenLine xmlns:a14="http://schemas.microsoft.com/office/drawing/2010/main" xmlns="" w="9525">
                     <a:solidFill>
                       <a:srgbClr val="000000"/>
                     </a:solidFill>
@@ -11942,7 +11944,7 @@
             <a:fld id="{48A87A34-81AB-432B-8DAE-1953F412C126}" type="datetimeFigureOut">
               <a:rPr lang="en-US" dirty="0"/>
               <a:pPr/>
-              <a:t>12/9/2018</a:t>
+              <a:t>12/11/2018</a:t>
             </a:fld>
             <a:endParaRPr lang="en-US" dirty="0"/>
           </a:p>
@@ -12438,13 +12440,13 @@
   <p:clrMapOvr>
     <a:masterClrMapping/>
   </p:clrMapOvr>
-  <mc:AlternateContent xmlns:mc="http://schemas.openxmlformats.org/markup-compatibility/2006">
-    <mc:Choice xmlns:p159="http://schemas.microsoft.com/office/powerpoint/2015/09/main" Requires="p159">
+  <mc:AlternateContent xmlns:mc="http://schemas.openxmlformats.org/markup-compatibility/2006" xmlns:p159="http://schemas.microsoft.com/office/powerpoint/2015/09/main">
+    <mc:Choice Requires="p159">
       <p:transition xmlns:p14="http://schemas.microsoft.com/office/powerpoint/2010/main" spd="slow" p14:dur="2000">
         <p159:morph option="byObject"/>
       </p:transition>
     </mc:Choice>
-    <mc:Fallback>
+    <mc:Fallback xmlns="">
       <p:transition spd="slow">
         <p:fade/>
       </p:transition>
@@ -12594,13 +12596,13 @@
   <p:clrMapOvr>
     <a:masterClrMapping/>
   </p:clrMapOvr>
-  <mc:AlternateContent xmlns:mc="http://schemas.openxmlformats.org/markup-compatibility/2006">
-    <mc:Choice xmlns:p14="http://schemas.microsoft.com/office/powerpoint/2010/main" Requires="p14">
+  <mc:AlternateContent xmlns:mc="http://schemas.openxmlformats.org/markup-compatibility/2006" xmlns:p14="http://schemas.microsoft.com/office/powerpoint/2010/main">
+    <mc:Choice Requires="p14">
       <p:transition spd="med" p14:dur="700">
         <p:fade/>
       </p:transition>
     </mc:Choice>
-    <mc:Fallback>
+    <mc:Fallback xmlns="">
       <p:transition spd="med">
         <p:fade/>
       </p:transition>
@@ -12610,6 +12612,293 @@
 </file>
 
 <file path=ppt/slides/slide11.xml><?xml version="1.0" encoding="utf-8"?>
+<p:sld xmlns:a="http://schemas.openxmlformats.org/drawingml/2006/main" xmlns:r="http://schemas.openxmlformats.org/officeDocument/2006/relationships" xmlns:p="http://schemas.openxmlformats.org/presentationml/2006/main">
+  <p:cSld>
+    <p:spTree>
+      <p:nvGrpSpPr>
+        <p:cNvPr id="1" name=""/>
+        <p:cNvGrpSpPr/>
+        <p:nvPr/>
+      </p:nvGrpSpPr>
+      <p:grpSpPr>
+        <a:xfrm>
+          <a:off x="0" y="0"/>
+          <a:ext cx="0" cy="0"/>
+          <a:chOff x="0" y="0"/>
+          <a:chExt cx="0" cy="0"/>
+        </a:xfrm>
+      </p:grpSpPr>
+      <p:sp>
+        <p:nvSpPr>
+          <p:cNvPr id="2" name="Title 1">
+            <a:extLst>
+              <a:ext uri="{FF2B5EF4-FFF2-40B4-BE49-F238E27FC236}">
+                <a16:creationId xmlns:a16="http://schemas.microsoft.com/office/drawing/2014/main" id="{448AD68D-107D-4F8E-A066-C67410D851A7}"/>
+              </a:ext>
+            </a:extLst>
+          </p:cNvPr>
+          <p:cNvSpPr>
+            <a:spLocks noGrp="1"/>
+          </p:cNvSpPr>
+          <p:nvPr>
+            <p:ph type="title"/>
+          </p:nvPr>
+        </p:nvSpPr>
+        <p:spPr/>
+        <p:txBody>
+          <a:bodyPr/>
+          <a:lstStyle/>
+          <a:p>
+            <a:pPr algn="ctr"/>
+            <a:r>
+              <a:rPr lang="en-US" dirty="0"/>
+              <a:t>Results</a:t>
+            </a:r>
+          </a:p>
+        </p:txBody>
+      </p:sp>
+      <p:pic>
+        <p:nvPicPr>
+          <p:cNvPr id="4" name="Picture 3">
+            <a:extLst>
+              <a:ext uri="{FF2B5EF4-FFF2-40B4-BE49-F238E27FC236}">
+                <a16:creationId xmlns:a16="http://schemas.microsoft.com/office/drawing/2014/main" id="{6FBE0CB0-9B82-487C-B928-3DD08EB3429E}"/>
+              </a:ext>
+            </a:extLst>
+          </p:cNvPr>
+          <p:cNvPicPr>
+            <a:picLocks noChangeAspect="1"/>
+          </p:cNvPicPr>
+          <p:nvPr/>
+        </p:nvPicPr>
+        <p:blipFill>
+          <a:blip r:embed="rId2"/>
+          <a:stretch>
+            <a:fillRect/>
+          </a:stretch>
+        </p:blipFill>
+        <p:spPr>
+          <a:xfrm>
+            <a:off x="565149" y="1704597"/>
+            <a:ext cx="5300663" cy="3448805"/>
+          </a:xfrm>
+          <a:prstGeom prst="rect">
+            <a:avLst/>
+          </a:prstGeom>
+        </p:spPr>
+      </p:pic>
+      <p:pic>
+        <p:nvPicPr>
+          <p:cNvPr id="6" name="Picture 5">
+            <a:extLst>
+              <a:ext uri="{FF2B5EF4-FFF2-40B4-BE49-F238E27FC236}">
+                <a16:creationId xmlns:a16="http://schemas.microsoft.com/office/drawing/2014/main" id="{A46BD123-4AA1-4550-B845-38AF055A15D4}"/>
+              </a:ext>
+            </a:extLst>
+          </p:cNvPr>
+          <p:cNvPicPr>
+            <a:picLocks noChangeAspect="1"/>
+          </p:cNvPicPr>
+          <p:nvPr/>
+        </p:nvPicPr>
+        <p:blipFill>
+          <a:blip r:embed="rId3"/>
+          <a:stretch>
+            <a:fillRect/>
+          </a:stretch>
+        </p:blipFill>
+        <p:spPr>
+          <a:xfrm>
+            <a:off x="5508624" y="1704597"/>
+            <a:ext cx="5895975" cy="3456818"/>
+          </a:xfrm>
+          <a:prstGeom prst="rect">
+            <a:avLst/>
+          </a:prstGeom>
+        </p:spPr>
+      </p:pic>
+      <p:sp>
+        <p:nvSpPr>
+          <p:cNvPr id="7" name="TextBox 6">
+            <a:extLst>
+              <a:ext uri="{FF2B5EF4-FFF2-40B4-BE49-F238E27FC236}">
+                <a16:creationId xmlns:a16="http://schemas.microsoft.com/office/drawing/2014/main" id="{3F92369C-3DF6-4D78-B864-B9C51AE8FECA}"/>
+              </a:ext>
+            </a:extLst>
+          </p:cNvPr>
+          <p:cNvSpPr txBox="1"/>
+          <p:nvPr/>
+        </p:nvSpPr>
+        <p:spPr>
+          <a:xfrm>
+            <a:off x="1176332" y="5400675"/>
+            <a:ext cx="4078296" cy="369332"/>
+          </a:xfrm>
+          <a:prstGeom prst="rect">
+            <a:avLst/>
+          </a:prstGeom>
+          <a:noFill/>
+        </p:spPr>
+        <p:txBody>
+          <a:bodyPr wrap="none" rtlCol="0">
+            <a:spAutoFit/>
+          </a:bodyPr>
+          <a:lstStyle/>
+          <a:p>
+            <a:r>
+              <a:rPr lang="en-US" dirty="0"/>
+              <a:t>*y test – how our data should have looked</a:t>
+            </a:r>
+          </a:p>
+        </p:txBody>
+      </p:sp>
+      <p:sp>
+        <p:nvSpPr>
+          <p:cNvPr id="8" name="TextBox 7">
+            <a:extLst>
+              <a:ext uri="{FF2B5EF4-FFF2-40B4-BE49-F238E27FC236}">
+                <a16:creationId xmlns:a16="http://schemas.microsoft.com/office/drawing/2014/main" id="{CB816B9D-7B09-4F6D-841F-CFB7D9D4CE21}"/>
+              </a:ext>
+            </a:extLst>
+          </p:cNvPr>
+          <p:cNvSpPr txBox="1"/>
+          <p:nvPr/>
+        </p:nvSpPr>
+        <p:spPr>
+          <a:xfrm>
+            <a:off x="6872812" y="5400675"/>
+            <a:ext cx="3167598" cy="369332"/>
+          </a:xfrm>
+          <a:prstGeom prst="rect">
+            <a:avLst/>
+          </a:prstGeom>
+          <a:noFill/>
+        </p:spPr>
+        <p:txBody>
+          <a:bodyPr wrap="none" rtlCol="0">
+            <a:spAutoFit/>
+          </a:bodyPr>
+          <a:lstStyle/>
+          <a:p>
+            <a:r>
+              <a:rPr lang="en-US" dirty="0"/>
+              <a:t>*actual results from our program</a:t>
+            </a:r>
+          </a:p>
+        </p:txBody>
+      </p:sp>
+    </p:spTree>
+    <p:extLst>
+      <p:ext uri="{BB962C8B-B14F-4D97-AF65-F5344CB8AC3E}">
+        <p14:creationId xmlns:p14="http://schemas.microsoft.com/office/powerpoint/2010/main" val="2064525398"/>
+      </p:ext>
+    </p:extLst>
+  </p:cSld>
+  <p:clrMapOvr>
+    <a:masterClrMapping/>
+  </p:clrMapOvr>
+</p:sld>
+</file>
+
+<file path=ppt/slides/slide12.xml><?xml version="1.0" encoding="utf-8"?>
+<p:sld xmlns:a="http://schemas.openxmlformats.org/drawingml/2006/main" xmlns:r="http://schemas.openxmlformats.org/officeDocument/2006/relationships" xmlns:p="http://schemas.openxmlformats.org/presentationml/2006/main">
+  <p:cSld>
+    <p:spTree>
+      <p:nvGrpSpPr>
+        <p:cNvPr id="1" name=""/>
+        <p:cNvGrpSpPr/>
+        <p:nvPr/>
+      </p:nvGrpSpPr>
+      <p:grpSpPr>
+        <a:xfrm>
+          <a:off x="0" y="0"/>
+          <a:ext cx="0" cy="0"/>
+          <a:chOff x="0" y="0"/>
+          <a:chExt cx="0" cy="0"/>
+        </a:xfrm>
+      </p:grpSpPr>
+      <p:sp>
+        <p:nvSpPr>
+          <p:cNvPr id="2" name="Title 1">
+            <a:extLst>
+              <a:ext uri="{FF2B5EF4-FFF2-40B4-BE49-F238E27FC236}">
+                <a16:creationId xmlns:a16="http://schemas.microsoft.com/office/drawing/2014/main" id="{AE208AB8-1AA4-4EA5-9540-FB31ADD82409}"/>
+              </a:ext>
+            </a:extLst>
+          </p:cNvPr>
+          <p:cNvSpPr>
+            <a:spLocks noGrp="1"/>
+          </p:cNvSpPr>
+          <p:nvPr>
+            <p:ph type="title"/>
+          </p:nvPr>
+        </p:nvSpPr>
+        <p:spPr/>
+        <p:txBody>
+          <a:bodyPr/>
+          <a:lstStyle/>
+          <a:p>
+            <a:pPr algn="ctr"/>
+            <a:r>
+              <a:rPr lang="en-US" dirty="0"/>
+              <a:t>Conclusion</a:t>
+            </a:r>
+          </a:p>
+        </p:txBody>
+      </p:sp>
+      <p:sp>
+        <p:nvSpPr>
+          <p:cNvPr id="3" name="Content Placeholder 2">
+            <a:extLst>
+              <a:ext uri="{FF2B5EF4-FFF2-40B4-BE49-F238E27FC236}">
+                <a16:creationId xmlns:a16="http://schemas.microsoft.com/office/drawing/2014/main" id="{50F58851-2D64-4D2F-845C-498319F332C5}"/>
+              </a:ext>
+            </a:extLst>
+          </p:cNvPr>
+          <p:cNvSpPr>
+            <a:spLocks noGrp="1"/>
+          </p:cNvSpPr>
+          <p:nvPr>
+            <p:ph idx="1"/>
+          </p:nvPr>
+        </p:nvSpPr>
+        <p:spPr/>
+        <p:txBody>
+          <a:bodyPr/>
+          <a:lstStyle/>
+          <a:p>
+            <a:r>
+              <a:rPr lang="en-US" dirty="0"/>
+              <a:t>Results not what we expected</a:t>
+            </a:r>
+          </a:p>
+          <a:p>
+            <a:r>
+              <a:rPr lang="en-US" dirty="0"/>
+              <a:t>Likely cause – </a:t>
+            </a:r>
+            <a:r>
+              <a:rPr lang="en-US"/>
+              <a:t>not enough data</a:t>
+            </a:r>
+            <a:endParaRPr lang="en-US" dirty="0"/>
+          </a:p>
+        </p:txBody>
+      </p:sp>
+    </p:spTree>
+    <p:extLst>
+      <p:ext uri="{BB962C8B-B14F-4D97-AF65-F5344CB8AC3E}">
+        <p14:creationId xmlns:p14="http://schemas.microsoft.com/office/powerpoint/2010/main" val="979887035"/>
+      </p:ext>
+    </p:extLst>
+  </p:cSld>
+  <p:clrMapOvr>
+    <a:masterClrMapping/>
+  </p:clrMapOvr>
+</p:sld>
+</file>
+
+<file path=ppt/slides/slide13.xml><?xml version="1.0" encoding="utf-8"?>
 <p:sld xmlns:a="http://schemas.openxmlformats.org/drawingml/2006/main" xmlns:r="http://schemas.openxmlformats.org/officeDocument/2006/relationships" xmlns:p="http://schemas.openxmlformats.org/presentationml/2006/main">
   <p:cSld>
     <p:spTree>
@@ -12838,13 +13127,13 @@
   <p:clrMapOvr>
     <a:masterClrMapping/>
   </p:clrMapOvr>
-  <mc:AlternateContent xmlns:mc="http://schemas.openxmlformats.org/markup-compatibility/2006">
-    <mc:Choice xmlns:p159="http://schemas.microsoft.com/office/powerpoint/2015/09/main" Requires="p159">
+  <mc:AlternateContent xmlns:mc="http://schemas.openxmlformats.org/markup-compatibility/2006" xmlns:p159="http://schemas.microsoft.com/office/powerpoint/2015/09/main">
+    <mc:Choice Requires="p159">
       <p:transition xmlns:p14="http://schemas.microsoft.com/office/powerpoint/2010/main" spd="slow" p14:dur="2000">
         <p159:morph option="byObject"/>
       </p:transition>
     </mc:Choice>
-    <mc:Fallback>
+    <mc:Fallback xmlns="">
       <p:transition spd="slow">
         <p:fade/>
       </p:transition>
@@ -12949,13 +13238,13 @@
   <p:clrMapOvr>
     <a:masterClrMapping/>
   </p:clrMapOvr>
-  <mc:AlternateContent xmlns:mc="http://schemas.openxmlformats.org/markup-compatibility/2006">
-    <mc:Choice xmlns:p159="http://schemas.microsoft.com/office/powerpoint/2015/09/main" Requires="p159">
+  <mc:AlternateContent xmlns:mc="http://schemas.openxmlformats.org/markup-compatibility/2006" xmlns:p159="http://schemas.microsoft.com/office/powerpoint/2015/09/main">
+    <mc:Choice Requires="p159">
       <p:transition xmlns:p14="http://schemas.microsoft.com/office/powerpoint/2010/main" spd="slow" p14:dur="2000">
         <p159:morph option="byObject"/>
       </p:transition>
     </mc:Choice>
-    <mc:Fallback>
+    <mc:Fallback xmlns="">
       <p:transition spd="slow">
         <p:fade/>
       </p:transition>
@@ -13073,13 +13362,13 @@
   <p:clrMapOvr>
     <a:masterClrMapping/>
   </p:clrMapOvr>
-  <mc:AlternateContent xmlns:mc="http://schemas.openxmlformats.org/markup-compatibility/2006">
-    <mc:Choice xmlns:p14="http://schemas.microsoft.com/office/powerpoint/2010/main" Requires="p14">
+  <mc:AlternateContent xmlns:mc="http://schemas.openxmlformats.org/markup-compatibility/2006" xmlns:p14="http://schemas.microsoft.com/office/powerpoint/2010/main">
+    <mc:Choice Requires="p14">
       <p:transition spd="med" p14:dur="700">
         <p:fade/>
       </p:transition>
     </mc:Choice>
-    <mc:Fallback>
+    <mc:Fallback xmlns="">
       <p:transition spd="med">
         <p:fade/>
       </p:transition>
@@ -13207,13 +13496,13 @@
   <p:clrMapOvr>
     <a:masterClrMapping/>
   </p:clrMapOvr>
-  <mc:AlternateContent xmlns:mc="http://schemas.openxmlformats.org/markup-compatibility/2006">
-    <mc:Choice xmlns:p159="http://schemas.microsoft.com/office/powerpoint/2015/09/main" Requires="p159">
+  <mc:AlternateContent xmlns:mc="http://schemas.openxmlformats.org/markup-compatibility/2006" xmlns:p159="http://schemas.microsoft.com/office/powerpoint/2015/09/main">
+    <mc:Choice Requires="p159">
       <p:transition xmlns:p14="http://schemas.microsoft.com/office/powerpoint/2010/main" spd="slow" p14:dur="2000">
         <p159:morph option="byObject"/>
       </p:transition>
     </mc:Choice>
-    <mc:Fallback>
+    <mc:Fallback xmlns="">
       <p:transition spd="slow">
         <p:fade/>
       </p:transition>
@@ -13351,13 +13640,13 @@
   <p:clrMapOvr>
     <a:masterClrMapping/>
   </p:clrMapOvr>
-  <mc:AlternateContent xmlns:mc="http://schemas.openxmlformats.org/markup-compatibility/2006">
-    <mc:Choice xmlns:p159="http://schemas.microsoft.com/office/powerpoint/2015/09/main" Requires="p159">
+  <mc:AlternateContent xmlns:mc="http://schemas.openxmlformats.org/markup-compatibility/2006" xmlns:p159="http://schemas.microsoft.com/office/powerpoint/2015/09/main">
+    <mc:Choice Requires="p159">
       <p:transition xmlns:p14="http://schemas.microsoft.com/office/powerpoint/2010/main" spd="slow" p14:dur="2000">
         <p159:morph option="byObject"/>
       </p:transition>
     </mc:Choice>
-    <mc:Fallback>
+    <mc:Fallback xmlns="">
       <p:transition spd="slow">
         <p:fade/>
       </p:transition>
@@ -13472,13 +13761,13 @@
   <p:clrMapOvr>
     <a:masterClrMapping/>
   </p:clrMapOvr>
-  <mc:AlternateContent xmlns:mc="http://schemas.openxmlformats.org/markup-compatibility/2006">
-    <mc:Choice xmlns:p15="http://schemas.microsoft.com/office/powerpoint/2012/main" Requires="p15">
+  <mc:AlternateContent xmlns:mc="http://schemas.openxmlformats.org/markup-compatibility/2006" xmlns:p15="http://schemas.microsoft.com/office/powerpoint/2012/main">
+    <mc:Choice Requires="p15">
       <p:transition xmlns:p14="http://schemas.microsoft.com/office/powerpoint/2010/main" spd="slow" p14:dur="2000">
         <p15:prstTrans prst="fallOver"/>
       </p:transition>
     </mc:Choice>
-    <mc:Fallback>
+    <mc:Fallback xmlns="">
       <p:transition spd="slow">
         <p:fade/>
       </p:transition>
@@ -13622,13 +13911,13 @@
   <p:clrMapOvr>
     <a:masterClrMapping/>
   </p:clrMapOvr>
-  <mc:AlternateContent xmlns:mc="http://schemas.openxmlformats.org/markup-compatibility/2006">
-    <mc:Choice xmlns:p159="http://schemas.microsoft.com/office/powerpoint/2015/09/main" Requires="p159">
+  <mc:AlternateContent xmlns:mc="http://schemas.openxmlformats.org/markup-compatibility/2006" xmlns:p159="http://schemas.microsoft.com/office/powerpoint/2015/09/main">
+    <mc:Choice Requires="p159">
       <p:transition xmlns:p14="http://schemas.microsoft.com/office/powerpoint/2010/main" spd="slow" p14:dur="2000">
         <p159:morph option="byObject"/>
       </p:transition>
     </mc:Choice>
-    <mc:Fallback>
+    <mc:Fallback xmlns="">
       <p:transition spd="slow">
         <p:fade/>
       </p:transition>
@@ -13789,13 +14078,13 @@
   <p:clrMapOvr>
     <a:masterClrMapping/>
   </p:clrMapOvr>
-  <mc:AlternateContent xmlns:mc="http://schemas.openxmlformats.org/markup-compatibility/2006">
-    <mc:Choice xmlns:p159="http://schemas.microsoft.com/office/powerpoint/2015/09/main" Requires="p159">
+  <mc:AlternateContent xmlns:mc="http://schemas.openxmlformats.org/markup-compatibility/2006" xmlns:p159="http://schemas.microsoft.com/office/powerpoint/2015/09/main">
+    <mc:Choice Requires="p159">
       <p:transition xmlns:p14="http://schemas.microsoft.com/office/powerpoint/2010/main" spd="slow" p14:dur="2000">
         <p159:morph option="byObject"/>
       </p:transition>
     </mc:Choice>
-    <mc:Fallback>
+    <mc:Fallback xmlns="">
       <p:transition spd="slow">
         <p:fade/>
       </p:transition>

</xml_diff>

<commit_message>
added some more slides shaping tensors
</commit_message>
<xml_diff>
--- a/Final Pres.pptx
+++ b/Final Pres.pptx
@@ -21,9 +21,16 @@
     <p:sldId id="272" r:id="rId15"/>
     <p:sldId id="273" r:id="rId16"/>
     <p:sldId id="274" r:id="rId17"/>
-    <p:sldId id="267" r:id="rId18"/>
-    <p:sldId id="268" r:id="rId19"/>
-    <p:sldId id="259" r:id="rId20"/>
+    <p:sldId id="275" r:id="rId18"/>
+    <p:sldId id="278" r:id="rId19"/>
+    <p:sldId id="279" r:id="rId20"/>
+    <p:sldId id="276" r:id="rId21"/>
+    <p:sldId id="277" r:id="rId22"/>
+    <p:sldId id="281" r:id="rId23"/>
+    <p:sldId id="280" r:id="rId24"/>
+    <p:sldId id="267" r:id="rId25"/>
+    <p:sldId id="268" r:id="rId26"/>
+    <p:sldId id="259" r:id="rId27"/>
   </p:sldIdLst>
   <p:sldSz cx="12192000" cy="6858000"/>
   <p:notesSz cx="6858000" cy="9144000"/>
@@ -180,7 +187,7 @@
           <a:noFill/>
           <a:extLst>
             <a:ext uri="{909E8E84-426E-40dd-AFC4-6F175D3DCCD1}">
-              <a14:hiddenFill xmlns="" xmlns:a14="http://schemas.microsoft.com/office/drawing/2010/main">
+              <a14:hiddenFill xmlns:a14="http://schemas.microsoft.com/office/drawing/2010/main" xmlns="">
                 <a:solidFill>
                   <a:srgbClr val="FFFFFF"/>
                 </a:solidFill>
@@ -240,7 +247,7 @@
             </a:ln>
             <a:extLst>
               <a:ext uri="{91240B29-F687-4f45-9708-019B960494DF}">
-                <a14:hiddenLine xmlns="" xmlns:a14="http://schemas.microsoft.com/office/drawing/2010/main" w="9525">
+                <a14:hiddenLine xmlns:a14="http://schemas.microsoft.com/office/drawing/2010/main" xmlns="" w="9525">
                   <a:solidFill>
                     <a:srgbClr val="000000"/>
                   </a:solidFill>
@@ -330,7 +337,7 @@
             </a:ln>
             <a:extLst>
               <a:ext uri="{91240B29-F687-4f45-9708-019B960494DF}">
-                <a14:hiddenLine xmlns="" xmlns:a14="http://schemas.microsoft.com/office/drawing/2010/main" w="9525">
+                <a14:hiddenLine xmlns:a14="http://schemas.microsoft.com/office/drawing/2010/main" xmlns="" w="9525">
                   <a:solidFill>
                     <a:srgbClr val="000000"/>
                   </a:solidFill>
@@ -420,7 +427,7 @@
             </a:ln>
             <a:extLst>
               <a:ext uri="{91240B29-F687-4f45-9708-019B960494DF}">
-                <a14:hiddenLine xmlns="" xmlns:a14="http://schemas.microsoft.com/office/drawing/2010/main" w="9525">
+                <a14:hiddenLine xmlns:a14="http://schemas.microsoft.com/office/drawing/2010/main" xmlns="" w="9525">
                   <a:solidFill>
                     <a:srgbClr val="000000"/>
                   </a:solidFill>
@@ -454,7 +461,7 @@
             </a:ln>
             <a:extLst>
               <a:ext uri="{91240B29-F687-4f45-9708-019B960494DF}">
-                <a14:hiddenLine xmlns="" xmlns:a14="http://schemas.microsoft.com/office/drawing/2010/main" w="9525">
+                <a14:hiddenLine xmlns:a14="http://schemas.microsoft.com/office/drawing/2010/main" xmlns="" w="9525">
                   <a:solidFill>
                     <a:srgbClr val="000000"/>
                   </a:solidFill>
@@ -544,7 +551,7 @@
             </a:ln>
             <a:extLst>
               <a:ext uri="{91240B29-F687-4f45-9708-019B960494DF}">
-                <a14:hiddenLine xmlns="" xmlns:a14="http://schemas.microsoft.com/office/drawing/2010/main" w="9525">
+                <a14:hiddenLine xmlns:a14="http://schemas.microsoft.com/office/drawing/2010/main" xmlns="" w="9525">
                   <a:solidFill>
                     <a:srgbClr val="000000"/>
                   </a:solidFill>
@@ -606,7 +613,7 @@
             </a:ln>
             <a:extLst>
               <a:ext uri="{91240B29-F687-4f45-9708-019B960494DF}">
-                <a14:hiddenLine xmlns="" xmlns:a14="http://schemas.microsoft.com/office/drawing/2010/main" w="9525">
+                <a14:hiddenLine xmlns:a14="http://schemas.microsoft.com/office/drawing/2010/main" xmlns="" w="9525">
                   <a:solidFill>
                     <a:srgbClr val="000000"/>
                   </a:solidFill>
@@ -668,7 +675,7 @@
             </a:ln>
             <a:extLst>
               <a:ext uri="{91240B29-F687-4f45-9708-019B960494DF}">
-                <a14:hiddenLine xmlns="" xmlns:a14="http://schemas.microsoft.com/office/drawing/2010/main" w="9525">
+                <a14:hiddenLine xmlns:a14="http://schemas.microsoft.com/office/drawing/2010/main" xmlns="" w="9525">
                   <a:solidFill>
                     <a:srgbClr val="000000"/>
                   </a:solidFill>
@@ -758,7 +765,7 @@
             </a:ln>
             <a:extLst>
               <a:ext uri="{91240B29-F687-4f45-9708-019B960494DF}">
-                <a14:hiddenLine xmlns="" xmlns:a14="http://schemas.microsoft.com/office/drawing/2010/main" w="9525">
+                <a14:hiddenLine xmlns:a14="http://schemas.microsoft.com/office/drawing/2010/main" xmlns="" w="9525">
                   <a:solidFill>
                     <a:srgbClr val="000000"/>
                   </a:solidFill>
@@ -820,7 +827,7 @@
             </a:ln>
             <a:extLst>
               <a:ext uri="{91240B29-F687-4f45-9708-019B960494DF}">
-                <a14:hiddenLine xmlns="" xmlns:a14="http://schemas.microsoft.com/office/drawing/2010/main" w="9525">
+                <a14:hiddenLine xmlns:a14="http://schemas.microsoft.com/office/drawing/2010/main" xmlns="" w="9525">
                   <a:solidFill>
                     <a:srgbClr val="000000"/>
                   </a:solidFill>
@@ -882,7 +889,7 @@
             </a:ln>
             <a:extLst>
               <a:ext uri="{91240B29-F687-4f45-9708-019B960494DF}">
-                <a14:hiddenLine xmlns="" xmlns:a14="http://schemas.microsoft.com/office/drawing/2010/main" w="9525">
+                <a14:hiddenLine xmlns:a14="http://schemas.microsoft.com/office/drawing/2010/main" xmlns="" w="9525">
                   <a:solidFill>
                     <a:srgbClr val="000000"/>
                   </a:solidFill>
@@ -972,7 +979,7 @@
             </a:ln>
             <a:extLst>
               <a:ext uri="{91240B29-F687-4f45-9708-019B960494DF}">
-                <a14:hiddenLine xmlns="" xmlns:a14="http://schemas.microsoft.com/office/drawing/2010/main" w="9525">
+                <a14:hiddenLine xmlns:a14="http://schemas.microsoft.com/office/drawing/2010/main" xmlns="" w="9525">
                   <a:solidFill>
                     <a:srgbClr val="000000"/>
                   </a:solidFill>
@@ -1062,7 +1069,7 @@
             </a:ln>
             <a:extLst>
               <a:ext uri="{91240B29-F687-4f45-9708-019B960494DF}">
-                <a14:hiddenLine xmlns="" xmlns:a14="http://schemas.microsoft.com/office/drawing/2010/main" w="9525">
+                <a14:hiddenLine xmlns:a14="http://schemas.microsoft.com/office/drawing/2010/main" xmlns="" w="9525">
                   <a:solidFill>
                     <a:srgbClr val="000000"/>
                   </a:solidFill>
@@ -1124,7 +1131,7 @@
             </a:ln>
             <a:extLst>
               <a:ext uri="{91240B29-F687-4f45-9708-019B960494DF}">
-                <a14:hiddenLine xmlns="" xmlns:a14="http://schemas.microsoft.com/office/drawing/2010/main" w="9525">
+                <a14:hiddenLine xmlns:a14="http://schemas.microsoft.com/office/drawing/2010/main" xmlns="" w="9525">
                   <a:solidFill>
                     <a:srgbClr val="000000"/>
                   </a:solidFill>
@@ -1234,7 +1241,7 @@
             </a:ln>
             <a:extLst>
               <a:ext uri="{91240B29-F687-4f45-9708-019B960494DF}">
-                <a14:hiddenLine xmlns="" xmlns:a14="http://schemas.microsoft.com/office/drawing/2010/main" w="9525">
+                <a14:hiddenLine xmlns:a14="http://schemas.microsoft.com/office/drawing/2010/main" xmlns="" w="9525">
                   <a:solidFill>
                     <a:srgbClr val="000000"/>
                   </a:solidFill>
@@ -1296,7 +1303,7 @@
             </a:ln>
             <a:extLst>
               <a:ext uri="{91240B29-F687-4f45-9708-019B960494DF}">
-                <a14:hiddenLine xmlns="" xmlns:a14="http://schemas.microsoft.com/office/drawing/2010/main" w="9525">
+                <a14:hiddenLine xmlns:a14="http://schemas.microsoft.com/office/drawing/2010/main" xmlns="" w="9525">
                   <a:solidFill>
                     <a:srgbClr val="000000"/>
                   </a:solidFill>
@@ -1386,7 +1393,7 @@
             </a:ln>
             <a:extLst>
               <a:ext uri="{91240B29-F687-4f45-9708-019B960494DF}">
-                <a14:hiddenLine xmlns="" xmlns:a14="http://schemas.microsoft.com/office/drawing/2010/main" w="9525">
+                <a14:hiddenLine xmlns:a14="http://schemas.microsoft.com/office/drawing/2010/main" xmlns="" w="9525">
                   <a:solidFill>
                     <a:srgbClr val="000000"/>
                   </a:solidFill>
@@ -1476,7 +1483,7 @@
             </a:ln>
             <a:extLst>
               <a:ext uri="{91240B29-F687-4f45-9708-019B960494DF}">
-                <a14:hiddenLine xmlns="" xmlns:a14="http://schemas.microsoft.com/office/drawing/2010/main" w="9525">
+                <a14:hiddenLine xmlns:a14="http://schemas.microsoft.com/office/drawing/2010/main" xmlns="" w="9525">
                   <a:solidFill>
                     <a:srgbClr val="000000"/>
                   </a:solidFill>
@@ -1538,7 +1545,7 @@
             </a:ln>
             <a:extLst>
               <a:ext uri="{91240B29-F687-4f45-9708-019B960494DF}">
-                <a14:hiddenLine xmlns="" xmlns:a14="http://schemas.microsoft.com/office/drawing/2010/main" w="9525">
+                <a14:hiddenLine xmlns:a14="http://schemas.microsoft.com/office/drawing/2010/main" xmlns="" w="9525">
                   <a:solidFill>
                     <a:srgbClr val="000000"/>
                   </a:solidFill>
@@ -1628,7 +1635,7 @@
             </a:ln>
             <a:extLst>
               <a:ext uri="{91240B29-F687-4f45-9708-019B960494DF}">
-                <a14:hiddenLine xmlns="" xmlns:a14="http://schemas.microsoft.com/office/drawing/2010/main" w="9525">
+                <a14:hiddenLine xmlns:a14="http://schemas.microsoft.com/office/drawing/2010/main" xmlns="" w="9525">
                   <a:solidFill>
                     <a:srgbClr val="000000"/>
                   </a:solidFill>
@@ -1718,7 +1725,7 @@
             </a:ln>
             <a:extLst>
               <a:ext uri="{91240B29-F687-4f45-9708-019B960494DF}">
-                <a14:hiddenLine xmlns="" xmlns:a14="http://schemas.microsoft.com/office/drawing/2010/main" w="9525">
+                <a14:hiddenLine xmlns:a14="http://schemas.microsoft.com/office/drawing/2010/main" xmlns="" w="9525">
                   <a:solidFill>
                     <a:srgbClr val="000000"/>
                   </a:solidFill>
@@ -1774,7 +1781,7 @@
             </a:ln>
             <a:extLst>
               <a:ext uri="{91240B29-F687-4f45-9708-019B960494DF}">
-                <a14:hiddenLine xmlns="" xmlns:a14="http://schemas.microsoft.com/office/drawing/2010/main" w="9525">
+                <a14:hiddenLine xmlns:a14="http://schemas.microsoft.com/office/drawing/2010/main" xmlns="" w="9525">
                   <a:solidFill>
                     <a:srgbClr val="000000"/>
                   </a:solidFill>
@@ -1864,7 +1871,7 @@
             </a:ln>
             <a:extLst>
               <a:ext uri="{91240B29-F687-4f45-9708-019B960494DF}">
-                <a14:hiddenLine xmlns="" xmlns:a14="http://schemas.microsoft.com/office/drawing/2010/main" w="9525">
+                <a14:hiddenLine xmlns:a14="http://schemas.microsoft.com/office/drawing/2010/main" xmlns="" w="9525">
                   <a:solidFill>
                     <a:srgbClr val="000000"/>
                   </a:solidFill>
@@ -1920,7 +1927,7 @@
             </a:ln>
             <a:extLst>
               <a:ext uri="{91240B29-F687-4f45-9708-019B960494DF}">
-                <a14:hiddenLine xmlns="" xmlns:a14="http://schemas.microsoft.com/office/drawing/2010/main" w="9525">
+                <a14:hiddenLine xmlns:a14="http://schemas.microsoft.com/office/drawing/2010/main" xmlns="" w="9525">
                   <a:solidFill>
                     <a:srgbClr val="000000"/>
                   </a:solidFill>
@@ -2010,7 +2017,7 @@
             </a:ln>
             <a:extLst>
               <a:ext uri="{91240B29-F687-4f45-9708-019B960494DF}">
-                <a14:hiddenLine xmlns="" xmlns:a14="http://schemas.microsoft.com/office/drawing/2010/main" w="9525">
+                <a14:hiddenLine xmlns:a14="http://schemas.microsoft.com/office/drawing/2010/main" xmlns="" w="9525">
                   <a:solidFill>
                     <a:srgbClr val="000000"/>
                   </a:solidFill>
@@ -2078,7 +2085,7 @@
             </a:ln>
             <a:extLst>
               <a:ext uri="{91240B29-F687-4f45-9708-019B960494DF}">
-                <a14:hiddenLine xmlns="" xmlns:a14="http://schemas.microsoft.com/office/drawing/2010/main" w="9525">
+                <a14:hiddenLine xmlns:a14="http://schemas.microsoft.com/office/drawing/2010/main" xmlns="" w="9525">
                   <a:solidFill>
                     <a:srgbClr val="000000"/>
                   </a:solidFill>
@@ -2168,7 +2175,7 @@
             </a:ln>
             <a:extLst>
               <a:ext uri="{91240B29-F687-4f45-9708-019B960494DF}">
-                <a14:hiddenLine xmlns="" xmlns:a14="http://schemas.microsoft.com/office/drawing/2010/main" w="9525">
+                <a14:hiddenLine xmlns:a14="http://schemas.microsoft.com/office/drawing/2010/main" xmlns="" w="9525">
                   <a:solidFill>
                     <a:srgbClr val="000000"/>
                   </a:solidFill>
@@ -2236,7 +2243,7 @@
             </a:ln>
             <a:extLst>
               <a:ext uri="{91240B29-F687-4f45-9708-019B960494DF}">
-                <a14:hiddenLine xmlns="" xmlns:a14="http://schemas.microsoft.com/office/drawing/2010/main" w="9525">
+                <a14:hiddenLine xmlns:a14="http://schemas.microsoft.com/office/drawing/2010/main" xmlns="" w="9525">
                   <a:solidFill>
                     <a:srgbClr val="000000"/>
                   </a:solidFill>
@@ -2326,7 +2333,7 @@
             </a:ln>
             <a:extLst>
               <a:ext uri="{91240B29-F687-4f45-9708-019B960494DF}">
-                <a14:hiddenLine xmlns="" xmlns:a14="http://schemas.microsoft.com/office/drawing/2010/main" w="9525">
+                <a14:hiddenLine xmlns:a14="http://schemas.microsoft.com/office/drawing/2010/main" xmlns="" w="9525">
                   <a:solidFill>
                     <a:srgbClr val="000000"/>
                   </a:solidFill>
@@ -2360,7 +2367,7 @@
             </a:ln>
             <a:extLst>
               <a:ext uri="{91240B29-F687-4f45-9708-019B960494DF}">
-                <a14:hiddenLine xmlns="" xmlns:a14="http://schemas.microsoft.com/office/drawing/2010/main" w="9525">
+                <a14:hiddenLine xmlns:a14="http://schemas.microsoft.com/office/drawing/2010/main" xmlns="" w="9525">
                   <a:solidFill>
                     <a:srgbClr val="000000"/>
                   </a:solidFill>
@@ -2450,7 +2457,7 @@
             </a:ln>
             <a:extLst>
               <a:ext uri="{91240B29-F687-4f45-9708-019B960494DF}">
-                <a14:hiddenLine xmlns="" xmlns:a14="http://schemas.microsoft.com/office/drawing/2010/main" w="9525">
+                <a14:hiddenLine xmlns:a14="http://schemas.microsoft.com/office/drawing/2010/main" xmlns="" w="9525">
                   <a:solidFill>
                     <a:srgbClr val="000000"/>
                   </a:solidFill>
@@ -2512,7 +2519,7 @@
             </a:ln>
             <a:extLst>
               <a:ext uri="{91240B29-F687-4f45-9708-019B960494DF}">
-                <a14:hiddenLine xmlns="" xmlns:a14="http://schemas.microsoft.com/office/drawing/2010/main" w="9525">
+                <a14:hiddenLine xmlns:a14="http://schemas.microsoft.com/office/drawing/2010/main" xmlns="" w="9525">
                   <a:solidFill>
                     <a:srgbClr val="000000"/>
                   </a:solidFill>
@@ -2574,7 +2581,7 @@
             </a:ln>
             <a:extLst>
               <a:ext uri="{91240B29-F687-4f45-9708-019B960494DF}">
-                <a14:hiddenLine xmlns="" xmlns:a14="http://schemas.microsoft.com/office/drawing/2010/main" w="9525">
+                <a14:hiddenLine xmlns:a14="http://schemas.microsoft.com/office/drawing/2010/main" xmlns="" w="9525">
                   <a:solidFill>
                     <a:srgbClr val="000000"/>
                   </a:solidFill>
@@ -2664,7 +2671,7 @@
             </a:ln>
             <a:extLst>
               <a:ext uri="{91240B29-F687-4f45-9708-019B960494DF}">
-                <a14:hiddenLine xmlns="" xmlns:a14="http://schemas.microsoft.com/office/drawing/2010/main" w="9525">
+                <a14:hiddenLine xmlns:a14="http://schemas.microsoft.com/office/drawing/2010/main" xmlns="" w="9525">
                   <a:solidFill>
                     <a:srgbClr val="000000"/>
                   </a:solidFill>
@@ -2732,7 +2739,7 @@
             </a:ln>
             <a:extLst>
               <a:ext uri="{91240B29-F687-4f45-9708-019B960494DF}">
-                <a14:hiddenLine xmlns="" xmlns:a14="http://schemas.microsoft.com/office/drawing/2010/main" w="9525">
+                <a14:hiddenLine xmlns:a14="http://schemas.microsoft.com/office/drawing/2010/main" xmlns="" w="9525">
                   <a:solidFill>
                     <a:srgbClr val="000000"/>
                   </a:solidFill>
@@ -2794,7 +2801,7 @@
             </a:ln>
             <a:extLst>
               <a:ext uri="{91240B29-F687-4f45-9708-019B960494DF}">
-                <a14:hiddenLine xmlns="" xmlns:a14="http://schemas.microsoft.com/office/drawing/2010/main" w="9525">
+                <a14:hiddenLine xmlns:a14="http://schemas.microsoft.com/office/drawing/2010/main" xmlns="" w="9525">
                   <a:solidFill>
                     <a:srgbClr val="000000"/>
                   </a:solidFill>
@@ -2884,7 +2891,7 @@
             </a:ln>
             <a:extLst>
               <a:ext uri="{91240B29-F687-4f45-9708-019B960494DF}">
-                <a14:hiddenLine xmlns="" xmlns:a14="http://schemas.microsoft.com/office/drawing/2010/main" w="9525">
+                <a14:hiddenLine xmlns:a14="http://schemas.microsoft.com/office/drawing/2010/main" xmlns="" w="9525">
                   <a:solidFill>
                     <a:srgbClr val="000000"/>
                   </a:solidFill>
@@ -2946,7 +2953,7 @@
             </a:ln>
             <a:extLst>
               <a:ext uri="{91240B29-F687-4f45-9708-019B960494DF}">
-                <a14:hiddenLine xmlns="" xmlns:a14="http://schemas.microsoft.com/office/drawing/2010/main" w="9525">
+                <a14:hiddenLine xmlns:a14="http://schemas.microsoft.com/office/drawing/2010/main" xmlns="" w="9525">
                   <a:solidFill>
                     <a:srgbClr val="000000"/>
                   </a:solidFill>
@@ -3036,7 +3043,7 @@
             </a:ln>
             <a:extLst>
               <a:ext uri="{91240B29-F687-4f45-9708-019B960494DF}">
-                <a14:hiddenLine xmlns="" xmlns:a14="http://schemas.microsoft.com/office/drawing/2010/main" w="9525">
+                <a14:hiddenLine xmlns:a14="http://schemas.microsoft.com/office/drawing/2010/main" xmlns="" w="9525">
                   <a:solidFill>
                     <a:srgbClr val="000000"/>
                   </a:solidFill>
@@ -3098,7 +3105,7 @@
             </a:ln>
             <a:extLst>
               <a:ext uri="{91240B29-F687-4f45-9708-019B960494DF}">
-                <a14:hiddenLine xmlns="" xmlns:a14="http://schemas.microsoft.com/office/drawing/2010/main" w="9525">
+                <a14:hiddenLine xmlns:a14="http://schemas.microsoft.com/office/drawing/2010/main" xmlns="" w="9525">
                   <a:solidFill>
                     <a:srgbClr val="000000"/>
                   </a:solidFill>
@@ -3188,7 +3195,7 @@
             </a:ln>
             <a:extLst>
               <a:ext uri="{91240B29-F687-4f45-9708-019B960494DF}">
-                <a14:hiddenLine xmlns="" xmlns:a14="http://schemas.microsoft.com/office/drawing/2010/main" w="9525">
+                <a14:hiddenLine xmlns:a14="http://schemas.microsoft.com/office/drawing/2010/main" xmlns="" w="9525">
                   <a:solidFill>
                     <a:srgbClr val="000000"/>
                   </a:solidFill>
@@ -3222,7 +3229,7 @@
             </a:ln>
             <a:extLst>
               <a:ext uri="{91240B29-F687-4f45-9708-019B960494DF}">
-                <a14:hiddenLine xmlns="" xmlns:a14="http://schemas.microsoft.com/office/drawing/2010/main" w="9525">
+                <a14:hiddenLine xmlns:a14="http://schemas.microsoft.com/office/drawing/2010/main" xmlns="" w="9525">
                   <a:solidFill>
                     <a:srgbClr val="000000"/>
                   </a:solidFill>
@@ -3287,7 +3294,7 @@
             </a:ln>
             <a:extLst>
               <a:ext uri="{91240B29-F687-4f45-9708-019B960494DF}">
-                <a14:hiddenLine xmlns="" xmlns:a14="http://schemas.microsoft.com/office/drawing/2010/main" w="9525">
+                <a14:hiddenLine xmlns:a14="http://schemas.microsoft.com/office/drawing/2010/main" xmlns="" w="9525">
                   <a:solidFill>
                     <a:srgbClr val="000000"/>
                   </a:solidFill>
@@ -3377,7 +3384,7 @@
             </a:ln>
             <a:extLst>
               <a:ext uri="{91240B29-F687-4f45-9708-019B960494DF}">
-                <a14:hiddenLine xmlns="" xmlns:a14="http://schemas.microsoft.com/office/drawing/2010/main" w="9525">
+                <a14:hiddenLine xmlns:a14="http://schemas.microsoft.com/office/drawing/2010/main" xmlns="" w="9525">
                   <a:solidFill>
                     <a:srgbClr val="000000"/>
                   </a:solidFill>
@@ -3439,7 +3446,7 @@
             </a:ln>
             <a:extLst>
               <a:ext uri="{91240B29-F687-4f45-9708-019B960494DF}">
-                <a14:hiddenLine xmlns="" xmlns:a14="http://schemas.microsoft.com/office/drawing/2010/main" w="9525">
+                <a14:hiddenLine xmlns:a14="http://schemas.microsoft.com/office/drawing/2010/main" xmlns="" w="9525">
                   <a:solidFill>
                     <a:srgbClr val="000000"/>
                   </a:solidFill>
@@ -3529,7 +3536,7 @@
             </a:ln>
             <a:extLst>
               <a:ext uri="{91240B29-F687-4f45-9708-019B960494DF}">
-                <a14:hiddenLine xmlns="" xmlns:a14="http://schemas.microsoft.com/office/drawing/2010/main" w="9525">
+                <a14:hiddenLine xmlns:a14="http://schemas.microsoft.com/office/drawing/2010/main" xmlns="" w="9525">
                   <a:solidFill>
                     <a:srgbClr val="000000"/>
                   </a:solidFill>
@@ -3619,7 +3626,7 @@
             </a:ln>
             <a:extLst>
               <a:ext uri="{91240B29-F687-4f45-9708-019B960494DF}">
-                <a14:hiddenLine xmlns="" xmlns:a14="http://schemas.microsoft.com/office/drawing/2010/main" w="9525">
+                <a14:hiddenLine xmlns:a14="http://schemas.microsoft.com/office/drawing/2010/main" xmlns="" w="9525">
                   <a:solidFill>
                     <a:srgbClr val="000000"/>
                   </a:solidFill>
@@ -3684,7 +3691,7 @@
             </a:ln>
             <a:extLst>
               <a:ext uri="{91240B29-F687-4f45-9708-019B960494DF}">
-                <a14:hiddenLine xmlns="" xmlns:a14="http://schemas.microsoft.com/office/drawing/2010/main" w="9525">
+                <a14:hiddenLine xmlns:a14="http://schemas.microsoft.com/office/drawing/2010/main" xmlns="" w="9525">
                   <a:solidFill>
                     <a:srgbClr val="000000"/>
                   </a:solidFill>
@@ -3746,7 +3753,7 @@
             </a:ln>
             <a:extLst>
               <a:ext uri="{91240B29-F687-4f45-9708-019B960494DF}">
-                <a14:hiddenLine xmlns="" xmlns:a14="http://schemas.microsoft.com/office/drawing/2010/main" w="9525">
+                <a14:hiddenLine xmlns:a14="http://schemas.microsoft.com/office/drawing/2010/main" xmlns="" w="9525">
                   <a:solidFill>
                     <a:srgbClr val="000000"/>
                   </a:solidFill>
@@ -3836,7 +3843,7 @@
             </a:ln>
             <a:extLst>
               <a:ext uri="{91240B29-F687-4f45-9708-019B960494DF}">
-                <a14:hiddenLine xmlns="" xmlns:a14="http://schemas.microsoft.com/office/drawing/2010/main" w="9525">
+                <a14:hiddenLine xmlns:a14="http://schemas.microsoft.com/office/drawing/2010/main" xmlns="" w="9525">
                   <a:solidFill>
                     <a:srgbClr val="000000"/>
                   </a:solidFill>
@@ -3926,7 +3933,7 @@
             </a:ln>
             <a:extLst>
               <a:ext uri="{91240B29-F687-4f45-9708-019B960494DF}">
-                <a14:hiddenLine xmlns="" xmlns:a14="http://schemas.microsoft.com/office/drawing/2010/main" w="9525">
+                <a14:hiddenLine xmlns:a14="http://schemas.microsoft.com/office/drawing/2010/main" xmlns="" w="9525">
                   <a:solidFill>
                     <a:srgbClr val="000000"/>
                   </a:solidFill>
@@ -3988,7 +3995,7 @@
             </a:ln>
             <a:extLst>
               <a:ext uri="{91240B29-F687-4f45-9708-019B960494DF}">
-                <a14:hiddenLine xmlns="" xmlns:a14="http://schemas.microsoft.com/office/drawing/2010/main" w="9525">
+                <a14:hiddenLine xmlns:a14="http://schemas.microsoft.com/office/drawing/2010/main" xmlns="" w="9525">
                   <a:solidFill>
                     <a:srgbClr val="000000"/>
                   </a:solidFill>
@@ -4108,7 +4115,7 @@
             </a:ln>
             <a:extLst>
               <a:ext uri="{91240B29-F687-4f45-9708-019B960494DF}">
-                <a14:hiddenLine xmlns="" xmlns:a14="http://schemas.microsoft.com/office/drawing/2010/main" w="9525">
+                <a14:hiddenLine xmlns:a14="http://schemas.microsoft.com/office/drawing/2010/main" xmlns="" w="9525">
                   <a:solidFill>
                     <a:srgbClr val="000000"/>
                   </a:solidFill>
@@ -4176,7 +4183,7 @@
             </a:ln>
             <a:extLst>
               <a:ext uri="{91240B29-F687-4f45-9708-019B960494DF}">
-                <a14:hiddenLine xmlns="" xmlns:a14="http://schemas.microsoft.com/office/drawing/2010/main" w="9525">
+                <a14:hiddenLine xmlns:a14="http://schemas.microsoft.com/office/drawing/2010/main" xmlns="" w="9525">
                   <a:solidFill>
                     <a:srgbClr val="000000"/>
                   </a:solidFill>
@@ -4266,7 +4273,7 @@
             </a:ln>
             <a:extLst>
               <a:ext uri="{91240B29-F687-4f45-9708-019B960494DF}">
-                <a14:hiddenLine xmlns="" xmlns:a14="http://schemas.microsoft.com/office/drawing/2010/main" w="9525">
+                <a14:hiddenLine xmlns:a14="http://schemas.microsoft.com/office/drawing/2010/main" xmlns="" w="9525">
                   <a:solidFill>
                     <a:srgbClr val="000000"/>
                   </a:solidFill>
@@ -8988,7 +8995,7 @@
           <a:noFill/>
           <a:extLst>
             <a:ext uri="{909E8E84-426E-40dd-AFC4-6F175D3DCCD1}">
-              <a14:hiddenFill xmlns="" xmlns:a14="http://schemas.microsoft.com/office/drawing/2010/main">
+              <a14:hiddenFill xmlns:a14="http://schemas.microsoft.com/office/drawing/2010/main" xmlns="">
                 <a:solidFill>
                   <a:srgbClr val="FFFFFF"/>
                 </a:solidFill>
@@ -9062,7 +9069,7 @@
               </a:ln>
               <a:extLst>
                 <a:ext uri="{91240B29-F687-4f45-9708-019B960494DF}">
-                  <a14:hiddenLine xmlns="" xmlns:a14="http://schemas.microsoft.com/office/drawing/2010/main" w="9525">
+                  <a14:hiddenLine xmlns:a14="http://schemas.microsoft.com/office/drawing/2010/main" xmlns="" w="9525">
                     <a:solidFill>
                       <a:srgbClr val="000000"/>
                     </a:solidFill>
@@ -9152,7 +9159,7 @@
               </a:ln>
               <a:extLst>
                 <a:ext uri="{91240B29-F687-4f45-9708-019B960494DF}">
-                  <a14:hiddenLine xmlns="" xmlns:a14="http://schemas.microsoft.com/office/drawing/2010/main" w="9525">
+                  <a14:hiddenLine xmlns:a14="http://schemas.microsoft.com/office/drawing/2010/main" xmlns="" w="9525">
                     <a:solidFill>
                       <a:srgbClr val="000000"/>
                     </a:solidFill>
@@ -9242,7 +9249,7 @@
               </a:ln>
               <a:extLst>
                 <a:ext uri="{91240B29-F687-4f45-9708-019B960494DF}">
-                  <a14:hiddenLine xmlns="" xmlns:a14="http://schemas.microsoft.com/office/drawing/2010/main" w="9525">
+                  <a14:hiddenLine xmlns:a14="http://schemas.microsoft.com/office/drawing/2010/main" xmlns="" w="9525">
                     <a:solidFill>
                       <a:srgbClr val="000000"/>
                     </a:solidFill>
@@ -9304,7 +9311,7 @@
               </a:ln>
               <a:extLst>
                 <a:ext uri="{91240B29-F687-4f45-9708-019B960494DF}">
-                  <a14:hiddenLine xmlns="" xmlns:a14="http://schemas.microsoft.com/office/drawing/2010/main" w="9525">
+                  <a14:hiddenLine xmlns:a14="http://schemas.microsoft.com/office/drawing/2010/main" xmlns="" w="9525">
                     <a:solidFill>
                       <a:srgbClr val="000000"/>
                     </a:solidFill>
@@ -9394,7 +9401,7 @@
               </a:ln>
               <a:extLst>
                 <a:ext uri="{91240B29-F687-4f45-9708-019B960494DF}">
-                  <a14:hiddenLine xmlns="" xmlns:a14="http://schemas.microsoft.com/office/drawing/2010/main" w="9525">
+                  <a14:hiddenLine xmlns:a14="http://schemas.microsoft.com/office/drawing/2010/main" xmlns="" w="9525">
                     <a:solidFill>
                       <a:srgbClr val="000000"/>
                     </a:solidFill>
@@ -9456,7 +9463,7 @@
               </a:ln>
               <a:extLst>
                 <a:ext uri="{91240B29-F687-4f45-9708-019B960494DF}">
-                  <a14:hiddenLine xmlns="" xmlns:a14="http://schemas.microsoft.com/office/drawing/2010/main" w="9525">
+                  <a14:hiddenLine xmlns:a14="http://schemas.microsoft.com/office/drawing/2010/main" xmlns="" w="9525">
                     <a:solidFill>
                       <a:srgbClr val="000000"/>
                     </a:solidFill>
@@ -9518,7 +9525,7 @@
               </a:ln>
               <a:extLst>
                 <a:ext uri="{91240B29-F687-4f45-9708-019B960494DF}">
-                  <a14:hiddenLine xmlns="" xmlns:a14="http://schemas.microsoft.com/office/drawing/2010/main" w="9525">
+                  <a14:hiddenLine xmlns:a14="http://schemas.microsoft.com/office/drawing/2010/main" xmlns="" w="9525">
                     <a:solidFill>
                       <a:srgbClr val="000000"/>
                     </a:solidFill>
@@ -9608,7 +9615,7 @@
               </a:ln>
               <a:extLst>
                 <a:ext uri="{91240B29-F687-4f45-9708-019B960494DF}">
-                  <a14:hiddenLine xmlns="" xmlns:a14="http://schemas.microsoft.com/office/drawing/2010/main" w="9525">
+                  <a14:hiddenLine xmlns:a14="http://schemas.microsoft.com/office/drawing/2010/main" xmlns="" w="9525">
                     <a:solidFill>
                       <a:srgbClr val="000000"/>
                     </a:solidFill>
@@ -9698,7 +9705,7 @@
               </a:ln>
               <a:extLst>
                 <a:ext uri="{91240B29-F687-4f45-9708-019B960494DF}">
-                  <a14:hiddenLine xmlns="" xmlns:a14="http://schemas.microsoft.com/office/drawing/2010/main" w="9525">
+                  <a14:hiddenLine xmlns:a14="http://schemas.microsoft.com/office/drawing/2010/main" xmlns="" w="9525">
                     <a:solidFill>
                       <a:srgbClr val="000000"/>
                     </a:solidFill>
@@ -9760,7 +9767,7 @@
               </a:ln>
               <a:extLst>
                 <a:ext uri="{91240B29-F687-4f45-9708-019B960494DF}">
-                  <a14:hiddenLine xmlns="" xmlns:a14="http://schemas.microsoft.com/office/drawing/2010/main" w="9525">
+                  <a14:hiddenLine xmlns:a14="http://schemas.microsoft.com/office/drawing/2010/main" xmlns="" w="9525">
                     <a:solidFill>
                       <a:srgbClr val="000000"/>
                     </a:solidFill>
@@ -9870,7 +9877,7 @@
               </a:ln>
               <a:extLst>
                 <a:ext uri="{91240B29-F687-4f45-9708-019B960494DF}">
-                  <a14:hiddenLine xmlns="" xmlns:a14="http://schemas.microsoft.com/office/drawing/2010/main" w="9525">
+                  <a14:hiddenLine xmlns:a14="http://schemas.microsoft.com/office/drawing/2010/main" xmlns="" w="9525">
                     <a:solidFill>
                       <a:srgbClr val="000000"/>
                     </a:solidFill>
@@ -9954,7 +9961,7 @@
               </a:ln>
               <a:extLst>
                 <a:ext uri="{91240B29-F687-4f45-9708-019B960494DF}">
-                  <a14:hiddenLine xmlns="" xmlns:a14="http://schemas.microsoft.com/office/drawing/2010/main" w="9525">
+                  <a14:hiddenLine xmlns:a14="http://schemas.microsoft.com/office/drawing/2010/main" xmlns="" w="9525">
                     <a:solidFill>
                       <a:srgbClr val="000000"/>
                     </a:solidFill>
@@ -10016,7 +10023,7 @@
               </a:ln>
               <a:extLst>
                 <a:ext uri="{91240B29-F687-4f45-9708-019B960494DF}">
-                  <a14:hiddenLine xmlns="" xmlns:a14="http://schemas.microsoft.com/office/drawing/2010/main" w="9525">
+                  <a14:hiddenLine xmlns:a14="http://schemas.microsoft.com/office/drawing/2010/main" xmlns="" w="9525">
                     <a:solidFill>
                       <a:srgbClr val="000000"/>
                     </a:solidFill>
@@ -10078,7 +10085,7 @@
               </a:ln>
               <a:extLst>
                 <a:ext uri="{91240B29-F687-4f45-9708-019B960494DF}">
-                  <a14:hiddenLine xmlns="" xmlns:a14="http://schemas.microsoft.com/office/drawing/2010/main" w="9525">
+                  <a14:hiddenLine xmlns:a14="http://schemas.microsoft.com/office/drawing/2010/main" xmlns="" w="9525">
                     <a:solidFill>
                       <a:srgbClr val="000000"/>
                     </a:solidFill>
@@ -10168,7 +10175,7 @@
               </a:ln>
               <a:extLst>
                 <a:ext uri="{91240B29-F687-4f45-9708-019B960494DF}">
-                  <a14:hiddenLine xmlns="" xmlns:a14="http://schemas.microsoft.com/office/drawing/2010/main" w="9525">
+                  <a14:hiddenLine xmlns:a14="http://schemas.microsoft.com/office/drawing/2010/main" xmlns="" w="9525">
                     <a:solidFill>
                       <a:srgbClr val="000000"/>
                     </a:solidFill>
@@ -10202,7 +10209,7 @@
               </a:ln>
               <a:extLst>
                 <a:ext uri="{91240B29-F687-4f45-9708-019B960494DF}">
-                  <a14:hiddenLine xmlns="" xmlns:a14="http://schemas.microsoft.com/office/drawing/2010/main" w="9525">
+                  <a14:hiddenLine xmlns:a14="http://schemas.microsoft.com/office/drawing/2010/main" xmlns="" w="9525">
                     <a:solidFill>
                       <a:srgbClr val="000000"/>
                     </a:solidFill>
@@ -10267,7 +10274,7 @@
               </a:ln>
               <a:extLst>
                 <a:ext uri="{91240B29-F687-4f45-9708-019B960494DF}">
-                  <a14:hiddenLine xmlns="" xmlns:a14="http://schemas.microsoft.com/office/drawing/2010/main" w="9525">
+                  <a14:hiddenLine xmlns:a14="http://schemas.microsoft.com/office/drawing/2010/main" xmlns="" w="9525">
                     <a:solidFill>
                       <a:srgbClr val="000000"/>
                     </a:solidFill>
@@ -10357,7 +10364,7 @@
               </a:ln>
               <a:extLst>
                 <a:ext uri="{91240B29-F687-4f45-9708-019B960494DF}">
-                  <a14:hiddenLine xmlns="" xmlns:a14="http://schemas.microsoft.com/office/drawing/2010/main" w="9525">
+                  <a14:hiddenLine xmlns:a14="http://schemas.microsoft.com/office/drawing/2010/main" xmlns="" w="9525">
                     <a:solidFill>
                       <a:srgbClr val="000000"/>
                     </a:solidFill>
@@ -10419,7 +10426,7 @@
               </a:ln>
               <a:extLst>
                 <a:ext uri="{91240B29-F687-4f45-9708-019B960494DF}">
-                  <a14:hiddenLine xmlns="" xmlns:a14="http://schemas.microsoft.com/office/drawing/2010/main" w="9525">
+                  <a14:hiddenLine xmlns:a14="http://schemas.microsoft.com/office/drawing/2010/main" xmlns="" w="9525">
                     <a:solidFill>
                       <a:srgbClr val="000000"/>
                     </a:solidFill>
@@ -10509,7 +10516,7 @@
               </a:ln>
               <a:extLst>
                 <a:ext uri="{91240B29-F687-4f45-9708-019B960494DF}">
-                  <a14:hiddenLine xmlns="" xmlns:a14="http://schemas.microsoft.com/office/drawing/2010/main" w="9525">
+                  <a14:hiddenLine xmlns:a14="http://schemas.microsoft.com/office/drawing/2010/main" xmlns="" w="9525">
                     <a:solidFill>
                       <a:srgbClr val="000000"/>
                     </a:solidFill>
@@ -10574,7 +10581,7 @@
               </a:ln>
               <a:extLst>
                 <a:ext uri="{91240B29-F687-4f45-9708-019B960494DF}">
-                  <a14:hiddenLine xmlns="" xmlns:a14="http://schemas.microsoft.com/office/drawing/2010/main" w="9525">
+                  <a14:hiddenLine xmlns:a14="http://schemas.microsoft.com/office/drawing/2010/main" xmlns="" w="9525">
                     <a:solidFill>
                       <a:srgbClr val="000000"/>
                     </a:solidFill>
@@ -10636,7 +10643,7 @@
               </a:ln>
               <a:extLst>
                 <a:ext uri="{91240B29-F687-4f45-9708-019B960494DF}">
-                  <a14:hiddenLine xmlns="" xmlns:a14="http://schemas.microsoft.com/office/drawing/2010/main" w="9525">
+                  <a14:hiddenLine xmlns:a14="http://schemas.microsoft.com/office/drawing/2010/main" xmlns="" w="9525">
                     <a:solidFill>
                       <a:srgbClr val="000000"/>
                     </a:solidFill>
@@ -10726,7 +10733,7 @@
               </a:ln>
               <a:extLst>
                 <a:ext uri="{91240B29-F687-4f45-9708-019B960494DF}">
-                  <a14:hiddenLine xmlns="" xmlns:a14="http://schemas.microsoft.com/office/drawing/2010/main" w="9525">
+                  <a14:hiddenLine xmlns:a14="http://schemas.microsoft.com/office/drawing/2010/main" xmlns="" w="9525">
                     <a:solidFill>
                       <a:srgbClr val="000000"/>
                     </a:solidFill>
@@ -10816,7 +10823,7 @@
               </a:ln>
               <a:extLst>
                 <a:ext uri="{91240B29-F687-4f45-9708-019B960494DF}">
-                  <a14:hiddenLine xmlns="" xmlns:a14="http://schemas.microsoft.com/office/drawing/2010/main" w="9525">
+                  <a14:hiddenLine xmlns:a14="http://schemas.microsoft.com/office/drawing/2010/main" xmlns="" w="9525">
                     <a:solidFill>
                       <a:srgbClr val="000000"/>
                     </a:solidFill>
@@ -10881,7 +10888,7 @@
               </a:ln>
               <a:extLst>
                 <a:ext uri="{91240B29-F687-4f45-9708-019B960494DF}">
-                  <a14:hiddenLine xmlns="" xmlns:a14="http://schemas.microsoft.com/office/drawing/2010/main" w="9525">
+                  <a14:hiddenLine xmlns:a14="http://schemas.microsoft.com/office/drawing/2010/main" xmlns="" w="9525">
                     <a:solidFill>
                       <a:srgbClr val="000000"/>
                     </a:solidFill>
@@ -11001,7 +11008,7 @@
               </a:ln>
               <a:extLst>
                 <a:ext uri="{91240B29-F687-4f45-9708-019B960494DF}">
-                  <a14:hiddenLine xmlns="" xmlns:a14="http://schemas.microsoft.com/office/drawing/2010/main" w="9525">
+                  <a14:hiddenLine xmlns:a14="http://schemas.microsoft.com/office/drawing/2010/main" xmlns="" w="9525">
                     <a:solidFill>
                       <a:srgbClr val="000000"/>
                     </a:solidFill>
@@ -11099,7 +11106,7 @@
               </a:ln>
               <a:extLst>
                 <a:ext uri="{91240B29-F687-4f45-9708-019B960494DF}">
-                  <a14:hiddenLine xmlns="" xmlns:a14="http://schemas.microsoft.com/office/drawing/2010/main" w="9525">
+                  <a14:hiddenLine xmlns:a14="http://schemas.microsoft.com/office/drawing/2010/main" xmlns="" w="9525">
                     <a:solidFill>
                       <a:srgbClr val="000000"/>
                     </a:solidFill>
@@ -11214,7 +11221,7 @@
               </a:ln>
               <a:extLst>
                 <a:ext uri="{91240B29-F687-4f45-9708-019B960494DF}">
-                  <a14:hiddenLine xmlns="" xmlns:a14="http://schemas.microsoft.com/office/drawing/2010/main" w="9525">
+                  <a14:hiddenLine xmlns:a14="http://schemas.microsoft.com/office/drawing/2010/main" xmlns="" w="9525">
                     <a:solidFill>
                       <a:srgbClr val="000000"/>
                     </a:solidFill>
@@ -11304,7 +11311,7 @@
               </a:ln>
               <a:extLst>
                 <a:ext uri="{91240B29-F687-4f45-9708-019B960494DF}">
-                  <a14:hiddenLine xmlns="" xmlns:a14="http://schemas.microsoft.com/office/drawing/2010/main" w="9525">
+                  <a14:hiddenLine xmlns:a14="http://schemas.microsoft.com/office/drawing/2010/main" xmlns="" w="9525">
                     <a:solidFill>
                       <a:srgbClr val="000000"/>
                     </a:solidFill>
@@ -11369,7 +11376,7 @@
               </a:ln>
               <a:extLst>
                 <a:ext uri="{91240B29-F687-4f45-9708-019B960494DF}">
-                  <a14:hiddenLine xmlns="" xmlns:a14="http://schemas.microsoft.com/office/drawing/2010/main" w="9525">
+                  <a14:hiddenLine xmlns:a14="http://schemas.microsoft.com/office/drawing/2010/main" xmlns="" w="9525">
                     <a:solidFill>
                       <a:srgbClr val="000000"/>
                     </a:solidFill>
@@ -11459,7 +11466,7 @@
               </a:ln>
               <a:extLst>
                 <a:ext uri="{91240B29-F687-4f45-9708-019B960494DF}">
-                  <a14:hiddenLine xmlns="" xmlns:a14="http://schemas.microsoft.com/office/drawing/2010/main" w="9525">
+                  <a14:hiddenLine xmlns:a14="http://schemas.microsoft.com/office/drawing/2010/main" xmlns="" w="9525">
                     <a:solidFill>
                       <a:srgbClr val="000000"/>
                     </a:solidFill>
@@ -11527,7 +11534,7 @@
               </a:ln>
               <a:extLst>
                 <a:ext uri="{91240B29-F687-4f45-9708-019B960494DF}">
-                  <a14:hiddenLine xmlns="" xmlns:a14="http://schemas.microsoft.com/office/drawing/2010/main" w="9525">
+                  <a14:hiddenLine xmlns:a14="http://schemas.microsoft.com/office/drawing/2010/main" xmlns="" w="9525">
                     <a:solidFill>
                       <a:srgbClr val="000000"/>
                     </a:solidFill>
@@ -11617,7 +11624,7 @@
               </a:ln>
               <a:extLst>
                 <a:ext uri="{91240B29-F687-4f45-9708-019B960494DF}">
-                  <a14:hiddenLine xmlns="" xmlns:a14="http://schemas.microsoft.com/office/drawing/2010/main" w="9525">
+                  <a14:hiddenLine xmlns:a14="http://schemas.microsoft.com/office/drawing/2010/main" xmlns="" w="9525">
                     <a:solidFill>
                       <a:srgbClr val="000000"/>
                     </a:solidFill>
@@ -11685,7 +11692,7 @@
               </a:ln>
               <a:extLst>
                 <a:ext uri="{91240B29-F687-4f45-9708-019B960494DF}">
-                  <a14:hiddenLine xmlns="" xmlns:a14="http://schemas.microsoft.com/office/drawing/2010/main" w="9525">
+                  <a14:hiddenLine xmlns:a14="http://schemas.microsoft.com/office/drawing/2010/main" xmlns="" w="9525">
                     <a:solidFill>
                       <a:srgbClr val="000000"/>
                     </a:solidFill>
@@ -11775,7 +11782,7 @@
               </a:ln>
               <a:extLst>
                 <a:ext uri="{91240B29-F687-4f45-9708-019B960494DF}">
-                  <a14:hiddenLine xmlns="" xmlns:a14="http://schemas.microsoft.com/office/drawing/2010/main" w="9525">
+                  <a14:hiddenLine xmlns:a14="http://schemas.microsoft.com/office/drawing/2010/main" xmlns="" w="9525">
                     <a:solidFill>
                       <a:srgbClr val="000000"/>
                     </a:solidFill>
@@ -11809,7 +11816,7 @@
               </a:ln>
               <a:extLst>
                 <a:ext uri="{91240B29-F687-4f45-9708-019B960494DF}">
-                  <a14:hiddenLine xmlns="" xmlns:a14="http://schemas.microsoft.com/office/drawing/2010/main" w="9525">
+                  <a14:hiddenLine xmlns:a14="http://schemas.microsoft.com/office/drawing/2010/main" xmlns="" w="9525">
                     <a:solidFill>
                       <a:srgbClr val="000000"/>
                     </a:solidFill>
@@ -13054,14 +13061,14 @@
   <p:clrMapOvr>
     <a:masterClrMapping/>
   </p:clrMapOvr>
-  <mc:AlternateContent xmlns:mc="http://schemas.openxmlformats.org/markup-compatibility/2006" xmlns:p14="http://schemas.microsoft.com/office/powerpoint/2010/main">
-    <mc:Choice Requires="p14">
-      <p:transition spd="med" p14:dur="700">
-        <p:fade/>
+  <mc:AlternateContent xmlns:mc="http://schemas.openxmlformats.org/markup-compatibility/2006">
+    <mc:Choice xmlns:p15="http://schemas.microsoft.com/office/powerpoint/2012/main" Requires="p15">
+      <p:transition xmlns:p14="http://schemas.microsoft.com/office/powerpoint/2010/main" spd="slow" p14:dur="2000">
+        <p15:prstTrans prst="fallOver"/>
       </p:transition>
     </mc:Choice>
-    <mc:Fallback xmlns="">
-      <p:transition spd="med">
+    <mc:Fallback>
+      <p:transition spd="slow">
         <p:fade/>
       </p:transition>
     </mc:Fallback>
@@ -13480,6 +13487,1454 @@
 </file>
 
 <file path=ppt/slides/slide17.xml><?xml version="1.0" encoding="utf-8"?>
+<p:sld xmlns:a="http://schemas.openxmlformats.org/drawingml/2006/main" xmlns:r="http://schemas.openxmlformats.org/officeDocument/2006/relationships" xmlns:p="http://schemas.openxmlformats.org/presentationml/2006/main">
+  <p:cSld>
+    <p:spTree>
+      <p:nvGrpSpPr>
+        <p:cNvPr id="1" name=""/>
+        <p:cNvGrpSpPr/>
+        <p:nvPr/>
+      </p:nvGrpSpPr>
+      <p:grpSpPr>
+        <a:xfrm>
+          <a:off x="0" y="0"/>
+          <a:ext cx="0" cy="0"/>
+          <a:chOff x="0" y="0"/>
+          <a:chExt cx="0" cy="0"/>
+        </a:xfrm>
+      </p:grpSpPr>
+      <p:sp>
+        <p:nvSpPr>
+          <p:cNvPr id="2" name="Title 1">
+            <a:extLst>
+              <a:ext uri="{FF2B5EF4-FFF2-40B4-BE49-F238E27FC236}">
+                <a16:creationId xmlns:a16="http://schemas.microsoft.com/office/drawing/2014/main" id="{E5A0E343-1EB8-4823-B727-F110AA23523A}"/>
+              </a:ext>
+            </a:extLst>
+          </p:cNvPr>
+          <p:cNvSpPr>
+            <a:spLocks noGrp="1"/>
+          </p:cNvSpPr>
+          <p:nvPr>
+            <p:ph type="title"/>
+          </p:nvPr>
+        </p:nvSpPr>
+        <p:spPr/>
+        <p:txBody>
+          <a:bodyPr/>
+          <a:lstStyle/>
+          <a:p>
+            <a:pPr algn="ctr"/>
+            <a:r>
+              <a:rPr lang="en-US" dirty="0"/>
+              <a:t>Biggest challenge</a:t>
+            </a:r>
+          </a:p>
+        </p:txBody>
+      </p:sp>
+      <p:sp>
+        <p:nvSpPr>
+          <p:cNvPr id="5" name="TextBox 4">
+            <a:extLst>
+              <a:ext uri="{FF2B5EF4-FFF2-40B4-BE49-F238E27FC236}">
+                <a16:creationId xmlns:a16="http://schemas.microsoft.com/office/drawing/2014/main" id="{4008A12A-34E3-4CB9-91E5-DA4D41EEBA40}"/>
+              </a:ext>
+            </a:extLst>
+          </p:cNvPr>
+          <p:cNvSpPr txBox="1"/>
+          <p:nvPr/>
+        </p:nvSpPr>
+        <p:spPr>
+          <a:xfrm>
+            <a:off x="1862356" y="2365695"/>
+            <a:ext cx="8959442" cy="1477328"/>
+          </a:xfrm>
+          <a:prstGeom prst="rect">
+            <a:avLst/>
+          </a:prstGeom>
+          <a:noFill/>
+        </p:spPr>
+        <p:txBody>
+          <a:bodyPr wrap="square" rtlCol="0">
+            <a:spAutoFit/>
+          </a:bodyPr>
+          <a:lstStyle/>
+          <a:p>
+            <a:endParaRPr lang="en-US" dirty="0"/>
+          </a:p>
+          <a:p>
+            <a:pPr marL="742950" lvl="1" indent="-285750">
+              <a:buFont typeface="Wingdings" panose="05000000000000000000" pitchFamily="2" charset="2"/>
+              <a:buChar char="Ø"/>
+            </a:pPr>
+            <a:r>
+              <a:rPr lang="en-US" dirty="0"/>
+              <a:t>Feeding the tensorflow graph</a:t>
+            </a:r>
+          </a:p>
+          <a:p>
+            <a:pPr lvl="1"/>
+            <a:r>
+              <a:rPr lang="en-US" dirty="0"/>
+              <a:t> </a:t>
+            </a:r>
+          </a:p>
+          <a:p>
+            <a:pPr lvl="1"/>
+            <a:endParaRPr lang="en-US" b="1" dirty="0"/>
+          </a:p>
+          <a:p>
+            <a:pPr marL="742950" lvl="1" indent="-285750">
+              <a:buFont typeface="Wingdings" panose="05000000000000000000" pitchFamily="2" charset="2"/>
+              <a:buChar char="Ø"/>
+            </a:pPr>
+            <a:endParaRPr lang="en-US" dirty="0"/>
+          </a:p>
+        </p:txBody>
+      </p:sp>
+    </p:spTree>
+    <p:extLst>
+      <p:ext uri="{BB962C8B-B14F-4D97-AF65-F5344CB8AC3E}">
+        <p14:creationId xmlns:p14="http://schemas.microsoft.com/office/powerpoint/2010/main" val="1595475275"/>
+      </p:ext>
+    </p:extLst>
+  </p:cSld>
+  <p:clrMapOvr>
+    <a:masterClrMapping/>
+  </p:clrMapOvr>
+  <mc:AlternateContent xmlns:mc="http://schemas.openxmlformats.org/markup-compatibility/2006" xmlns:p14="http://schemas.microsoft.com/office/powerpoint/2010/main">
+    <mc:Choice Requires="p14">
+      <p:transition spd="med" p14:dur="700">
+        <p:fade/>
+      </p:transition>
+    </mc:Choice>
+    <mc:Fallback xmlns="">
+      <p:transition spd="med">
+        <p:fade/>
+      </p:transition>
+    </mc:Fallback>
+  </mc:AlternateContent>
+</p:sld>
+</file>
+
+<file path=ppt/slides/slide18.xml><?xml version="1.0" encoding="utf-8"?>
+<p:sld xmlns:a="http://schemas.openxmlformats.org/drawingml/2006/main" xmlns:r="http://schemas.openxmlformats.org/officeDocument/2006/relationships" xmlns:p="http://schemas.openxmlformats.org/presentationml/2006/main">
+  <p:cSld>
+    <p:spTree>
+      <p:nvGrpSpPr>
+        <p:cNvPr id="1" name=""/>
+        <p:cNvGrpSpPr/>
+        <p:nvPr/>
+      </p:nvGrpSpPr>
+      <p:grpSpPr>
+        <a:xfrm>
+          <a:off x="0" y="0"/>
+          <a:ext cx="0" cy="0"/>
+          <a:chOff x="0" y="0"/>
+          <a:chExt cx="0" cy="0"/>
+        </a:xfrm>
+      </p:grpSpPr>
+      <p:sp>
+        <p:nvSpPr>
+          <p:cNvPr id="2" name="Title 1">
+            <a:extLst>
+              <a:ext uri="{FF2B5EF4-FFF2-40B4-BE49-F238E27FC236}">
+                <a16:creationId xmlns:a16="http://schemas.microsoft.com/office/drawing/2014/main" id="{E5A0E343-1EB8-4823-B727-F110AA23523A}"/>
+              </a:ext>
+            </a:extLst>
+          </p:cNvPr>
+          <p:cNvSpPr>
+            <a:spLocks noGrp="1"/>
+          </p:cNvSpPr>
+          <p:nvPr>
+            <p:ph type="title"/>
+          </p:nvPr>
+        </p:nvSpPr>
+        <p:spPr/>
+        <p:txBody>
+          <a:bodyPr/>
+          <a:lstStyle/>
+          <a:p>
+            <a:pPr algn="ctr"/>
+            <a:r>
+              <a:rPr lang="en-US" dirty="0"/>
+              <a:t>Biggest challenge</a:t>
+            </a:r>
+          </a:p>
+        </p:txBody>
+      </p:sp>
+      <p:sp>
+        <p:nvSpPr>
+          <p:cNvPr id="5" name="TextBox 4">
+            <a:extLst>
+              <a:ext uri="{FF2B5EF4-FFF2-40B4-BE49-F238E27FC236}">
+                <a16:creationId xmlns:a16="http://schemas.microsoft.com/office/drawing/2014/main" id="{4008A12A-34E3-4CB9-91E5-DA4D41EEBA40}"/>
+              </a:ext>
+            </a:extLst>
+          </p:cNvPr>
+          <p:cNvSpPr txBox="1"/>
+          <p:nvPr/>
+        </p:nvSpPr>
+        <p:spPr>
+          <a:xfrm>
+            <a:off x="1862356" y="2365695"/>
+            <a:ext cx="8959442" cy="2308324"/>
+          </a:xfrm>
+          <a:prstGeom prst="rect">
+            <a:avLst/>
+          </a:prstGeom>
+          <a:noFill/>
+        </p:spPr>
+        <p:txBody>
+          <a:bodyPr wrap="square" rtlCol="0">
+            <a:spAutoFit/>
+          </a:bodyPr>
+          <a:lstStyle/>
+          <a:p>
+            <a:endParaRPr lang="en-US" dirty="0"/>
+          </a:p>
+          <a:p>
+            <a:pPr marL="742950" lvl="1" indent="-285750">
+              <a:buFont typeface="Wingdings" panose="05000000000000000000" pitchFamily="2" charset="2"/>
+              <a:buChar char="Ø"/>
+            </a:pPr>
+            <a:r>
+              <a:rPr lang="en-US" dirty="0"/>
+              <a:t>Feeding the tensorflow graph</a:t>
+            </a:r>
+          </a:p>
+          <a:p>
+            <a:pPr marL="1200150" lvl="2" indent="-285750">
+              <a:buFont typeface="Wingdings" panose="05000000000000000000" pitchFamily="2" charset="2"/>
+              <a:buChar char="Ø"/>
+            </a:pPr>
+            <a:r>
+              <a:rPr lang="en-US" dirty="0"/>
+              <a:t>SNN</a:t>
+            </a:r>
+          </a:p>
+          <a:p>
+            <a:pPr marL="1657350" lvl="3" indent="-285750">
+              <a:buFont typeface="Arial" panose="020B0604020202020204" pitchFamily="34" charset="0"/>
+              <a:buChar char="•"/>
+            </a:pPr>
+            <a:r>
+              <a:rPr lang="en-US" dirty="0"/>
+              <a:t>Batches (</a:t>
+            </a:r>
+            <a:r>
+              <a:rPr lang="en-US" dirty="0" err="1"/>
+              <a:t>train_x</a:t>
+            </a:r>
+            <a:r>
+              <a:rPr lang="en-US" dirty="0"/>
+              <a:t>, </a:t>
+            </a:r>
+            <a:r>
+              <a:rPr lang="en-US" dirty="0" err="1"/>
+              <a:t>train_y</a:t>
+            </a:r>
+            <a:r>
+              <a:rPr lang="en-US" dirty="0"/>
+              <a:t>) , (</a:t>
+            </a:r>
+            <a:r>
+              <a:rPr lang="en-US" dirty="0" err="1"/>
+              <a:t>test_x</a:t>
+            </a:r>
+            <a:r>
+              <a:rPr lang="en-US" dirty="0"/>
+              <a:t>, </a:t>
+            </a:r>
+            <a:r>
+              <a:rPr lang="en-US" dirty="0" err="1"/>
+              <a:t>test_y</a:t>
+            </a:r>
+            <a:r>
+              <a:rPr lang="en-US" dirty="0"/>
+              <a:t>)</a:t>
+            </a:r>
+          </a:p>
+          <a:p>
+            <a:pPr lvl="3"/>
+            <a:endParaRPr lang="en-US" dirty="0"/>
+          </a:p>
+          <a:p>
+            <a:pPr lvl="1"/>
+            <a:r>
+              <a:rPr lang="en-US" dirty="0"/>
+              <a:t> </a:t>
+            </a:r>
+          </a:p>
+          <a:p>
+            <a:pPr lvl="1"/>
+            <a:endParaRPr lang="en-US" b="1" dirty="0"/>
+          </a:p>
+          <a:p>
+            <a:pPr marL="742950" lvl="1" indent="-285750">
+              <a:buFont typeface="Wingdings" panose="05000000000000000000" pitchFamily="2" charset="2"/>
+              <a:buChar char="Ø"/>
+            </a:pPr>
+            <a:endParaRPr lang="en-US" dirty="0"/>
+          </a:p>
+        </p:txBody>
+      </p:sp>
+    </p:spTree>
+    <p:extLst>
+      <p:ext uri="{BB962C8B-B14F-4D97-AF65-F5344CB8AC3E}">
+        <p14:creationId xmlns:p14="http://schemas.microsoft.com/office/powerpoint/2010/main" val="1149601800"/>
+      </p:ext>
+    </p:extLst>
+  </p:cSld>
+  <p:clrMapOvr>
+    <a:masterClrMapping/>
+  </p:clrMapOvr>
+  <mc:AlternateContent xmlns:mc="http://schemas.openxmlformats.org/markup-compatibility/2006" xmlns:p14="http://schemas.microsoft.com/office/powerpoint/2010/main">
+    <mc:Choice Requires="p14">
+      <p:transition spd="med" p14:dur="700">
+        <p:fade/>
+      </p:transition>
+    </mc:Choice>
+    <mc:Fallback xmlns="">
+      <p:transition spd="med">
+        <p:fade/>
+      </p:transition>
+    </mc:Fallback>
+  </mc:AlternateContent>
+</p:sld>
+</file>
+
+<file path=ppt/slides/slide19.xml><?xml version="1.0" encoding="utf-8"?>
+<p:sld xmlns:a="http://schemas.openxmlformats.org/drawingml/2006/main" xmlns:r="http://schemas.openxmlformats.org/officeDocument/2006/relationships" xmlns:p="http://schemas.openxmlformats.org/presentationml/2006/main">
+  <p:cSld>
+    <p:spTree>
+      <p:nvGrpSpPr>
+        <p:cNvPr id="1" name=""/>
+        <p:cNvGrpSpPr/>
+        <p:nvPr/>
+      </p:nvGrpSpPr>
+      <p:grpSpPr>
+        <a:xfrm>
+          <a:off x="0" y="0"/>
+          <a:ext cx="0" cy="0"/>
+          <a:chOff x="0" y="0"/>
+          <a:chExt cx="0" cy="0"/>
+        </a:xfrm>
+      </p:grpSpPr>
+      <p:sp>
+        <p:nvSpPr>
+          <p:cNvPr id="2" name="Title 1">
+            <a:extLst>
+              <a:ext uri="{FF2B5EF4-FFF2-40B4-BE49-F238E27FC236}">
+                <a16:creationId xmlns:a16="http://schemas.microsoft.com/office/drawing/2014/main" id="{E5A0E343-1EB8-4823-B727-F110AA23523A}"/>
+              </a:ext>
+            </a:extLst>
+          </p:cNvPr>
+          <p:cNvSpPr>
+            <a:spLocks noGrp="1"/>
+          </p:cNvSpPr>
+          <p:nvPr>
+            <p:ph type="title"/>
+          </p:nvPr>
+        </p:nvSpPr>
+        <p:spPr/>
+        <p:txBody>
+          <a:bodyPr/>
+          <a:lstStyle/>
+          <a:p>
+            <a:pPr algn="ctr"/>
+            <a:r>
+              <a:rPr lang="en-US" dirty="0"/>
+              <a:t>Biggest challenge</a:t>
+            </a:r>
+          </a:p>
+        </p:txBody>
+      </p:sp>
+      <p:sp>
+        <p:nvSpPr>
+          <p:cNvPr id="5" name="TextBox 4">
+            <a:extLst>
+              <a:ext uri="{FF2B5EF4-FFF2-40B4-BE49-F238E27FC236}">
+                <a16:creationId xmlns:a16="http://schemas.microsoft.com/office/drawing/2014/main" id="{4008A12A-34E3-4CB9-91E5-DA4D41EEBA40}"/>
+              </a:ext>
+            </a:extLst>
+          </p:cNvPr>
+          <p:cNvSpPr txBox="1"/>
+          <p:nvPr/>
+        </p:nvSpPr>
+        <p:spPr>
+          <a:xfrm>
+            <a:off x="1862356" y="2365695"/>
+            <a:ext cx="8959442" cy="3139321"/>
+          </a:xfrm>
+          <a:prstGeom prst="rect">
+            <a:avLst/>
+          </a:prstGeom>
+          <a:noFill/>
+        </p:spPr>
+        <p:txBody>
+          <a:bodyPr wrap="square" rtlCol="0">
+            <a:spAutoFit/>
+          </a:bodyPr>
+          <a:lstStyle/>
+          <a:p>
+            <a:endParaRPr lang="en-US" dirty="0"/>
+          </a:p>
+          <a:p>
+            <a:pPr marL="742950" lvl="1" indent="-285750">
+              <a:buFont typeface="Wingdings" panose="05000000000000000000" pitchFamily="2" charset="2"/>
+              <a:buChar char="Ø"/>
+            </a:pPr>
+            <a:r>
+              <a:rPr lang="en-US" dirty="0"/>
+              <a:t>Feeding the tensorflow graph</a:t>
+            </a:r>
+          </a:p>
+          <a:p>
+            <a:pPr marL="1200150" lvl="2" indent="-285750">
+              <a:buFont typeface="Wingdings" panose="05000000000000000000" pitchFamily="2" charset="2"/>
+              <a:buChar char="Ø"/>
+            </a:pPr>
+            <a:r>
+              <a:rPr lang="en-US" dirty="0"/>
+              <a:t>SNN</a:t>
+            </a:r>
+          </a:p>
+          <a:p>
+            <a:pPr marL="1657350" lvl="3" indent="-285750">
+              <a:buFont typeface="Arial" panose="020B0604020202020204" pitchFamily="34" charset="0"/>
+              <a:buChar char="•"/>
+            </a:pPr>
+            <a:r>
+              <a:rPr lang="en-US" dirty="0"/>
+              <a:t>Batches (</a:t>
+            </a:r>
+            <a:r>
+              <a:rPr lang="en-US" dirty="0" err="1"/>
+              <a:t>train_x</a:t>
+            </a:r>
+            <a:r>
+              <a:rPr lang="en-US" dirty="0"/>
+              <a:t>, </a:t>
+            </a:r>
+            <a:r>
+              <a:rPr lang="en-US" dirty="0" err="1"/>
+              <a:t>train_y</a:t>
+            </a:r>
+            <a:r>
+              <a:rPr lang="en-US" dirty="0"/>
+              <a:t>) , (</a:t>
+            </a:r>
+            <a:r>
+              <a:rPr lang="en-US" dirty="0" err="1"/>
+              <a:t>test_x</a:t>
+            </a:r>
+            <a:r>
+              <a:rPr lang="en-US" dirty="0"/>
+              <a:t>, </a:t>
+            </a:r>
+            <a:r>
+              <a:rPr lang="en-US" dirty="0" err="1"/>
+              <a:t>test_y</a:t>
+            </a:r>
+            <a:r>
+              <a:rPr lang="en-US" dirty="0"/>
+              <a:t>)</a:t>
+            </a:r>
+          </a:p>
+          <a:p>
+            <a:pPr lvl="3"/>
+            <a:endParaRPr lang="en-US" dirty="0"/>
+          </a:p>
+          <a:p>
+            <a:pPr marL="1657350" lvl="3" indent="-285750">
+              <a:buFont typeface="Arial" panose="020B0604020202020204" pitchFamily="34" charset="0"/>
+              <a:buChar char="•"/>
+            </a:pPr>
+            <a:r>
+              <a:rPr lang="en-US" dirty="0"/>
+              <a:t>Shape the tensor correctly</a:t>
+            </a:r>
+          </a:p>
+          <a:p>
+            <a:pPr lvl="4"/>
+            <a:r>
+              <a:rPr lang="en-US" dirty="0"/>
+              <a:t>     x = </a:t>
+            </a:r>
+            <a:r>
+              <a:rPr lang="en-US" dirty="0" err="1"/>
+              <a:t>tf.placeholder</a:t>
+            </a:r>
+            <a:r>
+              <a:rPr lang="en-US" dirty="0"/>
+              <a:t>('float32', [None, </a:t>
+            </a:r>
+            <a:r>
+              <a:rPr lang="en-US" dirty="0" err="1"/>
+              <a:t>n_input</a:t>
+            </a:r>
+            <a:r>
+              <a:rPr lang="en-US" dirty="0"/>
+              <a:t>]) # (?, 445)</a:t>
+            </a:r>
+          </a:p>
+          <a:p>
+            <a:pPr lvl="4"/>
+            <a:r>
+              <a:rPr lang="en-US" dirty="0"/>
+              <a:t>     y = </a:t>
+            </a:r>
+            <a:r>
+              <a:rPr lang="en-US" dirty="0" err="1"/>
+              <a:t>tf.placeholder</a:t>
+            </a:r>
+            <a:r>
+              <a:rPr lang="en-US" dirty="0"/>
+              <a:t>('float32', [</a:t>
+            </a:r>
+            <a:r>
+              <a:rPr lang="en-US" dirty="0" err="1"/>
+              <a:t>n_classes</a:t>
+            </a:r>
+            <a:r>
+              <a:rPr lang="en-US" dirty="0"/>
+              <a:t>]) # (410)</a:t>
+            </a:r>
+          </a:p>
+          <a:p>
+            <a:pPr lvl="1"/>
+            <a:r>
+              <a:rPr lang="en-US" dirty="0"/>
+              <a:t> </a:t>
+            </a:r>
+          </a:p>
+          <a:p>
+            <a:pPr lvl="1"/>
+            <a:endParaRPr lang="en-US" b="1" dirty="0"/>
+          </a:p>
+          <a:p>
+            <a:pPr marL="742950" lvl="1" indent="-285750">
+              <a:buFont typeface="Wingdings" panose="05000000000000000000" pitchFamily="2" charset="2"/>
+              <a:buChar char="Ø"/>
+            </a:pPr>
+            <a:endParaRPr lang="en-US" dirty="0"/>
+          </a:p>
+        </p:txBody>
+      </p:sp>
+    </p:spTree>
+    <p:extLst>
+      <p:ext uri="{BB962C8B-B14F-4D97-AF65-F5344CB8AC3E}">
+        <p14:creationId xmlns:p14="http://schemas.microsoft.com/office/powerpoint/2010/main" val="2372559060"/>
+      </p:ext>
+    </p:extLst>
+  </p:cSld>
+  <p:clrMapOvr>
+    <a:masterClrMapping/>
+  </p:clrMapOvr>
+  <mc:AlternateContent xmlns:mc="http://schemas.openxmlformats.org/markup-compatibility/2006" xmlns:p14="http://schemas.microsoft.com/office/powerpoint/2010/main">
+    <mc:Choice Requires="p14">
+      <p:transition spd="med" p14:dur="700">
+        <p:fade/>
+      </p:transition>
+    </mc:Choice>
+    <mc:Fallback xmlns="">
+      <p:transition spd="med">
+        <p:fade/>
+      </p:transition>
+    </mc:Fallback>
+  </mc:AlternateContent>
+</p:sld>
+</file>
+
+<file path=ppt/slides/slide2.xml><?xml version="1.0" encoding="utf-8"?>
+<p:sld xmlns:a="http://schemas.openxmlformats.org/drawingml/2006/main" xmlns:r="http://schemas.openxmlformats.org/officeDocument/2006/relationships" xmlns:p="http://schemas.openxmlformats.org/presentationml/2006/main">
+  <p:cSld>
+    <p:spTree>
+      <p:nvGrpSpPr>
+        <p:cNvPr id="1" name=""/>
+        <p:cNvGrpSpPr/>
+        <p:nvPr/>
+      </p:nvGrpSpPr>
+      <p:grpSpPr>
+        <a:xfrm>
+          <a:off x="0" y="0"/>
+          <a:ext cx="0" cy="0"/>
+          <a:chOff x="0" y="0"/>
+          <a:chExt cx="0" cy="0"/>
+        </a:xfrm>
+      </p:grpSpPr>
+      <p:sp>
+        <p:nvSpPr>
+          <p:cNvPr id="2" name="Title 1">
+            <a:extLst>
+              <a:ext uri="{FF2B5EF4-FFF2-40B4-BE49-F238E27FC236}">
+                <a16:creationId xmlns:a16="http://schemas.microsoft.com/office/drawing/2014/main" id="{F9C7C7A1-27A4-44BB-9EDB-C42057F303DB}"/>
+              </a:ext>
+            </a:extLst>
+          </p:cNvPr>
+          <p:cNvSpPr>
+            <a:spLocks noGrp="1"/>
+          </p:cNvSpPr>
+          <p:nvPr>
+            <p:ph type="title"/>
+          </p:nvPr>
+        </p:nvSpPr>
+        <p:spPr/>
+        <p:txBody>
+          <a:bodyPr/>
+          <a:lstStyle/>
+          <a:p>
+            <a:pPr algn="ctr"/>
+            <a:r>
+              <a:rPr lang="en-US" u="sng" dirty="0" err="1"/>
+              <a:t>Rnn</a:t>
+            </a:r>
+            <a:r>
+              <a:rPr lang="en-US" u="sng" dirty="0"/>
+              <a:t> recap</a:t>
+            </a:r>
+          </a:p>
+        </p:txBody>
+      </p:sp>
+      <p:sp>
+        <p:nvSpPr>
+          <p:cNvPr id="3" name="TextBox 2">
+            <a:extLst>
+              <a:ext uri="{FF2B5EF4-FFF2-40B4-BE49-F238E27FC236}">
+                <a16:creationId xmlns:a16="http://schemas.microsoft.com/office/drawing/2014/main" id="{1DD94BFF-E763-4E86-BE37-2A45493E42E5}"/>
+              </a:ext>
+            </a:extLst>
+          </p:cNvPr>
+          <p:cNvSpPr txBox="1"/>
+          <p:nvPr/>
+        </p:nvSpPr>
+        <p:spPr>
+          <a:xfrm>
+            <a:off x="1560353" y="2281806"/>
+            <a:ext cx="9614647" cy="1754326"/>
+          </a:xfrm>
+          <a:prstGeom prst="rect">
+            <a:avLst/>
+          </a:prstGeom>
+          <a:noFill/>
+        </p:spPr>
+        <p:txBody>
+          <a:bodyPr wrap="square" rtlCol="0">
+            <a:spAutoFit/>
+          </a:bodyPr>
+          <a:lstStyle/>
+          <a:p>
+            <a:r>
+              <a:rPr lang="en-US" dirty="0"/>
+              <a:t>A </a:t>
+            </a:r>
+            <a:r>
+              <a:rPr lang="en-US" b="1" dirty="0"/>
+              <a:t>recurrent neural network</a:t>
+            </a:r>
+            <a:r>
+              <a:rPr lang="en-US" dirty="0"/>
+              <a:t> (</a:t>
+            </a:r>
+            <a:r>
+              <a:rPr lang="en-US" b="1" dirty="0"/>
+              <a:t>RNN</a:t>
+            </a:r>
+            <a:r>
+              <a:rPr lang="en-US" dirty="0"/>
+              <a:t>) is a class of artificial neural network where connections between nodes form a directed graph along a sequence. This allows it to exhibit temporal dynamic behavior for a time sequence. Unlike feedforward neural networks, RNNs can use their internal state (memory) to process sequences of inputs. This makes them applicable to tasks such as unsegmented, connected handwriting recognition or speech recognition.</a:t>
+            </a:r>
+          </a:p>
+          <a:p>
+            <a:endParaRPr lang="en-US" dirty="0"/>
+          </a:p>
+        </p:txBody>
+      </p:sp>
+    </p:spTree>
+    <p:extLst>
+      <p:ext uri="{BB962C8B-B14F-4D97-AF65-F5344CB8AC3E}">
+        <p14:creationId xmlns:p14="http://schemas.microsoft.com/office/powerpoint/2010/main" val="3302420173"/>
+      </p:ext>
+    </p:extLst>
+  </p:cSld>
+  <p:clrMapOvr>
+    <a:masterClrMapping/>
+  </p:clrMapOvr>
+  <mc:AlternateContent xmlns:mc="http://schemas.openxmlformats.org/markup-compatibility/2006" xmlns:p159="http://schemas.microsoft.com/office/powerpoint/2015/09/main">
+    <mc:Choice Requires="p159">
+      <p:transition xmlns:p14="http://schemas.microsoft.com/office/powerpoint/2010/main" spd="slow" p14:dur="2000">
+        <p159:morph option="byObject"/>
+      </p:transition>
+    </mc:Choice>
+    <mc:Fallback xmlns="">
+      <p:transition spd="slow">
+        <p:fade/>
+      </p:transition>
+    </mc:Fallback>
+  </mc:AlternateContent>
+</p:sld>
+</file>
+
+<file path=ppt/slides/slide20.xml><?xml version="1.0" encoding="utf-8"?>
+<p:sld xmlns:a="http://schemas.openxmlformats.org/drawingml/2006/main" xmlns:r="http://schemas.openxmlformats.org/officeDocument/2006/relationships" xmlns:p="http://schemas.openxmlformats.org/presentationml/2006/main">
+  <p:cSld>
+    <p:spTree>
+      <p:nvGrpSpPr>
+        <p:cNvPr id="1" name=""/>
+        <p:cNvGrpSpPr/>
+        <p:nvPr/>
+      </p:nvGrpSpPr>
+      <p:grpSpPr>
+        <a:xfrm>
+          <a:off x="0" y="0"/>
+          <a:ext cx="0" cy="0"/>
+          <a:chOff x="0" y="0"/>
+          <a:chExt cx="0" cy="0"/>
+        </a:xfrm>
+      </p:grpSpPr>
+      <p:sp>
+        <p:nvSpPr>
+          <p:cNvPr id="2" name="Title 1">
+            <a:extLst>
+              <a:ext uri="{FF2B5EF4-FFF2-40B4-BE49-F238E27FC236}">
+                <a16:creationId xmlns:a16="http://schemas.microsoft.com/office/drawing/2014/main" id="{E5A0E343-1EB8-4823-B727-F110AA23523A}"/>
+              </a:ext>
+            </a:extLst>
+          </p:cNvPr>
+          <p:cNvSpPr>
+            <a:spLocks noGrp="1"/>
+          </p:cNvSpPr>
+          <p:nvPr>
+            <p:ph type="title"/>
+          </p:nvPr>
+        </p:nvSpPr>
+        <p:spPr/>
+        <p:txBody>
+          <a:bodyPr/>
+          <a:lstStyle/>
+          <a:p>
+            <a:pPr algn="ctr"/>
+            <a:r>
+              <a:rPr lang="en-US" dirty="0"/>
+              <a:t>Biggest challenge</a:t>
+            </a:r>
+          </a:p>
+        </p:txBody>
+      </p:sp>
+      <p:sp>
+        <p:nvSpPr>
+          <p:cNvPr id="5" name="TextBox 4">
+            <a:extLst>
+              <a:ext uri="{FF2B5EF4-FFF2-40B4-BE49-F238E27FC236}">
+                <a16:creationId xmlns:a16="http://schemas.microsoft.com/office/drawing/2014/main" id="{4008A12A-34E3-4CB9-91E5-DA4D41EEBA40}"/>
+              </a:ext>
+            </a:extLst>
+          </p:cNvPr>
+          <p:cNvSpPr txBox="1"/>
+          <p:nvPr/>
+        </p:nvSpPr>
+        <p:spPr>
+          <a:xfrm>
+            <a:off x="1862356" y="2365695"/>
+            <a:ext cx="8959442" cy="3416320"/>
+          </a:xfrm>
+          <a:prstGeom prst="rect">
+            <a:avLst/>
+          </a:prstGeom>
+          <a:noFill/>
+        </p:spPr>
+        <p:txBody>
+          <a:bodyPr wrap="square" rtlCol="0">
+            <a:spAutoFit/>
+          </a:bodyPr>
+          <a:lstStyle/>
+          <a:p>
+            <a:endParaRPr lang="en-US" dirty="0"/>
+          </a:p>
+          <a:p>
+            <a:pPr marL="742950" lvl="1" indent="-285750">
+              <a:buFont typeface="Wingdings" panose="05000000000000000000" pitchFamily="2" charset="2"/>
+              <a:buChar char="Ø"/>
+            </a:pPr>
+            <a:r>
+              <a:rPr lang="en-US" dirty="0"/>
+              <a:t>Feeding the tensorflow graph</a:t>
+            </a:r>
+          </a:p>
+          <a:p>
+            <a:pPr marL="1200150" lvl="2" indent="-285750">
+              <a:buFont typeface="Wingdings" panose="05000000000000000000" pitchFamily="2" charset="2"/>
+              <a:buChar char="Ø"/>
+            </a:pPr>
+            <a:r>
+              <a:rPr lang="en-US" dirty="0"/>
+              <a:t>SNN</a:t>
+            </a:r>
+          </a:p>
+          <a:p>
+            <a:pPr marL="1657350" lvl="3" indent="-285750">
+              <a:buFont typeface="Arial" panose="020B0604020202020204" pitchFamily="34" charset="0"/>
+              <a:buChar char="•"/>
+            </a:pPr>
+            <a:r>
+              <a:rPr lang="en-US" dirty="0"/>
+              <a:t>Batches (</a:t>
+            </a:r>
+            <a:r>
+              <a:rPr lang="en-US" dirty="0" err="1"/>
+              <a:t>train_x</a:t>
+            </a:r>
+            <a:r>
+              <a:rPr lang="en-US" dirty="0"/>
+              <a:t>, </a:t>
+            </a:r>
+            <a:r>
+              <a:rPr lang="en-US" dirty="0" err="1"/>
+              <a:t>train_y</a:t>
+            </a:r>
+            <a:r>
+              <a:rPr lang="en-US" dirty="0"/>
+              <a:t>) , (</a:t>
+            </a:r>
+            <a:r>
+              <a:rPr lang="en-US" dirty="0" err="1"/>
+              <a:t>test_x</a:t>
+            </a:r>
+            <a:r>
+              <a:rPr lang="en-US" dirty="0"/>
+              <a:t>, </a:t>
+            </a:r>
+            <a:r>
+              <a:rPr lang="en-US" dirty="0" err="1"/>
+              <a:t>test_y</a:t>
+            </a:r>
+            <a:r>
+              <a:rPr lang="en-US" dirty="0"/>
+              <a:t>)</a:t>
+            </a:r>
+          </a:p>
+          <a:p>
+            <a:pPr lvl="3"/>
+            <a:endParaRPr lang="en-US" dirty="0"/>
+          </a:p>
+          <a:p>
+            <a:pPr marL="1657350" lvl="3" indent="-285750">
+              <a:buFont typeface="Arial" panose="020B0604020202020204" pitchFamily="34" charset="0"/>
+              <a:buChar char="•"/>
+            </a:pPr>
+            <a:r>
+              <a:rPr lang="en-US" dirty="0"/>
+              <a:t>Shape the tensor correctly</a:t>
+            </a:r>
+          </a:p>
+          <a:p>
+            <a:pPr marL="2114550" lvl="4" indent="-285750">
+              <a:buFont typeface="Wingdings" panose="05000000000000000000" pitchFamily="2" charset="2"/>
+              <a:buChar char="ü"/>
+            </a:pPr>
+            <a:r>
+              <a:rPr lang="en-US" dirty="0"/>
+              <a:t>x = </a:t>
+            </a:r>
+            <a:r>
+              <a:rPr lang="en-US" dirty="0" err="1"/>
+              <a:t>tf.placeholder</a:t>
+            </a:r>
+            <a:r>
+              <a:rPr lang="en-US" dirty="0"/>
+              <a:t>('float32', [None, </a:t>
+            </a:r>
+            <a:r>
+              <a:rPr lang="en-US" dirty="0" err="1"/>
+              <a:t>n_input</a:t>
+            </a:r>
+            <a:r>
+              <a:rPr lang="en-US" dirty="0"/>
+              <a:t>]) # (?, 445)</a:t>
+            </a:r>
+          </a:p>
+          <a:p>
+            <a:pPr marL="2114550" lvl="4" indent="-285750">
+              <a:buFont typeface="Wingdings" panose="05000000000000000000" pitchFamily="2" charset="2"/>
+              <a:buChar char="ü"/>
+            </a:pPr>
+            <a:r>
+              <a:rPr lang="en-US" dirty="0"/>
+              <a:t>y = </a:t>
+            </a:r>
+            <a:r>
+              <a:rPr lang="en-US" dirty="0" err="1"/>
+              <a:t>tf.placeholder</a:t>
+            </a:r>
+            <a:r>
+              <a:rPr lang="en-US" dirty="0"/>
+              <a:t>('float32’, [None, </a:t>
+            </a:r>
+            <a:r>
+              <a:rPr lang="en-US" dirty="0" err="1"/>
+              <a:t>n_classes</a:t>
+            </a:r>
+            <a:r>
+              <a:rPr lang="en-US" dirty="0"/>
+              <a:t>]) # (?, 410)</a:t>
+            </a:r>
+          </a:p>
+          <a:p>
+            <a:pPr marL="2114550" lvl="4" indent="-285750">
+              <a:buFont typeface="Arial" panose="020B0604020202020204" pitchFamily="34" charset="0"/>
+              <a:buChar char="•"/>
+            </a:pPr>
+            <a:r>
+              <a:rPr lang="en-US" dirty="0"/>
+              <a:t> Labels were categorical, feeding 410 rows that were supposed to be columns.</a:t>
+            </a:r>
+          </a:p>
+          <a:p>
+            <a:pPr lvl="1"/>
+            <a:endParaRPr lang="en-US" b="1" dirty="0"/>
+          </a:p>
+          <a:p>
+            <a:pPr marL="742950" lvl="1" indent="-285750">
+              <a:buFont typeface="Wingdings" panose="05000000000000000000" pitchFamily="2" charset="2"/>
+              <a:buChar char="Ø"/>
+            </a:pPr>
+            <a:endParaRPr lang="en-US" dirty="0"/>
+          </a:p>
+        </p:txBody>
+      </p:sp>
+    </p:spTree>
+    <p:extLst>
+      <p:ext uri="{BB962C8B-B14F-4D97-AF65-F5344CB8AC3E}">
+        <p14:creationId xmlns:p14="http://schemas.microsoft.com/office/powerpoint/2010/main" val="1494340602"/>
+      </p:ext>
+    </p:extLst>
+  </p:cSld>
+  <p:clrMapOvr>
+    <a:masterClrMapping/>
+  </p:clrMapOvr>
+  <mc:AlternateContent xmlns:mc="http://schemas.openxmlformats.org/markup-compatibility/2006" xmlns:p14="http://schemas.microsoft.com/office/powerpoint/2010/main">
+    <mc:Choice Requires="p14">
+      <p:transition spd="med" p14:dur="700">
+        <p:fade/>
+      </p:transition>
+    </mc:Choice>
+    <mc:Fallback xmlns="">
+      <p:transition spd="med">
+        <p:fade/>
+      </p:transition>
+    </mc:Fallback>
+  </mc:AlternateContent>
+</p:sld>
+</file>
+
+<file path=ppt/slides/slide21.xml><?xml version="1.0" encoding="utf-8"?>
+<p:sld xmlns:a="http://schemas.openxmlformats.org/drawingml/2006/main" xmlns:r="http://schemas.openxmlformats.org/officeDocument/2006/relationships" xmlns:p="http://schemas.openxmlformats.org/presentationml/2006/main">
+  <p:cSld>
+    <p:spTree>
+      <p:nvGrpSpPr>
+        <p:cNvPr id="1" name=""/>
+        <p:cNvGrpSpPr/>
+        <p:nvPr/>
+      </p:nvGrpSpPr>
+      <p:grpSpPr>
+        <a:xfrm>
+          <a:off x="0" y="0"/>
+          <a:ext cx="0" cy="0"/>
+          <a:chOff x="0" y="0"/>
+          <a:chExt cx="0" cy="0"/>
+        </a:xfrm>
+      </p:grpSpPr>
+      <p:sp>
+        <p:nvSpPr>
+          <p:cNvPr id="2" name="Title 1">
+            <a:extLst>
+              <a:ext uri="{FF2B5EF4-FFF2-40B4-BE49-F238E27FC236}">
+                <a16:creationId xmlns:a16="http://schemas.microsoft.com/office/drawing/2014/main" id="{E5A0E343-1EB8-4823-B727-F110AA23523A}"/>
+              </a:ext>
+            </a:extLst>
+          </p:cNvPr>
+          <p:cNvSpPr>
+            <a:spLocks noGrp="1"/>
+          </p:cNvSpPr>
+          <p:nvPr>
+            <p:ph type="title"/>
+          </p:nvPr>
+        </p:nvSpPr>
+        <p:spPr/>
+        <p:txBody>
+          <a:bodyPr/>
+          <a:lstStyle/>
+          <a:p>
+            <a:pPr algn="ctr"/>
+            <a:r>
+              <a:rPr lang="en-US" dirty="0"/>
+              <a:t>Biggest challenge</a:t>
+            </a:r>
+          </a:p>
+        </p:txBody>
+      </p:sp>
+      <p:sp>
+        <p:nvSpPr>
+          <p:cNvPr id="5" name="TextBox 4">
+            <a:extLst>
+              <a:ext uri="{FF2B5EF4-FFF2-40B4-BE49-F238E27FC236}">
+                <a16:creationId xmlns:a16="http://schemas.microsoft.com/office/drawing/2014/main" id="{4008A12A-34E3-4CB9-91E5-DA4D41EEBA40}"/>
+              </a:ext>
+            </a:extLst>
+          </p:cNvPr>
+          <p:cNvSpPr txBox="1"/>
+          <p:nvPr/>
+        </p:nvSpPr>
+        <p:spPr>
+          <a:xfrm>
+            <a:off x="1862356" y="2365695"/>
+            <a:ext cx="8959442" cy="2031325"/>
+          </a:xfrm>
+          <a:prstGeom prst="rect">
+            <a:avLst/>
+          </a:prstGeom>
+          <a:noFill/>
+        </p:spPr>
+        <p:txBody>
+          <a:bodyPr wrap="square" rtlCol="0">
+            <a:spAutoFit/>
+          </a:bodyPr>
+          <a:lstStyle/>
+          <a:p>
+            <a:endParaRPr lang="en-US" dirty="0"/>
+          </a:p>
+          <a:p>
+            <a:pPr marL="742950" lvl="1" indent="-285750">
+              <a:buFont typeface="Wingdings" panose="05000000000000000000" pitchFamily="2" charset="2"/>
+              <a:buChar char="Ø"/>
+            </a:pPr>
+            <a:r>
+              <a:rPr lang="en-US" dirty="0"/>
+              <a:t>Feeding the tensorflow graph</a:t>
+            </a:r>
+          </a:p>
+          <a:p>
+            <a:pPr marL="1200150" lvl="2" indent="-285750">
+              <a:buFont typeface="Wingdings" panose="05000000000000000000" pitchFamily="2" charset="2"/>
+              <a:buChar char="Ø"/>
+            </a:pPr>
+            <a:r>
+              <a:rPr lang="en-US" dirty="0"/>
+              <a:t>SNN</a:t>
+            </a:r>
+          </a:p>
+          <a:p>
+            <a:pPr marL="1200150" lvl="2" indent="-285750">
+              <a:buFont typeface="Wingdings" panose="05000000000000000000" pitchFamily="2" charset="2"/>
+              <a:buChar char="Ø"/>
+            </a:pPr>
+            <a:endParaRPr lang="en-US" b="1" dirty="0"/>
+          </a:p>
+          <a:p>
+            <a:pPr marL="1200150" lvl="2" indent="-285750">
+              <a:buFont typeface="Wingdings" panose="05000000000000000000" pitchFamily="2" charset="2"/>
+              <a:buChar char="Ø"/>
+            </a:pPr>
+            <a:r>
+              <a:rPr lang="en-US" dirty="0"/>
+              <a:t>RNN</a:t>
+            </a:r>
+          </a:p>
+          <a:p>
+            <a:pPr marL="1657350" lvl="3" indent="-285750">
+              <a:buFont typeface="Arial" panose="020B0604020202020204" pitchFamily="34" charset="0"/>
+              <a:buChar char="•"/>
+            </a:pPr>
+            <a:r>
+              <a:rPr lang="en-US" dirty="0"/>
+              <a:t>One Hot encoded everything!</a:t>
+            </a:r>
+          </a:p>
+          <a:p>
+            <a:pPr lvl="4"/>
+            <a:endParaRPr lang="en-US" dirty="0"/>
+          </a:p>
+        </p:txBody>
+      </p:sp>
+    </p:spTree>
+    <p:extLst>
+      <p:ext uri="{BB962C8B-B14F-4D97-AF65-F5344CB8AC3E}">
+        <p14:creationId xmlns:p14="http://schemas.microsoft.com/office/powerpoint/2010/main" val="1182185106"/>
+      </p:ext>
+    </p:extLst>
+  </p:cSld>
+  <p:clrMapOvr>
+    <a:masterClrMapping/>
+  </p:clrMapOvr>
+  <mc:AlternateContent xmlns:mc="http://schemas.openxmlformats.org/markup-compatibility/2006" xmlns:p14="http://schemas.microsoft.com/office/powerpoint/2010/main">
+    <mc:Choice Requires="p14">
+      <p:transition spd="med" p14:dur="700">
+        <p:fade/>
+      </p:transition>
+    </mc:Choice>
+    <mc:Fallback xmlns="">
+      <p:transition spd="med">
+        <p:fade/>
+      </p:transition>
+    </mc:Fallback>
+  </mc:AlternateContent>
+</p:sld>
+</file>
+
+<file path=ppt/slides/slide22.xml><?xml version="1.0" encoding="utf-8"?>
+<p:sld xmlns:a="http://schemas.openxmlformats.org/drawingml/2006/main" xmlns:r="http://schemas.openxmlformats.org/officeDocument/2006/relationships" xmlns:p="http://schemas.openxmlformats.org/presentationml/2006/main">
+  <p:cSld>
+    <p:spTree>
+      <p:nvGrpSpPr>
+        <p:cNvPr id="1" name=""/>
+        <p:cNvGrpSpPr/>
+        <p:nvPr/>
+      </p:nvGrpSpPr>
+      <p:grpSpPr>
+        <a:xfrm>
+          <a:off x="0" y="0"/>
+          <a:ext cx="0" cy="0"/>
+          <a:chOff x="0" y="0"/>
+          <a:chExt cx="0" cy="0"/>
+        </a:xfrm>
+      </p:grpSpPr>
+      <p:sp>
+        <p:nvSpPr>
+          <p:cNvPr id="2" name="Title 1">
+            <a:extLst>
+              <a:ext uri="{FF2B5EF4-FFF2-40B4-BE49-F238E27FC236}">
+                <a16:creationId xmlns:a16="http://schemas.microsoft.com/office/drawing/2014/main" id="{E5A0E343-1EB8-4823-B727-F110AA23523A}"/>
+              </a:ext>
+            </a:extLst>
+          </p:cNvPr>
+          <p:cNvSpPr>
+            <a:spLocks noGrp="1"/>
+          </p:cNvSpPr>
+          <p:nvPr>
+            <p:ph type="title"/>
+          </p:nvPr>
+        </p:nvSpPr>
+        <p:spPr/>
+        <p:txBody>
+          <a:bodyPr/>
+          <a:lstStyle/>
+          <a:p>
+            <a:pPr algn="ctr"/>
+            <a:r>
+              <a:rPr lang="en-US" dirty="0"/>
+              <a:t>Biggest challenge</a:t>
+            </a:r>
+          </a:p>
+        </p:txBody>
+      </p:sp>
+      <p:sp>
+        <p:nvSpPr>
+          <p:cNvPr id="5" name="TextBox 4">
+            <a:extLst>
+              <a:ext uri="{FF2B5EF4-FFF2-40B4-BE49-F238E27FC236}">
+                <a16:creationId xmlns:a16="http://schemas.microsoft.com/office/drawing/2014/main" id="{4008A12A-34E3-4CB9-91E5-DA4D41EEBA40}"/>
+              </a:ext>
+            </a:extLst>
+          </p:cNvPr>
+          <p:cNvSpPr txBox="1"/>
+          <p:nvPr/>
+        </p:nvSpPr>
+        <p:spPr>
+          <a:xfrm>
+            <a:off x="1862356" y="2365695"/>
+            <a:ext cx="8959442" cy="2862322"/>
+          </a:xfrm>
+          <a:prstGeom prst="rect">
+            <a:avLst/>
+          </a:prstGeom>
+          <a:noFill/>
+        </p:spPr>
+        <p:txBody>
+          <a:bodyPr wrap="square" rtlCol="0">
+            <a:spAutoFit/>
+          </a:bodyPr>
+          <a:lstStyle/>
+          <a:p>
+            <a:endParaRPr lang="en-US" dirty="0"/>
+          </a:p>
+          <a:p>
+            <a:pPr marL="742950" lvl="1" indent="-285750">
+              <a:buFont typeface="Wingdings" panose="05000000000000000000" pitchFamily="2" charset="2"/>
+              <a:buChar char="Ø"/>
+            </a:pPr>
+            <a:r>
+              <a:rPr lang="en-US" dirty="0"/>
+              <a:t>Feeding the tensorflow graph</a:t>
+            </a:r>
+          </a:p>
+          <a:p>
+            <a:pPr marL="1200150" lvl="2" indent="-285750">
+              <a:buFont typeface="Wingdings" panose="05000000000000000000" pitchFamily="2" charset="2"/>
+              <a:buChar char="Ø"/>
+            </a:pPr>
+            <a:r>
+              <a:rPr lang="en-US" dirty="0"/>
+              <a:t>SNN</a:t>
+            </a:r>
+          </a:p>
+          <a:p>
+            <a:pPr marL="1200150" lvl="2" indent="-285750">
+              <a:buFont typeface="Wingdings" panose="05000000000000000000" pitchFamily="2" charset="2"/>
+              <a:buChar char="Ø"/>
+            </a:pPr>
+            <a:endParaRPr lang="en-US" b="1" dirty="0"/>
+          </a:p>
+          <a:p>
+            <a:pPr marL="1200150" lvl="2" indent="-285750">
+              <a:buFont typeface="Wingdings" panose="05000000000000000000" pitchFamily="2" charset="2"/>
+              <a:buChar char="Ø"/>
+            </a:pPr>
+            <a:r>
+              <a:rPr lang="en-US" dirty="0"/>
+              <a:t>RNN</a:t>
+            </a:r>
+          </a:p>
+          <a:p>
+            <a:pPr marL="1657350" lvl="3" indent="-285750">
+              <a:buFont typeface="Arial" panose="020B0604020202020204" pitchFamily="34" charset="0"/>
+              <a:buChar char="•"/>
+            </a:pPr>
+            <a:r>
+              <a:rPr lang="en-US" dirty="0"/>
+              <a:t>One Hot encoded everything minus the labels which were still converted to float!</a:t>
+            </a:r>
+          </a:p>
+          <a:p>
+            <a:pPr marL="1657350" lvl="3" indent="-285750">
+              <a:buFont typeface="Arial" panose="020B0604020202020204" pitchFamily="34" charset="0"/>
+              <a:buChar char="•"/>
+            </a:pPr>
+            <a:r>
+              <a:rPr lang="en-US" dirty="0"/>
+              <a:t>Items need to be fed in sequence (sequential data)</a:t>
+            </a:r>
+          </a:p>
+          <a:p>
+            <a:pPr marL="2114550" lvl="4" indent="-285750">
+              <a:buFont typeface="Wingdings" panose="05000000000000000000" pitchFamily="2" charset="2"/>
+              <a:buChar char="ü"/>
+            </a:pPr>
+            <a:r>
+              <a:rPr lang="en-US" dirty="0" err="1"/>
+              <a:t>x_test.reshape</a:t>
+            </a:r>
+            <a:r>
+              <a:rPr lang="en-US" dirty="0"/>
+              <a:t>(-1,x_test.shape[1],1) # (428,1072,1)</a:t>
+            </a:r>
+          </a:p>
+          <a:p>
+            <a:pPr lvl="4"/>
+            <a:endParaRPr lang="en-US" dirty="0"/>
+          </a:p>
+        </p:txBody>
+      </p:sp>
+    </p:spTree>
+    <p:extLst>
+      <p:ext uri="{BB962C8B-B14F-4D97-AF65-F5344CB8AC3E}">
+        <p14:creationId xmlns:p14="http://schemas.microsoft.com/office/powerpoint/2010/main" val="3361510203"/>
+      </p:ext>
+    </p:extLst>
+  </p:cSld>
+  <p:clrMapOvr>
+    <a:masterClrMapping/>
+  </p:clrMapOvr>
+  <mc:AlternateContent xmlns:mc="http://schemas.openxmlformats.org/markup-compatibility/2006" xmlns:p14="http://schemas.microsoft.com/office/powerpoint/2010/main">
+    <mc:Choice Requires="p14">
+      <p:transition spd="med" p14:dur="700">
+        <p:fade/>
+      </p:transition>
+    </mc:Choice>
+    <mc:Fallback xmlns="">
+      <p:transition spd="med">
+        <p:fade/>
+      </p:transition>
+    </mc:Fallback>
+  </mc:AlternateContent>
+</p:sld>
+</file>
+
+<file path=ppt/slides/slide23.xml><?xml version="1.0" encoding="utf-8"?>
+<p:sld xmlns:a="http://schemas.openxmlformats.org/drawingml/2006/main" xmlns:r="http://schemas.openxmlformats.org/officeDocument/2006/relationships" xmlns:p="http://schemas.openxmlformats.org/presentationml/2006/main">
+  <p:cSld>
+    <p:spTree>
+      <p:nvGrpSpPr>
+        <p:cNvPr id="1" name=""/>
+        <p:cNvGrpSpPr/>
+        <p:nvPr/>
+      </p:nvGrpSpPr>
+      <p:grpSpPr>
+        <a:xfrm>
+          <a:off x="0" y="0"/>
+          <a:ext cx="0" cy="0"/>
+          <a:chOff x="0" y="0"/>
+          <a:chExt cx="0" cy="0"/>
+        </a:xfrm>
+      </p:grpSpPr>
+      <p:sp>
+        <p:nvSpPr>
+          <p:cNvPr id="2" name="Title 1">
+            <a:extLst>
+              <a:ext uri="{FF2B5EF4-FFF2-40B4-BE49-F238E27FC236}">
+                <a16:creationId xmlns:a16="http://schemas.microsoft.com/office/drawing/2014/main" id="{E5A0E343-1EB8-4823-B727-F110AA23523A}"/>
+              </a:ext>
+            </a:extLst>
+          </p:cNvPr>
+          <p:cNvSpPr>
+            <a:spLocks noGrp="1"/>
+          </p:cNvSpPr>
+          <p:nvPr>
+            <p:ph type="title"/>
+          </p:nvPr>
+        </p:nvSpPr>
+        <p:spPr/>
+        <p:txBody>
+          <a:bodyPr/>
+          <a:lstStyle/>
+          <a:p>
+            <a:pPr algn="ctr"/>
+            <a:r>
+              <a:rPr lang="en-US" dirty="0"/>
+              <a:t>Biggest challenge</a:t>
+            </a:r>
+          </a:p>
+        </p:txBody>
+      </p:sp>
+      <p:sp>
+        <p:nvSpPr>
+          <p:cNvPr id="5" name="TextBox 4">
+            <a:extLst>
+              <a:ext uri="{FF2B5EF4-FFF2-40B4-BE49-F238E27FC236}">
+                <a16:creationId xmlns:a16="http://schemas.microsoft.com/office/drawing/2014/main" id="{4008A12A-34E3-4CB9-91E5-DA4D41EEBA40}"/>
+              </a:ext>
+            </a:extLst>
+          </p:cNvPr>
+          <p:cNvSpPr txBox="1"/>
+          <p:nvPr/>
+        </p:nvSpPr>
+        <p:spPr>
+          <a:xfrm>
+            <a:off x="1862356" y="2365695"/>
+            <a:ext cx="8959442" cy="2585323"/>
+          </a:xfrm>
+          <a:prstGeom prst="rect">
+            <a:avLst/>
+          </a:prstGeom>
+          <a:noFill/>
+        </p:spPr>
+        <p:txBody>
+          <a:bodyPr wrap="square" rtlCol="0">
+            <a:spAutoFit/>
+          </a:bodyPr>
+          <a:lstStyle/>
+          <a:p>
+            <a:endParaRPr lang="en-US" dirty="0"/>
+          </a:p>
+          <a:p>
+            <a:pPr marL="742950" lvl="1" indent="-285750">
+              <a:buFont typeface="Wingdings" panose="05000000000000000000" pitchFamily="2" charset="2"/>
+              <a:buChar char="Ø"/>
+            </a:pPr>
+            <a:r>
+              <a:rPr lang="en-US" dirty="0"/>
+              <a:t>Feeding the tensorflow graph</a:t>
+            </a:r>
+          </a:p>
+          <a:p>
+            <a:pPr marL="1200150" lvl="2" indent="-285750">
+              <a:buFont typeface="Wingdings" panose="05000000000000000000" pitchFamily="2" charset="2"/>
+              <a:buChar char="Ø"/>
+            </a:pPr>
+            <a:r>
+              <a:rPr lang="en-US" dirty="0"/>
+              <a:t>SNN</a:t>
+            </a:r>
+          </a:p>
+          <a:p>
+            <a:pPr marL="1200150" lvl="2" indent="-285750">
+              <a:buFont typeface="Wingdings" panose="05000000000000000000" pitchFamily="2" charset="2"/>
+              <a:buChar char="Ø"/>
+            </a:pPr>
+            <a:endParaRPr lang="en-US" b="1" dirty="0"/>
+          </a:p>
+          <a:p>
+            <a:pPr marL="1200150" lvl="2" indent="-285750">
+              <a:buFont typeface="Wingdings" panose="05000000000000000000" pitchFamily="2" charset="2"/>
+              <a:buChar char="Ø"/>
+            </a:pPr>
+            <a:r>
+              <a:rPr lang="en-US" dirty="0"/>
+              <a:t>RNN</a:t>
+            </a:r>
+          </a:p>
+          <a:p>
+            <a:pPr marL="1657350" lvl="3" indent="-285750">
+              <a:buFont typeface="Arial" panose="020B0604020202020204" pitchFamily="34" charset="0"/>
+              <a:buChar char="•"/>
+            </a:pPr>
+            <a:r>
+              <a:rPr lang="en-US" dirty="0"/>
+              <a:t>One Hot encoded everything!</a:t>
+            </a:r>
+          </a:p>
+          <a:p>
+            <a:pPr marL="1657350" lvl="3" indent="-285750">
+              <a:buFont typeface="Arial" panose="020B0604020202020204" pitchFamily="34" charset="0"/>
+              <a:buChar char="•"/>
+            </a:pPr>
+            <a:r>
+              <a:rPr lang="en-US" dirty="0"/>
+              <a:t>Items need to be fed in sequence (sequential data)</a:t>
+            </a:r>
+          </a:p>
+          <a:p>
+            <a:pPr marL="1657350" lvl="3" indent="-285750">
+              <a:buFont typeface="Arial" panose="020B0604020202020204" pitchFamily="34" charset="0"/>
+              <a:buChar char="•"/>
+            </a:pPr>
+            <a:r>
+              <a:rPr lang="en-US" dirty="0"/>
+              <a:t>Learns from previous state</a:t>
+            </a:r>
+          </a:p>
+          <a:p>
+            <a:pPr lvl="4"/>
+            <a:endParaRPr lang="en-US" dirty="0"/>
+          </a:p>
+        </p:txBody>
+      </p:sp>
+    </p:spTree>
+    <p:extLst>
+      <p:ext uri="{BB962C8B-B14F-4D97-AF65-F5344CB8AC3E}">
+        <p14:creationId xmlns:p14="http://schemas.microsoft.com/office/powerpoint/2010/main" val="166806577"/>
+      </p:ext>
+    </p:extLst>
+  </p:cSld>
+  <p:clrMapOvr>
+    <a:masterClrMapping/>
+  </p:clrMapOvr>
+  <mc:AlternateContent xmlns:mc="http://schemas.openxmlformats.org/markup-compatibility/2006" xmlns:p14="http://schemas.microsoft.com/office/powerpoint/2010/main">
+    <mc:Choice Requires="p14">
+      <p:transition spd="med" p14:dur="700">
+        <p:fade/>
+      </p:transition>
+    </mc:Choice>
+    <mc:Fallback xmlns="">
+      <p:transition spd="med">
+        <p:fade/>
+      </p:transition>
+    </mc:Fallback>
+  </mc:AlternateContent>
+</p:sld>
+</file>
+
+<file path=ppt/slides/slide24.xml><?xml version="1.0" encoding="utf-8"?>
 <p:sld xmlns:a="http://schemas.openxmlformats.org/drawingml/2006/main" xmlns:r="http://schemas.openxmlformats.org/officeDocument/2006/relationships" xmlns:p="http://schemas.openxmlformats.org/presentationml/2006/main">
   <p:cSld>
     <p:spTree>
@@ -13665,10 +15120,13 @@
   <p:clrMapOvr>
     <a:masterClrMapping/>
   </p:clrMapOvr>
+  <p:transition spd="med">
+    <p:pull/>
+  </p:transition>
 </p:sld>
 </file>
 
-<file path=ppt/slides/slide18.xml><?xml version="1.0" encoding="utf-8"?>
+<file path=ppt/slides/slide25.xml><?xml version="1.0" encoding="utf-8"?>
 <p:sld xmlns:a="http://schemas.openxmlformats.org/drawingml/2006/main" xmlns:r="http://schemas.openxmlformats.org/officeDocument/2006/relationships" xmlns:p="http://schemas.openxmlformats.org/presentationml/2006/main">
   <p:cSld>
     <p:spTree>
@@ -13763,10 +15221,22 @@
   <p:clrMapOvr>
     <a:masterClrMapping/>
   </p:clrMapOvr>
+  <mc:AlternateContent xmlns:mc="http://schemas.openxmlformats.org/markup-compatibility/2006">
+    <mc:Choice xmlns:p159="http://schemas.microsoft.com/office/powerpoint/2015/09/main" Requires="p159">
+      <p:transition xmlns:p14="http://schemas.microsoft.com/office/powerpoint/2010/main" spd="slow" p14:dur="2000">
+        <p159:morph option="byObject"/>
+      </p:transition>
+    </mc:Choice>
+    <mc:Fallback>
+      <p:transition spd="slow">
+        <p:fade/>
+      </p:transition>
+    </mc:Fallback>
+  </mc:AlternateContent>
 </p:sld>
 </file>
 
-<file path=ppt/slides/slide19.xml><?xml version="1.0" encoding="utf-8"?>
+<file path=ppt/slides/slide26.xml><?xml version="1.0" encoding="utf-8"?>
 <p:sld xmlns:a="http://schemas.openxmlformats.org/drawingml/2006/main" xmlns:r="http://schemas.openxmlformats.org/officeDocument/2006/relationships" xmlns:p="http://schemas.openxmlformats.org/presentationml/2006/main">
   <p:cSld>
     <p:spTree>
@@ -13827,7 +15297,7 @@
         <p:spPr>
           <a:xfrm>
             <a:off x="1322457" y="2407640"/>
-            <a:ext cx="7988534" cy="1477328"/>
+            <a:ext cx="7988534" cy="2031325"/>
           </a:xfrm>
           <a:prstGeom prst="rect">
             <a:avLst/>
@@ -13861,6 +15331,15 @@
             <a:r>
               <a:rPr lang="en-US" dirty="0"/>
               <a:t>https://towardsdatascience.com/selu-make-fnns-great-again-snn-8d61526802a9</a:t>
+            </a:r>
+          </a:p>
+          <a:p>
+            <a:endParaRPr lang="en-US" dirty="0"/>
+          </a:p>
+          <a:p>
+            <a:r>
+              <a:rPr lang="en-US" dirty="0"/>
+              <a:t>https://arxiv.org/ftp/arxiv/papers/1810/1810.08650.pdf</a:t>
             </a:r>
           </a:p>
         </p:txBody>
@@ -13878,135 +15357,6 @@
   <p:transition spd="slow">
     <p:randomBar dir="vert"/>
   </p:transition>
-</p:sld>
-</file>
-
-<file path=ppt/slides/slide2.xml><?xml version="1.0" encoding="utf-8"?>
-<p:sld xmlns:a="http://schemas.openxmlformats.org/drawingml/2006/main" xmlns:r="http://schemas.openxmlformats.org/officeDocument/2006/relationships" xmlns:p="http://schemas.openxmlformats.org/presentationml/2006/main">
-  <p:cSld>
-    <p:spTree>
-      <p:nvGrpSpPr>
-        <p:cNvPr id="1" name=""/>
-        <p:cNvGrpSpPr/>
-        <p:nvPr/>
-      </p:nvGrpSpPr>
-      <p:grpSpPr>
-        <a:xfrm>
-          <a:off x="0" y="0"/>
-          <a:ext cx="0" cy="0"/>
-          <a:chOff x="0" y="0"/>
-          <a:chExt cx="0" cy="0"/>
-        </a:xfrm>
-      </p:grpSpPr>
-      <p:sp>
-        <p:nvSpPr>
-          <p:cNvPr id="2" name="Title 1">
-            <a:extLst>
-              <a:ext uri="{FF2B5EF4-FFF2-40B4-BE49-F238E27FC236}">
-                <a16:creationId xmlns:a16="http://schemas.microsoft.com/office/drawing/2014/main" id="{F9C7C7A1-27A4-44BB-9EDB-C42057F303DB}"/>
-              </a:ext>
-            </a:extLst>
-          </p:cNvPr>
-          <p:cNvSpPr>
-            <a:spLocks noGrp="1"/>
-          </p:cNvSpPr>
-          <p:nvPr>
-            <p:ph type="title"/>
-          </p:nvPr>
-        </p:nvSpPr>
-        <p:spPr/>
-        <p:txBody>
-          <a:bodyPr/>
-          <a:lstStyle/>
-          <a:p>
-            <a:pPr algn="ctr"/>
-            <a:r>
-              <a:rPr lang="en-US" u="sng" dirty="0" err="1"/>
-              <a:t>Rnn</a:t>
-            </a:r>
-            <a:r>
-              <a:rPr lang="en-US" u="sng" dirty="0"/>
-              <a:t> recap</a:t>
-            </a:r>
-          </a:p>
-        </p:txBody>
-      </p:sp>
-      <p:sp>
-        <p:nvSpPr>
-          <p:cNvPr id="3" name="TextBox 2">
-            <a:extLst>
-              <a:ext uri="{FF2B5EF4-FFF2-40B4-BE49-F238E27FC236}">
-                <a16:creationId xmlns:a16="http://schemas.microsoft.com/office/drawing/2014/main" id="{1DD94BFF-E763-4E86-BE37-2A45493E42E5}"/>
-              </a:ext>
-            </a:extLst>
-          </p:cNvPr>
-          <p:cNvSpPr txBox="1"/>
-          <p:nvPr/>
-        </p:nvSpPr>
-        <p:spPr>
-          <a:xfrm>
-            <a:off x="1560353" y="2281806"/>
-            <a:ext cx="9614647" cy="1754326"/>
-          </a:xfrm>
-          <a:prstGeom prst="rect">
-            <a:avLst/>
-          </a:prstGeom>
-          <a:noFill/>
-        </p:spPr>
-        <p:txBody>
-          <a:bodyPr wrap="square" rtlCol="0">
-            <a:spAutoFit/>
-          </a:bodyPr>
-          <a:lstStyle/>
-          <a:p>
-            <a:r>
-              <a:rPr lang="en-US" dirty="0"/>
-              <a:t>A </a:t>
-            </a:r>
-            <a:r>
-              <a:rPr lang="en-US" b="1" dirty="0"/>
-              <a:t>recurrent neural network</a:t>
-            </a:r>
-            <a:r>
-              <a:rPr lang="en-US" dirty="0"/>
-              <a:t> (</a:t>
-            </a:r>
-            <a:r>
-              <a:rPr lang="en-US" b="1" dirty="0"/>
-              <a:t>RNN</a:t>
-            </a:r>
-            <a:r>
-              <a:rPr lang="en-US" dirty="0"/>
-              <a:t>) is a class of artificial neural network where connections between nodes form a directed graph along a sequence. This allows it to exhibit temporal dynamic behavior for a time sequence. Unlike feedforward neural networks, RNNs can use their internal state (memory) to process sequences of inputs. This makes them applicable to tasks such as unsegmented, connected handwriting recognition or speech recognition.</a:t>
-            </a:r>
-          </a:p>
-          <a:p>
-            <a:endParaRPr lang="en-US" dirty="0"/>
-          </a:p>
-        </p:txBody>
-      </p:sp>
-    </p:spTree>
-    <p:extLst>
-      <p:ext uri="{BB962C8B-B14F-4D97-AF65-F5344CB8AC3E}">
-        <p14:creationId xmlns:p14="http://schemas.microsoft.com/office/powerpoint/2010/main" val="3302420173"/>
-      </p:ext>
-    </p:extLst>
-  </p:cSld>
-  <p:clrMapOvr>
-    <a:masterClrMapping/>
-  </p:clrMapOvr>
-  <mc:AlternateContent xmlns:mc="http://schemas.openxmlformats.org/markup-compatibility/2006" xmlns:p159="http://schemas.microsoft.com/office/powerpoint/2015/09/main">
-    <mc:Choice Requires="p159">
-      <p:transition xmlns:p14="http://schemas.microsoft.com/office/powerpoint/2010/main" spd="slow" p14:dur="2000">
-        <p159:morph option="byObject"/>
-      </p:transition>
-    </mc:Choice>
-    <mc:Fallback xmlns="">
-      <p:transition spd="slow">
-        <p:fade/>
-      </p:transition>
-    </mc:Fallback>
-  </mc:AlternateContent>
 </p:sld>
 </file>
 
@@ -14230,14 +15580,14 @@
   <p:clrMapOvr>
     <a:masterClrMapping/>
   </p:clrMapOvr>
-  <mc:AlternateContent xmlns:mc="http://schemas.openxmlformats.org/markup-compatibility/2006" xmlns:p14="http://schemas.microsoft.com/office/powerpoint/2010/main">
-    <mc:Choice Requires="p14">
-      <p:transition spd="med" p14:dur="700">
-        <p:fade/>
+  <mc:AlternateContent xmlns:mc="http://schemas.openxmlformats.org/markup-compatibility/2006">
+    <mc:Choice xmlns:p15="http://schemas.microsoft.com/office/powerpoint/2012/main" Requires="p15">
+      <p:transition xmlns:p14="http://schemas.microsoft.com/office/powerpoint/2010/main" spd="slow" p14:dur="2000">
+        <p15:prstTrans prst="fracture"/>
       </p:transition>
     </mc:Choice>
-    <mc:Fallback xmlns="">
-      <p:transition spd="med">
+    <mc:Fallback>
+      <p:transition spd="slow">
         <p:fade/>
       </p:transition>
     </mc:Fallback>

</xml_diff>